<commit_message>
Switched postprocessing with Task (introduction)
</commit_message>
<xml_diff>
--- a/Paraview-postprocessor.pptx
+++ b/Paraview-postprocessor.pptx
@@ -11,8 +11,8 @@
   <p:sldIdLst>
     <p:sldId id="256" r:id="rId3"/>
     <p:sldId id="257" r:id="rId4"/>
-    <p:sldId id="265" r:id="rId5"/>
-    <p:sldId id="258" r:id="rId6"/>
+    <p:sldId id="258" r:id="rId5"/>
+    <p:sldId id="265" r:id="rId6"/>
     <p:sldId id="259" r:id="rId7"/>
     <p:sldId id="260" r:id="rId8"/>
     <p:sldId id="261" r:id="rId9"/>
@@ -6150,19 +6150,8 @@
                 </a:uFill>
                 <a:latin typeface="Arial"/>
               </a:rPr>
-              <a:t>Introduction</a:t>
+              <a:t>Postprocessing</a:t>
             </a:r>
-            <a:endParaRPr lang="en-US" sz="1600" b="0" strike="noStrike" spc="-1" dirty="0">
-              <a:solidFill>
-                <a:srgbClr val="000000"/>
-              </a:solidFill>
-              <a:uFill>
-                <a:solidFill>
-                  <a:srgbClr val="FFFFFF"/>
-                </a:solidFill>
-              </a:uFill>
-              <a:latin typeface="Arial"/>
-            </a:endParaRPr>
           </a:p>
           <a:p>
             <a:pPr marL="343260" indent="-342900">
@@ -6187,7 +6176,7 @@
                 </a:uFill>
                 <a:latin typeface="Arial"/>
               </a:rPr>
-              <a:t>Postprocessing</a:t>
+              <a:t>Task</a:t>
             </a:r>
           </a:p>
           <a:p>
@@ -6543,7 +6532,7 @@
       </p:grpSpPr>
       <p:sp>
         <p:nvSpPr>
-          <p:cNvPr id="89" name="TextShape 1"/>
+          <p:cNvPr id="93" name="TextShape 1"/>
           <p:cNvSpPr txBox="1"/>
           <p:nvPr/>
         </p:nvSpPr>
@@ -6564,39 +6553,33 @@
           <a:bodyPr lIns="0" tIns="0" rIns="0" bIns="0"/>
           <a:lstStyle/>
           <a:p>
-            <a:pPr marL="286110" indent="-285750">
+            <a:pPr marL="342900" indent="-342900">
               <a:lnSpc>
-                <a:spcPct val="100000"/>
+                <a:spcPct val="114000"/>
               </a:lnSpc>
-              <a:buClr>
-                <a:srgbClr val="000000"/>
-              </a:buClr>
               <a:buFont typeface="Arial" panose="020B0604020202020204" pitchFamily="34" charset="0"/>
               <a:buChar char="•"/>
             </a:pPr>
             <a:r>
-              <a:rPr lang="en-US" sz="2200" spc="-1" dirty="0">
-                <a:solidFill>
-                  <a:srgbClr val="000000"/>
-                </a:solidFill>
-                <a:uFill>
-                  <a:solidFill>
-                    <a:srgbClr val="FFFFFF"/>
-                  </a:solidFill>
-                </a:uFill>
-                <a:latin typeface="Arial"/>
-              </a:rPr>
-              <a:t>Postprocessing for Paraview</a:t>
+              <a:rPr lang="en-US" sz="2200" b="0" strike="noStrike" spc="-1" dirty="0">
+                <a:solidFill>
+                  <a:srgbClr val="000000"/>
+                </a:solidFill>
+                <a:uFill>
+                  <a:solidFill>
+                    <a:srgbClr val="FFFFFF"/>
+                  </a:solidFill>
+                </a:uFill>
+                <a:latin typeface="Arial"/>
+              </a:rPr>
+              <a:t>Post (lat.) – after</a:t>
             </a:r>
           </a:p>
           <a:p>
-            <a:pPr marL="286110" indent="-285750">
+            <a:pPr marL="342900" indent="-342900">
               <a:lnSpc>
-                <a:spcPct val="100000"/>
+                <a:spcPct val="114000"/>
               </a:lnSpc>
-              <a:buClr>
-                <a:srgbClr val="000000"/>
-              </a:buClr>
               <a:buFont typeface="Arial" panose="020B0604020202020204" pitchFamily="34" charset="0"/>
               <a:buChar char="•"/>
             </a:pPr>
@@ -6612,17 +6595,25 @@
                 </a:uFill>
                 <a:latin typeface="Arial"/>
               </a:rPr>
-              <a:t>Distribution to an existing Program, called Adhoc</a:t>
+              <a:t>Further calculating may be necessary</a:t>
             </a:r>
-          </a:p>
-          <a:p>
-            <a:pPr marL="286110" indent="-285750">
+            <a:endParaRPr lang="en-US" sz="2200" b="0" strike="noStrike" spc="-1" dirty="0">
+              <a:solidFill>
+                <a:srgbClr val="000000"/>
+              </a:solidFill>
+              <a:uFill>
+                <a:solidFill>
+                  <a:srgbClr val="FFFFFF"/>
+                </a:solidFill>
+              </a:uFill>
+              <a:latin typeface="Arial"/>
+            </a:endParaRPr>
+          </a:p>
+          <a:p>
+            <a:pPr marL="342900" indent="-342900">
               <a:lnSpc>
-                <a:spcPct val="100000"/>
+                <a:spcPct val="114000"/>
               </a:lnSpc>
-              <a:buClr>
-                <a:srgbClr val="000000"/>
-              </a:buClr>
               <a:buFont typeface="Arial" panose="020B0604020202020204" pitchFamily="34" charset="0"/>
               <a:buChar char="•"/>
             </a:pPr>
@@ -6638,43 +6629,48 @@
                 </a:uFill>
                 <a:latin typeface="Arial"/>
               </a:rPr>
-              <a:t>Plugin written in python</a:t>
+              <a:t>Processing takes too long to do all calculations every time</a:t>
             </a:r>
-          </a:p>
-          <a:p>
-            <a:pPr marL="286110" indent="-285750">
+            <a:endParaRPr lang="en-US" sz="2200" spc="-1" dirty="0">
+              <a:solidFill>
+                <a:srgbClr val="000000"/>
+              </a:solidFill>
+              <a:uFill>
+                <a:solidFill>
+                  <a:srgbClr val="FFFFFF"/>
+                </a:solidFill>
+              </a:uFill>
+              <a:latin typeface="Arial"/>
+            </a:endParaRPr>
+          </a:p>
+          <a:p>
+            <a:pPr marL="800100" lvl="1" indent="-342900">
               <a:lnSpc>
-                <a:spcPct val="100000"/>
+                <a:spcPct val="114000"/>
               </a:lnSpc>
-              <a:buClr>
-                <a:srgbClr val="000000"/>
-              </a:buClr>
               <a:buFont typeface="Arial" panose="020B0604020202020204" pitchFamily="34" charset="0"/>
               <a:buChar char="•"/>
             </a:pPr>
             <a:r>
-              <a:rPr lang="en-US" sz="2200" spc="-1" dirty="0">
-                <a:solidFill>
-                  <a:srgbClr val="000000"/>
-                </a:solidFill>
-                <a:uFill>
-                  <a:solidFill>
-                    <a:srgbClr val="FFFFFF"/>
-                  </a:solidFill>
-                </a:uFill>
-                <a:latin typeface="Arial"/>
-              </a:rPr>
-              <a:t>Working OS Ubuntu (Linux)</a:t>
+              <a:rPr lang="en-US" sz="2200" b="0" strike="noStrike" spc="-1" dirty="0">
+                <a:solidFill>
+                  <a:srgbClr val="000000"/>
+                </a:solidFill>
+                <a:uFill>
+                  <a:solidFill>
+                    <a:srgbClr val="FFFFFF"/>
+                  </a:solidFill>
+                </a:uFill>
+                <a:latin typeface="Arial"/>
+              </a:rPr>
+              <a:t>Selecting a specific part for postprocessing</a:t>
             </a:r>
           </a:p>
           <a:p>
-            <a:pPr marL="286110" indent="-285750">
+            <a:pPr marL="342900" indent="-342900">
               <a:lnSpc>
-                <a:spcPct val="100000"/>
+                <a:spcPct val="114000"/>
               </a:lnSpc>
-              <a:buClr>
-                <a:srgbClr val="000000"/>
-              </a:buClr>
               <a:buFont typeface="Arial" panose="020B0604020202020204" pitchFamily="34" charset="0"/>
               <a:buChar char="•"/>
             </a:pPr>
@@ -6690,8 +6686,28 @@
                 </a:uFill>
                 <a:latin typeface="Arial"/>
               </a:rPr>
-              <a:t>Usage of GIT</a:t>
+              <a:t>Example: Building</a:t>
             </a:r>
+          </a:p>
+          <a:p>
+            <a:pPr marL="342900" indent="-342900">
+              <a:lnSpc>
+                <a:spcPct val="114000"/>
+              </a:lnSpc>
+              <a:buFont typeface="Arial" panose="020B0604020202020204" pitchFamily="34" charset="0"/>
+              <a:buChar char="•"/>
+            </a:pPr>
+            <a:endParaRPr lang="en-US" sz="1600" b="0" strike="noStrike" spc="-1" dirty="0">
+              <a:solidFill>
+                <a:srgbClr val="000000"/>
+              </a:solidFill>
+              <a:uFill>
+                <a:solidFill>
+                  <a:srgbClr val="FFFFFF"/>
+                </a:solidFill>
+              </a:uFill>
+              <a:latin typeface="Arial"/>
+            </a:endParaRPr>
           </a:p>
           <a:p>
             <a:pPr>
@@ -6699,6 +6715,42 @@
                 <a:spcPct val="114000"/>
               </a:lnSpc>
             </a:pPr>
+            <a:endParaRPr lang="en-US" sz="1600" b="0" strike="noStrike" spc="-1" dirty="0">
+              <a:solidFill>
+                <a:srgbClr val="000000"/>
+              </a:solidFill>
+              <a:uFill>
+                <a:solidFill>
+                  <a:srgbClr val="FFFFFF"/>
+                </a:solidFill>
+              </a:uFill>
+              <a:latin typeface="Arial"/>
+            </a:endParaRPr>
+          </a:p>
+          <a:p>
+            <a:pPr>
+              <a:lnSpc>
+                <a:spcPct val="114000"/>
+              </a:lnSpc>
+            </a:pPr>
+            <a:endParaRPr lang="en-US" sz="1600" b="0" strike="noStrike" spc="-1" dirty="0">
+              <a:solidFill>
+                <a:srgbClr val="000000"/>
+              </a:solidFill>
+              <a:uFill>
+                <a:solidFill>
+                  <a:srgbClr val="FFFFFF"/>
+                </a:solidFill>
+              </a:uFill>
+              <a:latin typeface="Arial"/>
+            </a:endParaRPr>
+          </a:p>
+          <a:p>
+            <a:pPr>
+              <a:lnSpc>
+                <a:spcPct val="114000"/>
+              </a:lnSpc>
+            </a:pPr>
             <a:endParaRPr lang="de-DE" sz="1600" b="0" strike="noStrike" spc="-1" dirty="0">
               <a:solidFill>
                 <a:srgbClr val="000000"/>
@@ -6715,7 +6767,7 @@
       </p:sp>
       <p:sp>
         <p:nvSpPr>
-          <p:cNvPr id="90" name="TextShape 2"/>
+          <p:cNvPr id="94" name="TextShape 2"/>
           <p:cNvSpPr txBox="1"/>
           <p:nvPr/>
         </p:nvSpPr>
@@ -6741,7 +6793,7 @@
                 <a:spcPct val="100000"/>
               </a:lnSpc>
             </a:pPr>
-            <a:fld id="{4F831EE4-46AE-4713-AD1F-E57479484FF3}" type="slidenum">
+            <a:fld id="{ABC9E17F-0E7D-436C-8320-8A552E5784EE}" type="slidenum">
               <a:rPr lang="de-DE" sz="1200" b="0" strike="noStrike" spc="-1">
                 <a:solidFill>
                   <a:srgbClr val="000000"/>
@@ -6771,7 +6823,7 @@
       </p:sp>
       <p:sp>
         <p:nvSpPr>
-          <p:cNvPr id="91" name="TextShape 3"/>
+          <p:cNvPr id="95" name="TextShape 3"/>
           <p:cNvSpPr txBox="1"/>
           <p:nvPr/>
         </p:nvSpPr>
@@ -6827,7 +6879,7 @@
       </p:sp>
       <p:sp>
         <p:nvSpPr>
-          <p:cNvPr id="92" name="TextShape 4"/>
+          <p:cNvPr id="96" name="TextShape 4"/>
           <p:cNvSpPr txBox="1"/>
           <p:nvPr/>
         </p:nvSpPr>
@@ -6865,7 +6917,7 @@
                 </a:uFill>
                 <a:latin typeface="Arial"/>
               </a:rPr>
-              <a:t>Introduction</a:t>
+              <a:t>Postprocessing</a:t>
             </a:r>
             <a:endParaRPr lang="en-US" sz="2200" b="0" strike="noStrike" spc="-1" dirty="0">
               <a:solidFill>
@@ -6882,11 +6934,6 @@
         </p:txBody>
       </p:sp>
     </p:spTree>
-    <p:extLst>
-      <p:ext uri="{BB962C8B-B14F-4D97-AF65-F5344CB8AC3E}">
-        <p14:creationId xmlns:p14="http://schemas.microsoft.com/office/powerpoint/2010/main" val="853532261"/>
-      </p:ext>
-    </p:extLst>
   </p:cSld>
   <p:clrMapOvr>
     <a:masterClrMapping/>
@@ -6940,7 +6987,7 @@
       </p:grpSpPr>
       <p:sp>
         <p:nvSpPr>
-          <p:cNvPr id="93" name="TextShape 1"/>
+          <p:cNvPr id="89" name="TextShape 1"/>
           <p:cNvSpPr txBox="1"/>
           <p:nvPr/>
         </p:nvSpPr>
@@ -6961,33 +7008,39 @@
           <a:bodyPr lIns="0" tIns="0" rIns="0" bIns="0"/>
           <a:lstStyle/>
           <a:p>
-            <a:pPr marL="342900" indent="-342900">
+            <a:pPr marL="286110" indent="-285750">
               <a:lnSpc>
-                <a:spcPct val="114000"/>
+                <a:spcPct val="100000"/>
               </a:lnSpc>
+              <a:buClr>
+                <a:srgbClr val="000000"/>
+              </a:buClr>
               <a:buFont typeface="Arial" panose="020B0604020202020204" pitchFamily="34" charset="0"/>
               <a:buChar char="•"/>
             </a:pPr>
             <a:r>
-              <a:rPr lang="en-US" sz="2200" b="0" strike="noStrike" spc="-1" dirty="0">
-                <a:solidFill>
-                  <a:srgbClr val="000000"/>
-                </a:solidFill>
-                <a:uFill>
-                  <a:solidFill>
-                    <a:srgbClr val="FFFFFF"/>
-                  </a:solidFill>
-                </a:uFill>
-                <a:latin typeface="Arial"/>
-              </a:rPr>
-              <a:t>Post (lat.) – after</a:t>
+              <a:rPr lang="en-US" sz="2200" spc="-1" dirty="0">
+                <a:solidFill>
+                  <a:srgbClr val="000000"/>
+                </a:solidFill>
+                <a:uFill>
+                  <a:solidFill>
+                    <a:srgbClr val="FFFFFF"/>
+                  </a:solidFill>
+                </a:uFill>
+                <a:latin typeface="Arial"/>
+              </a:rPr>
+              <a:t>Postprocessing for Paraview</a:t>
             </a:r>
           </a:p>
           <a:p>
-            <a:pPr marL="342900" indent="-342900">
+            <a:pPr marL="286110" indent="-285750">
               <a:lnSpc>
-                <a:spcPct val="114000"/>
+                <a:spcPct val="100000"/>
               </a:lnSpc>
+              <a:buClr>
+                <a:srgbClr val="000000"/>
+              </a:buClr>
               <a:buFont typeface="Arial" panose="020B0604020202020204" pitchFamily="34" charset="0"/>
               <a:buChar char="•"/>
             </a:pPr>
@@ -7003,25 +7056,17 @@
                 </a:uFill>
                 <a:latin typeface="Arial"/>
               </a:rPr>
-              <a:t>Further calculating may be necessary</a:t>
+              <a:t>Distribution to an existing Program, called Adhoc</a:t>
             </a:r>
-            <a:endParaRPr lang="en-US" sz="2200" b="0" strike="noStrike" spc="-1" dirty="0">
-              <a:solidFill>
-                <a:srgbClr val="000000"/>
-              </a:solidFill>
-              <a:uFill>
-                <a:solidFill>
-                  <a:srgbClr val="FFFFFF"/>
-                </a:solidFill>
-              </a:uFill>
-              <a:latin typeface="Arial"/>
-            </a:endParaRPr>
-          </a:p>
-          <a:p>
-            <a:pPr marL="342900" indent="-342900">
+          </a:p>
+          <a:p>
+            <a:pPr marL="286110" indent="-285750">
               <a:lnSpc>
-                <a:spcPct val="114000"/>
+                <a:spcPct val="100000"/>
               </a:lnSpc>
+              <a:buClr>
+                <a:srgbClr val="000000"/>
+              </a:buClr>
               <a:buFont typeface="Arial" panose="020B0604020202020204" pitchFamily="34" charset="0"/>
               <a:buChar char="•"/>
             </a:pPr>
@@ -7037,48 +7082,43 @@
                 </a:uFill>
                 <a:latin typeface="Arial"/>
               </a:rPr>
-              <a:t>Processing takes too long to do all calculations every time</a:t>
+              <a:t>Plugin written in python</a:t>
             </a:r>
-            <a:endParaRPr lang="en-US" sz="2200" spc="-1" dirty="0">
-              <a:solidFill>
-                <a:srgbClr val="000000"/>
-              </a:solidFill>
-              <a:uFill>
-                <a:solidFill>
-                  <a:srgbClr val="FFFFFF"/>
-                </a:solidFill>
-              </a:uFill>
-              <a:latin typeface="Arial"/>
-            </a:endParaRPr>
-          </a:p>
-          <a:p>
-            <a:pPr marL="800100" lvl="1" indent="-342900">
+          </a:p>
+          <a:p>
+            <a:pPr marL="286110" indent="-285750">
               <a:lnSpc>
-                <a:spcPct val="114000"/>
+                <a:spcPct val="100000"/>
               </a:lnSpc>
+              <a:buClr>
+                <a:srgbClr val="000000"/>
+              </a:buClr>
               <a:buFont typeface="Arial" panose="020B0604020202020204" pitchFamily="34" charset="0"/>
               <a:buChar char="•"/>
             </a:pPr>
             <a:r>
-              <a:rPr lang="en-US" sz="2200" b="0" strike="noStrike" spc="-1" dirty="0">
-                <a:solidFill>
-                  <a:srgbClr val="000000"/>
-                </a:solidFill>
-                <a:uFill>
-                  <a:solidFill>
-                    <a:srgbClr val="FFFFFF"/>
-                  </a:solidFill>
-                </a:uFill>
-                <a:latin typeface="Arial"/>
-              </a:rPr>
-              <a:t>Selecting a specific part for postprocessing</a:t>
+              <a:rPr lang="en-US" sz="2200" spc="-1" dirty="0">
+                <a:solidFill>
+                  <a:srgbClr val="000000"/>
+                </a:solidFill>
+                <a:uFill>
+                  <a:solidFill>
+                    <a:srgbClr val="FFFFFF"/>
+                  </a:solidFill>
+                </a:uFill>
+                <a:latin typeface="Arial"/>
+              </a:rPr>
+              <a:t>Working OS Ubuntu (Linux)</a:t>
             </a:r>
           </a:p>
           <a:p>
-            <a:pPr marL="342900" indent="-342900">
+            <a:pPr marL="286110" indent="-285750">
               <a:lnSpc>
-                <a:spcPct val="114000"/>
+                <a:spcPct val="100000"/>
               </a:lnSpc>
+              <a:buClr>
+                <a:srgbClr val="000000"/>
+              </a:buClr>
               <a:buFont typeface="Arial" panose="020B0604020202020204" pitchFamily="34" charset="0"/>
               <a:buChar char="•"/>
             </a:pPr>
@@ -7094,28 +7134,8 @@
                 </a:uFill>
                 <a:latin typeface="Arial"/>
               </a:rPr>
-              <a:t>Example: Building</a:t>
+              <a:t>Usage of GIT</a:t>
             </a:r>
-          </a:p>
-          <a:p>
-            <a:pPr marL="342900" indent="-342900">
-              <a:lnSpc>
-                <a:spcPct val="114000"/>
-              </a:lnSpc>
-              <a:buFont typeface="Arial" panose="020B0604020202020204" pitchFamily="34" charset="0"/>
-              <a:buChar char="•"/>
-            </a:pPr>
-            <a:endParaRPr lang="en-US" sz="1600" b="0" strike="noStrike" spc="-1" dirty="0">
-              <a:solidFill>
-                <a:srgbClr val="000000"/>
-              </a:solidFill>
-              <a:uFill>
-                <a:solidFill>
-                  <a:srgbClr val="FFFFFF"/>
-                </a:solidFill>
-              </a:uFill>
-              <a:latin typeface="Arial"/>
-            </a:endParaRPr>
           </a:p>
           <a:p>
             <a:pPr>
@@ -7123,42 +7143,6 @@
                 <a:spcPct val="114000"/>
               </a:lnSpc>
             </a:pPr>
-            <a:endParaRPr lang="en-US" sz="1600" b="0" strike="noStrike" spc="-1" dirty="0">
-              <a:solidFill>
-                <a:srgbClr val="000000"/>
-              </a:solidFill>
-              <a:uFill>
-                <a:solidFill>
-                  <a:srgbClr val="FFFFFF"/>
-                </a:solidFill>
-              </a:uFill>
-              <a:latin typeface="Arial"/>
-            </a:endParaRPr>
-          </a:p>
-          <a:p>
-            <a:pPr>
-              <a:lnSpc>
-                <a:spcPct val="114000"/>
-              </a:lnSpc>
-            </a:pPr>
-            <a:endParaRPr lang="en-US" sz="1600" b="0" strike="noStrike" spc="-1" dirty="0">
-              <a:solidFill>
-                <a:srgbClr val="000000"/>
-              </a:solidFill>
-              <a:uFill>
-                <a:solidFill>
-                  <a:srgbClr val="FFFFFF"/>
-                </a:solidFill>
-              </a:uFill>
-              <a:latin typeface="Arial"/>
-            </a:endParaRPr>
-          </a:p>
-          <a:p>
-            <a:pPr>
-              <a:lnSpc>
-                <a:spcPct val="114000"/>
-              </a:lnSpc>
-            </a:pPr>
             <a:endParaRPr lang="de-DE" sz="1600" b="0" strike="noStrike" spc="-1" dirty="0">
               <a:solidFill>
                 <a:srgbClr val="000000"/>
@@ -7175,7 +7159,7 @@
       </p:sp>
       <p:sp>
         <p:nvSpPr>
-          <p:cNvPr id="94" name="TextShape 2"/>
+          <p:cNvPr id="90" name="TextShape 2"/>
           <p:cNvSpPr txBox="1"/>
           <p:nvPr/>
         </p:nvSpPr>
@@ -7201,7 +7185,7 @@
                 <a:spcPct val="100000"/>
               </a:lnSpc>
             </a:pPr>
-            <a:fld id="{ABC9E17F-0E7D-436C-8320-8A552E5784EE}" type="slidenum">
+            <a:fld id="{4F831EE4-46AE-4713-AD1F-E57479484FF3}" type="slidenum">
               <a:rPr lang="de-DE" sz="1200" b="0" strike="noStrike" spc="-1">
                 <a:solidFill>
                   <a:srgbClr val="000000"/>
@@ -7231,7 +7215,7 @@
       </p:sp>
       <p:sp>
         <p:nvSpPr>
-          <p:cNvPr id="95" name="TextShape 3"/>
+          <p:cNvPr id="91" name="TextShape 3"/>
           <p:cNvSpPr txBox="1"/>
           <p:nvPr/>
         </p:nvSpPr>
@@ -7287,7 +7271,7 @@
       </p:sp>
       <p:sp>
         <p:nvSpPr>
-          <p:cNvPr id="96" name="TextShape 4"/>
+          <p:cNvPr id="92" name="TextShape 4"/>
           <p:cNvSpPr txBox="1"/>
           <p:nvPr/>
         </p:nvSpPr>
@@ -7325,7 +7309,7 @@
                 </a:uFill>
                 <a:latin typeface="Arial"/>
               </a:rPr>
-              <a:t>Postprocessing</a:t>
+              <a:t>Task</a:t>
             </a:r>
             <a:endParaRPr lang="en-US" sz="2200" b="0" strike="noStrike" spc="-1" dirty="0">
               <a:solidFill>
@@ -7342,6 +7326,11 @@
         </p:txBody>
       </p:sp>
     </p:spTree>
+    <p:extLst>
+      <p:ext uri="{BB962C8B-B14F-4D97-AF65-F5344CB8AC3E}">
+        <p14:creationId xmlns:p14="http://schemas.microsoft.com/office/powerpoint/2010/main" val="853532261"/>
+      </p:ext>
+    </p:extLst>
   </p:cSld>
   <p:clrMapOvr>
     <a:masterClrMapping/>

</xml_diff>

<commit_message>
changed order of slides and created task - flowchart
</commit_message>
<xml_diff>
--- a/Paraview-postprocessor.pptx
+++ b/Paraview-postprocessor.pptx
@@ -12,8 +12,8 @@
     <p:sldId id="256" r:id="rId3"/>
     <p:sldId id="257" r:id="rId4"/>
     <p:sldId id="258" r:id="rId5"/>
-    <p:sldId id="265" r:id="rId6"/>
-    <p:sldId id="259" r:id="rId7"/>
+    <p:sldId id="259" r:id="rId6"/>
+    <p:sldId id="267" r:id="rId7"/>
     <p:sldId id="260" r:id="rId8"/>
     <p:sldId id="261" r:id="rId9"/>
     <p:sldId id="266" r:id="rId10"/>
@@ -5367,20 +5367,6 @@
               </a:lnSpc>
             </a:pPr>
             <a:r>
-              <a:rPr lang="de-DE" sz="1600" b="0" strike="noStrike" spc="-1" dirty="0" err="1">
-                <a:solidFill>
-                  <a:srgbClr val="000000"/>
-                </a:solidFill>
-                <a:uFill>
-                  <a:solidFill>
-                    <a:srgbClr val="FFFFFF"/>
-                  </a:solidFill>
-                </a:uFill>
-                <a:latin typeface="Arial"/>
-              </a:rPr>
-              <a:t>Oztoprak</a:t>
-            </a:r>
-            <a:r>
               <a:rPr lang="de-DE" sz="1600" b="0" strike="noStrike" spc="-1" dirty="0">
                 <a:solidFill>
                   <a:srgbClr val="000000"/>
@@ -5392,7 +5378,7 @@
                 </a:uFill>
                 <a:latin typeface="Arial"/>
               </a:rPr>
-              <a:t>, Oguz</a:t>
+              <a:t>Oztoprak, Oguz</a:t>
             </a:r>
           </a:p>
           <a:p>
@@ -5970,20 +5956,90 @@
               </a:lnSpc>
             </a:pPr>
             <a:r>
-              <a:rPr lang="de-DE" sz="1200" b="0" strike="noStrike" spc="-1">
-                <a:solidFill>
-                  <a:srgbClr val="000000"/>
-                </a:solidFill>
-                <a:uFill>
-                  <a:solidFill>
-                    <a:srgbClr val="FFFFFF"/>
-                  </a:solidFill>
-                </a:uFill>
-                <a:latin typeface="Arial"/>
-              </a:rPr>
-              <a:t>Oztoprak, Oguz (TUM) | Droll, Darwin (TUM) | Python-based Paraview postprocessing</a:t>
-            </a:r>
-            <a:endParaRPr lang="de-DE" sz="1200" b="0" strike="noStrike" spc="-1">
+              <a:rPr lang="de-DE" sz="1200" b="0" strike="noStrike" spc="-1" dirty="0">
+                <a:solidFill>
+                  <a:srgbClr val="000000"/>
+                </a:solidFill>
+                <a:uFill>
+                  <a:solidFill>
+                    <a:srgbClr val="FFFFFF"/>
+                  </a:solidFill>
+                </a:uFill>
+                <a:latin typeface="Arial"/>
+              </a:rPr>
+              <a:t>Oztoprak, Oguz (TUM) | Droll, Darwin (TUM) | Python-</a:t>
+            </a:r>
+            <a:r>
+              <a:rPr lang="de-DE" sz="1200" b="0" strike="noStrike" spc="-1" dirty="0" err="1">
+                <a:solidFill>
+                  <a:srgbClr val="000000"/>
+                </a:solidFill>
+                <a:uFill>
+                  <a:solidFill>
+                    <a:srgbClr val="FFFFFF"/>
+                  </a:solidFill>
+                </a:uFill>
+                <a:latin typeface="Arial"/>
+              </a:rPr>
+              <a:t>based</a:t>
+            </a:r>
+            <a:r>
+              <a:rPr lang="de-DE" sz="1200" b="0" strike="noStrike" spc="-1" dirty="0">
+                <a:solidFill>
+                  <a:srgbClr val="000000"/>
+                </a:solidFill>
+                <a:uFill>
+                  <a:solidFill>
+                    <a:srgbClr val="FFFFFF"/>
+                  </a:solidFill>
+                </a:uFill>
+                <a:latin typeface="Arial"/>
+              </a:rPr>
+              <a:t> </a:t>
+            </a:r>
+            <a:r>
+              <a:rPr lang="de-DE" sz="1200" b="0" strike="noStrike" spc="-1" dirty="0" err="1">
+                <a:solidFill>
+                  <a:srgbClr val="000000"/>
+                </a:solidFill>
+                <a:uFill>
+                  <a:solidFill>
+                    <a:srgbClr val="FFFFFF"/>
+                  </a:solidFill>
+                </a:uFill>
+                <a:latin typeface="Arial"/>
+              </a:rPr>
+              <a:t>Paraview</a:t>
+            </a:r>
+            <a:r>
+              <a:rPr lang="de-DE" sz="1200" b="0" strike="noStrike" spc="-1" dirty="0">
+                <a:solidFill>
+                  <a:srgbClr val="000000"/>
+                </a:solidFill>
+                <a:uFill>
+                  <a:solidFill>
+                    <a:srgbClr val="FFFFFF"/>
+                  </a:solidFill>
+                </a:uFill>
+                <a:latin typeface="Arial"/>
+              </a:rPr>
+              <a:t> </a:t>
+            </a:r>
+            <a:r>
+              <a:rPr lang="de-DE" sz="1200" b="0" strike="noStrike" spc="-1" dirty="0" err="1">
+                <a:solidFill>
+                  <a:srgbClr val="000000"/>
+                </a:solidFill>
+                <a:uFill>
+                  <a:solidFill>
+                    <a:srgbClr val="FFFFFF"/>
+                  </a:solidFill>
+                </a:uFill>
+                <a:latin typeface="Arial"/>
+              </a:rPr>
+              <a:t>postprocessing</a:t>
+            </a:r>
+            <a:endParaRPr lang="de-DE" sz="1200" b="0" strike="noStrike" spc="-1" dirty="0">
               <a:solidFill>
                 <a:srgbClr val="000000"/>
               </a:solidFill>
@@ -6165,19 +6221,30 @@
               <a:buChar char="•"/>
             </a:pPr>
             <a:r>
-              <a:rPr lang="en-US" sz="2400" b="0" strike="noStrike" spc="-1" dirty="0">
-                <a:solidFill>
-                  <a:srgbClr val="000000"/>
-                </a:solidFill>
-                <a:uFill>
-                  <a:solidFill>
-                    <a:srgbClr val="FFFFFF"/>
-                  </a:solidFill>
-                </a:uFill>
-                <a:latin typeface="Arial"/>
-              </a:rPr>
-              <a:t>Task</a:t>
-            </a:r>
+              <a:rPr lang="en-US" sz="2400" spc="-1" dirty="0">
+                <a:solidFill>
+                  <a:srgbClr val="000000"/>
+                </a:solidFill>
+                <a:uFill>
+                  <a:solidFill>
+                    <a:srgbClr val="FFFFFF"/>
+                  </a:solidFill>
+                </a:uFill>
+                <a:latin typeface="Arial"/>
+              </a:rPr>
+              <a:t>Paraview</a:t>
+            </a:r>
+            <a:endParaRPr lang="en-US" sz="2400" b="0" strike="noStrike" spc="-1" dirty="0">
+              <a:solidFill>
+                <a:srgbClr val="000000"/>
+              </a:solidFill>
+              <a:uFill>
+                <a:solidFill>
+                  <a:srgbClr val="FFFFFF"/>
+                </a:solidFill>
+              </a:uFill>
+              <a:latin typeface="Arial"/>
+            </a:endParaRPr>
           </a:p>
           <a:p>
             <a:pPr marL="343260" indent="-342900">
@@ -6191,30 +6258,19 @@
               <a:buChar char="•"/>
             </a:pPr>
             <a:r>
-              <a:rPr lang="en-US" sz="2400" spc="-1" dirty="0">
-                <a:solidFill>
-                  <a:srgbClr val="000000"/>
-                </a:solidFill>
-                <a:uFill>
-                  <a:solidFill>
-                    <a:srgbClr val="FFFFFF"/>
-                  </a:solidFill>
-                </a:uFill>
-                <a:latin typeface="Arial"/>
-              </a:rPr>
-              <a:t>Paraview</a:t>
-            </a:r>
-            <a:endParaRPr lang="en-US" sz="1600" b="0" strike="noStrike" spc="-1" dirty="0">
-              <a:solidFill>
-                <a:srgbClr val="000000"/>
-              </a:solidFill>
-              <a:uFill>
-                <a:solidFill>
-                  <a:srgbClr val="FFFFFF"/>
-                </a:solidFill>
-              </a:uFill>
-              <a:latin typeface="Arial"/>
-            </a:endParaRPr>
+              <a:rPr lang="en-US" sz="2400" b="0" strike="noStrike" spc="-1" dirty="0">
+                <a:solidFill>
+                  <a:srgbClr val="000000"/>
+                </a:solidFill>
+                <a:uFill>
+                  <a:solidFill>
+                    <a:srgbClr val="FFFFFF"/>
+                  </a:solidFill>
+                </a:uFill>
+                <a:latin typeface="Arial"/>
+              </a:rPr>
+              <a:t>Task</a:t>
+            </a:r>
           </a:p>
           <a:p>
             <a:pPr marL="343260" indent="-342900">
@@ -6395,20 +6451,90 @@
               </a:lnSpc>
             </a:pPr>
             <a:r>
-              <a:rPr lang="de-DE" sz="1200" b="0" strike="noStrike" spc="-1">
-                <a:solidFill>
-                  <a:srgbClr val="000000"/>
-                </a:solidFill>
-                <a:uFill>
-                  <a:solidFill>
-                    <a:srgbClr val="FFFFFF"/>
-                  </a:solidFill>
-                </a:uFill>
-                <a:latin typeface="Arial"/>
-              </a:rPr>
-              <a:t>Oztoprak, Oguz (TUM) | Droll, Darwin (TUM) | Python-based Paraview postprocessing</a:t>
-            </a:r>
-            <a:endParaRPr lang="de-DE" sz="1200" b="0" strike="noStrike" spc="-1">
+              <a:rPr lang="de-DE" sz="1200" b="0" strike="noStrike" spc="-1" dirty="0">
+                <a:solidFill>
+                  <a:srgbClr val="000000"/>
+                </a:solidFill>
+                <a:uFill>
+                  <a:solidFill>
+                    <a:srgbClr val="FFFFFF"/>
+                  </a:solidFill>
+                </a:uFill>
+                <a:latin typeface="Arial"/>
+              </a:rPr>
+              <a:t>Oztoprak, Oguz (TUM) | Droll, Darwin (TUM) | Python-</a:t>
+            </a:r>
+            <a:r>
+              <a:rPr lang="de-DE" sz="1200" b="0" strike="noStrike" spc="-1" dirty="0" err="1">
+                <a:solidFill>
+                  <a:srgbClr val="000000"/>
+                </a:solidFill>
+                <a:uFill>
+                  <a:solidFill>
+                    <a:srgbClr val="FFFFFF"/>
+                  </a:solidFill>
+                </a:uFill>
+                <a:latin typeface="Arial"/>
+              </a:rPr>
+              <a:t>based</a:t>
+            </a:r>
+            <a:r>
+              <a:rPr lang="de-DE" sz="1200" b="0" strike="noStrike" spc="-1" dirty="0">
+                <a:solidFill>
+                  <a:srgbClr val="000000"/>
+                </a:solidFill>
+                <a:uFill>
+                  <a:solidFill>
+                    <a:srgbClr val="FFFFFF"/>
+                  </a:solidFill>
+                </a:uFill>
+                <a:latin typeface="Arial"/>
+              </a:rPr>
+              <a:t> </a:t>
+            </a:r>
+            <a:r>
+              <a:rPr lang="de-DE" sz="1200" b="0" strike="noStrike" spc="-1" dirty="0" err="1">
+                <a:solidFill>
+                  <a:srgbClr val="000000"/>
+                </a:solidFill>
+                <a:uFill>
+                  <a:solidFill>
+                    <a:srgbClr val="FFFFFF"/>
+                  </a:solidFill>
+                </a:uFill>
+                <a:latin typeface="Arial"/>
+              </a:rPr>
+              <a:t>Paraview</a:t>
+            </a:r>
+            <a:r>
+              <a:rPr lang="de-DE" sz="1200" b="0" strike="noStrike" spc="-1" dirty="0">
+                <a:solidFill>
+                  <a:srgbClr val="000000"/>
+                </a:solidFill>
+                <a:uFill>
+                  <a:solidFill>
+                    <a:srgbClr val="FFFFFF"/>
+                  </a:solidFill>
+                </a:uFill>
+                <a:latin typeface="Arial"/>
+              </a:rPr>
+              <a:t> </a:t>
+            </a:r>
+            <a:r>
+              <a:rPr lang="de-DE" sz="1200" b="0" strike="noStrike" spc="-1" dirty="0" err="1">
+                <a:solidFill>
+                  <a:srgbClr val="000000"/>
+                </a:solidFill>
+                <a:uFill>
+                  <a:solidFill>
+                    <a:srgbClr val="FFFFFF"/>
+                  </a:solidFill>
+                </a:uFill>
+                <a:latin typeface="Arial"/>
+              </a:rPr>
+              <a:t>postprocessing</a:t>
+            </a:r>
+            <a:endParaRPr lang="de-DE" sz="1200" b="0" strike="noStrike" spc="-1" dirty="0">
               <a:solidFill>
                 <a:srgbClr val="000000"/>
               </a:solidFill>
@@ -6780,20 +6906,90 @@
               </a:lnSpc>
             </a:pPr>
             <a:r>
-              <a:rPr lang="de-DE" sz="1200" b="0" strike="noStrike" spc="-1">
-                <a:solidFill>
-                  <a:srgbClr val="000000"/>
-                </a:solidFill>
-                <a:uFill>
-                  <a:solidFill>
-                    <a:srgbClr val="FFFFFF"/>
-                  </a:solidFill>
-                </a:uFill>
-                <a:latin typeface="Arial"/>
-              </a:rPr>
-              <a:t>Oztoprak, Oguz (TUM) | Droll, Darwin (TUM) | Python-based Paraview postprocessing</a:t>
-            </a:r>
-            <a:endParaRPr lang="de-DE" sz="1200" b="0" strike="noStrike" spc="-1">
+              <a:rPr lang="de-DE" sz="1200" b="0" strike="noStrike" spc="-1" dirty="0">
+                <a:solidFill>
+                  <a:srgbClr val="000000"/>
+                </a:solidFill>
+                <a:uFill>
+                  <a:solidFill>
+                    <a:srgbClr val="FFFFFF"/>
+                  </a:solidFill>
+                </a:uFill>
+                <a:latin typeface="Arial"/>
+              </a:rPr>
+              <a:t>Oztoprak, Oguz (TUM) | Droll, Darwin (TUM) | Python-</a:t>
+            </a:r>
+            <a:r>
+              <a:rPr lang="de-DE" sz="1200" b="0" strike="noStrike" spc="-1" dirty="0" err="1">
+                <a:solidFill>
+                  <a:srgbClr val="000000"/>
+                </a:solidFill>
+                <a:uFill>
+                  <a:solidFill>
+                    <a:srgbClr val="FFFFFF"/>
+                  </a:solidFill>
+                </a:uFill>
+                <a:latin typeface="Arial"/>
+              </a:rPr>
+              <a:t>based</a:t>
+            </a:r>
+            <a:r>
+              <a:rPr lang="de-DE" sz="1200" b="0" strike="noStrike" spc="-1" dirty="0">
+                <a:solidFill>
+                  <a:srgbClr val="000000"/>
+                </a:solidFill>
+                <a:uFill>
+                  <a:solidFill>
+                    <a:srgbClr val="FFFFFF"/>
+                  </a:solidFill>
+                </a:uFill>
+                <a:latin typeface="Arial"/>
+              </a:rPr>
+              <a:t> </a:t>
+            </a:r>
+            <a:r>
+              <a:rPr lang="de-DE" sz="1200" b="0" strike="noStrike" spc="-1" dirty="0" err="1">
+                <a:solidFill>
+                  <a:srgbClr val="000000"/>
+                </a:solidFill>
+                <a:uFill>
+                  <a:solidFill>
+                    <a:srgbClr val="FFFFFF"/>
+                  </a:solidFill>
+                </a:uFill>
+                <a:latin typeface="Arial"/>
+              </a:rPr>
+              <a:t>Paraview</a:t>
+            </a:r>
+            <a:r>
+              <a:rPr lang="de-DE" sz="1200" b="0" strike="noStrike" spc="-1" dirty="0">
+                <a:solidFill>
+                  <a:srgbClr val="000000"/>
+                </a:solidFill>
+                <a:uFill>
+                  <a:solidFill>
+                    <a:srgbClr val="FFFFFF"/>
+                  </a:solidFill>
+                </a:uFill>
+                <a:latin typeface="Arial"/>
+              </a:rPr>
+              <a:t> </a:t>
+            </a:r>
+            <a:r>
+              <a:rPr lang="de-DE" sz="1200" b="0" strike="noStrike" spc="-1" dirty="0" err="1">
+                <a:solidFill>
+                  <a:srgbClr val="000000"/>
+                </a:solidFill>
+                <a:uFill>
+                  <a:solidFill>
+                    <a:srgbClr val="FFFFFF"/>
+                  </a:solidFill>
+                </a:uFill>
+                <a:latin typeface="Arial"/>
+              </a:rPr>
+              <a:t>postprocessing</a:t>
+            </a:r>
+            <a:endParaRPr lang="de-DE" sz="1200" b="0" strike="noStrike" spc="-1" dirty="0">
               <a:solidFill>
                 <a:srgbClr val="000000"/>
               </a:solidFill>
@@ -7059,7 +7255,7 @@
       </p:grpSpPr>
       <p:sp>
         <p:nvSpPr>
-          <p:cNvPr id="89" name="TextShape 1"/>
+          <p:cNvPr id="97" name="TextShape 1"/>
           <p:cNvSpPr txBox="1"/>
           <p:nvPr/>
         </p:nvSpPr>
@@ -7080,58 +7276,56 @@
           <a:bodyPr lIns="0" tIns="0" rIns="0" bIns="0"/>
           <a:lstStyle/>
           <a:p>
-            <a:pPr marL="286110" indent="-285750">
+            <a:pPr marL="342900" indent="-342900">
               <a:lnSpc>
-                <a:spcPct val="100000"/>
+                <a:spcPct val="114000"/>
               </a:lnSpc>
-              <a:buClr>
-                <a:srgbClr val="000000"/>
-              </a:buClr>
               <a:buFont typeface="Arial" panose="020B0604020202020204" pitchFamily="34" charset="0"/>
               <a:buChar char="•"/>
             </a:pPr>
             <a:r>
-              <a:rPr lang="en-US" sz="2200" spc="-1" dirty="0">
-                <a:solidFill>
-                  <a:srgbClr val="000000"/>
-                </a:solidFill>
-                <a:uFill>
-                  <a:solidFill>
-                    <a:srgbClr val="FFFFFF"/>
-                  </a:solidFill>
-                </a:uFill>
-                <a:latin typeface="Arial"/>
-              </a:rPr>
-              <a:t>Postprocessing for Paraview</a:t>
-            </a:r>
-          </a:p>
-          <a:p>
-            <a:pPr marL="286110" indent="-285750">
-              <a:buClr>
-                <a:srgbClr val="000000"/>
-              </a:buClr>
+              <a:rPr lang="en-US" sz="2200" b="0" strike="noStrike" spc="-1" dirty="0">
+                <a:solidFill>
+                  <a:srgbClr val="000000"/>
+                </a:solidFill>
+                <a:uFill>
+                  <a:solidFill>
+                    <a:srgbClr val="FFFFFF"/>
+                  </a:solidFill>
+                </a:uFill>
+                <a:latin typeface="Arial"/>
+              </a:rPr>
+              <a:t>Kitware</a:t>
+            </a:r>
+          </a:p>
+          <a:p>
+            <a:pPr marL="800100" lvl="1" indent="-342900">
+              <a:lnSpc>
+                <a:spcPct val="114000"/>
+              </a:lnSpc>
               <a:buFont typeface="Arial" panose="020B0604020202020204" pitchFamily="34" charset="0"/>
               <a:buChar char="•"/>
             </a:pPr>
             <a:r>
-              <a:rPr lang="en-US" sz="2200" spc="-1" dirty="0">
-                <a:solidFill>
-                  <a:srgbClr val="000000"/>
-                </a:solidFill>
-                <a:uFill>
-                  <a:solidFill>
-                    <a:srgbClr val="FFFFFF"/>
-                  </a:solidFill>
-                </a:uFill>
-              </a:rPr>
-              <a:t>Ubuntu (Linux)</a:t>
-            </a:r>
-          </a:p>
-          <a:p>
-            <a:pPr marL="743310" lvl="1" indent="-285750">
-              <a:buClr>
-                <a:srgbClr val="000000"/>
-              </a:buClr>
+              <a:rPr lang="en-US" sz="2200" b="0" strike="noStrike" spc="-1" dirty="0">
+                <a:solidFill>
+                  <a:srgbClr val="000000"/>
+                </a:solidFill>
+                <a:uFill>
+                  <a:solidFill>
+                    <a:srgbClr val="FFFFFF"/>
+                  </a:solidFill>
+                </a:uFill>
+                <a:latin typeface="Arial"/>
+              </a:rPr>
+              <a:t>Open Source</a:t>
+            </a:r>
+          </a:p>
+          <a:p>
+            <a:pPr marL="800100" lvl="1" indent="-342900">
+              <a:lnSpc>
+                <a:spcPct val="114000"/>
+              </a:lnSpc>
               <a:buFont typeface="Arial" panose="020B0604020202020204" pitchFamily="34" charset="0"/>
               <a:buChar char="•"/>
             </a:pPr>
@@ -7145,10 +7339,11 @@
                     <a:srgbClr val="FFFFFF"/>
                   </a:solidFill>
                 </a:uFill>
-              </a:rPr>
-              <a:t>GIT</a:t>
-            </a:r>
-            <a:endParaRPr lang="en-US" sz="2200" spc="-1" dirty="0">
+                <a:latin typeface="Arial"/>
+              </a:rPr>
+              <a:t>Visualization</a:t>
+            </a:r>
+            <a:endParaRPr lang="en-US" sz="2200" b="0" strike="noStrike" spc="-1" dirty="0">
               <a:solidFill>
                 <a:srgbClr val="000000"/>
               </a:solidFill>
@@ -7161,13 +7356,10 @@
             </a:endParaRPr>
           </a:p>
           <a:p>
-            <a:pPr marL="286110" indent="-285750">
+            <a:pPr marL="342900" indent="-342900">
               <a:lnSpc>
-                <a:spcPct val="100000"/>
+                <a:spcPct val="114000"/>
               </a:lnSpc>
-              <a:buClr>
-                <a:srgbClr val="000000"/>
-              </a:buClr>
               <a:buFont typeface="Arial" panose="020B0604020202020204" pitchFamily="34" charset="0"/>
               <a:buChar char="•"/>
             </a:pPr>
@@ -7183,14 +7375,14 @@
                 </a:uFill>
                 <a:latin typeface="Arial"/>
               </a:rPr>
-              <a:t>Python plugin</a:t>
-            </a:r>
-          </a:p>
-          <a:p>
-            <a:pPr marL="743310" lvl="1" indent="-285750">
-              <a:buClr>
-                <a:srgbClr val="000000"/>
-              </a:buClr>
+              <a:t>Python Shell</a:t>
+            </a:r>
+          </a:p>
+          <a:p>
+            <a:pPr marL="800100" lvl="1" indent="-342900">
+              <a:lnSpc>
+                <a:spcPct val="114000"/>
+              </a:lnSpc>
               <a:buFont typeface="Arial" panose="020B0604020202020204" pitchFamily="34" charset="0"/>
               <a:buChar char="•"/>
             </a:pPr>
@@ -7206,17 +7398,14 @@
                 </a:uFill>
                 <a:latin typeface="Arial"/>
               </a:rPr>
-              <a:t>Selection of cells/ areas</a:t>
-            </a:r>
-          </a:p>
-          <a:p>
-            <a:pPr marL="286110" indent="-285750">
+              <a:t>Paraview simple module</a:t>
+            </a:r>
+          </a:p>
+          <a:p>
+            <a:pPr marL="342900" indent="-342900">
               <a:lnSpc>
-                <a:spcPct val="100000"/>
+                <a:spcPct val="114000"/>
               </a:lnSpc>
-              <a:buClr>
-                <a:srgbClr val="000000"/>
-              </a:buClr>
               <a:buFont typeface="Arial" panose="020B0604020202020204" pitchFamily="34" charset="0"/>
               <a:buChar char="•"/>
             </a:pPr>
@@ -7230,10 +7419,191 @@
                     <a:srgbClr val="FFFFFF"/>
                   </a:solidFill>
                 </a:uFill>
-                <a:latin typeface="Arial"/>
-              </a:rPr>
-              <a:t>Distribution to an existing Program (AdhoC++)</a:t>
-            </a:r>
+              </a:rPr>
+              <a:t>VTK-Files </a:t>
+            </a:r>
+          </a:p>
+          <a:p>
+            <a:pPr marL="800100" lvl="1" indent="-342900">
+              <a:lnSpc>
+                <a:spcPct val="114000"/>
+              </a:lnSpc>
+              <a:buFont typeface="Arial" panose="020B0604020202020204" pitchFamily="34" charset="0"/>
+              <a:buChar char="•"/>
+            </a:pPr>
+            <a:r>
+              <a:rPr lang="en-US" sz="2200" spc="-1" dirty="0">
+                <a:solidFill>
+                  <a:srgbClr val="000000"/>
+                </a:solidFill>
+                <a:uFill>
+                  <a:solidFill>
+                    <a:srgbClr val="FFFFFF"/>
+                  </a:solidFill>
+                </a:uFill>
+              </a:rPr>
+              <a:t>(</a:t>
+            </a:r>
+            <a:r>
+              <a:rPr lang="en-US" sz="2200" b="1" spc="-1" dirty="0">
+                <a:solidFill>
+                  <a:srgbClr val="000000"/>
+                </a:solidFill>
+                <a:uFill>
+                  <a:solidFill>
+                    <a:srgbClr val="FFFFFF"/>
+                  </a:solidFill>
+                </a:uFill>
+              </a:rPr>
+              <a:t>V</a:t>
+            </a:r>
+            <a:r>
+              <a:rPr lang="en-US" sz="2200" spc="-1" dirty="0">
+                <a:solidFill>
+                  <a:srgbClr val="000000"/>
+                </a:solidFill>
+                <a:uFill>
+                  <a:solidFill>
+                    <a:srgbClr val="FFFFFF"/>
+                  </a:solidFill>
+                </a:uFill>
+              </a:rPr>
+              <a:t>isualization </a:t>
+            </a:r>
+            <a:r>
+              <a:rPr lang="en-US" sz="2200" b="1" spc="-1" dirty="0">
+                <a:solidFill>
+                  <a:srgbClr val="000000"/>
+                </a:solidFill>
+                <a:uFill>
+                  <a:solidFill>
+                    <a:srgbClr val="FFFFFF"/>
+                  </a:solidFill>
+                </a:uFill>
+              </a:rPr>
+              <a:t>T</a:t>
+            </a:r>
+            <a:r>
+              <a:rPr lang="en-US" sz="2200" spc="-1" dirty="0">
+                <a:solidFill>
+                  <a:srgbClr val="000000"/>
+                </a:solidFill>
+                <a:uFill>
+                  <a:solidFill>
+                    <a:srgbClr val="FFFFFF"/>
+                  </a:solidFill>
+                </a:uFill>
+              </a:rPr>
+              <a:t>ool</a:t>
+            </a:r>
+            <a:r>
+              <a:rPr lang="en-US" sz="2200" b="1" spc="-1" dirty="0">
+                <a:solidFill>
+                  <a:srgbClr val="000000"/>
+                </a:solidFill>
+                <a:uFill>
+                  <a:solidFill>
+                    <a:srgbClr val="FFFFFF"/>
+                  </a:solidFill>
+                </a:uFill>
+              </a:rPr>
+              <a:t>k</a:t>
+            </a:r>
+            <a:r>
+              <a:rPr lang="en-US" sz="2200" spc="-1" dirty="0">
+                <a:solidFill>
+                  <a:srgbClr val="000000"/>
+                </a:solidFill>
+                <a:uFill>
+                  <a:solidFill>
+                    <a:srgbClr val="FFFFFF"/>
+                  </a:solidFill>
+                </a:uFill>
+              </a:rPr>
+              <a:t>it)</a:t>
+            </a:r>
+          </a:p>
+          <a:p>
+            <a:pPr marL="800100" lvl="1" indent="-342900">
+              <a:lnSpc>
+                <a:spcPct val="114000"/>
+              </a:lnSpc>
+              <a:buFont typeface="Arial" panose="020B0604020202020204" pitchFamily="34" charset="0"/>
+              <a:buChar char="•"/>
+            </a:pPr>
+            <a:r>
+              <a:rPr lang="en-US" sz="2200" spc="-1" dirty="0">
+                <a:solidFill>
+                  <a:srgbClr val="000000"/>
+                </a:solidFill>
+                <a:uFill>
+                  <a:solidFill>
+                    <a:srgbClr val="FFFFFF"/>
+                  </a:solidFill>
+                </a:uFill>
+              </a:rPr>
+              <a:t>XML-structure</a:t>
+            </a:r>
+          </a:p>
+          <a:p>
+            <a:pPr marL="800100" lvl="1" indent="-342900">
+              <a:lnSpc>
+                <a:spcPct val="114000"/>
+              </a:lnSpc>
+              <a:buFont typeface="Arial" panose="020B0604020202020204" pitchFamily="34" charset="0"/>
+              <a:buChar char="•"/>
+            </a:pPr>
+            <a:endParaRPr lang="en-US" sz="2200" spc="-1" dirty="0">
+              <a:solidFill>
+                <a:srgbClr val="000000"/>
+              </a:solidFill>
+              <a:uFill>
+                <a:solidFill>
+                  <a:srgbClr val="FFFFFF"/>
+                </a:solidFill>
+              </a:uFill>
+              <a:latin typeface="Arial"/>
+            </a:endParaRPr>
+          </a:p>
+          <a:p>
+            <a:pPr marL="800100" lvl="1" indent="-342900">
+              <a:lnSpc>
+                <a:spcPct val="114000"/>
+              </a:lnSpc>
+              <a:buFont typeface="Arial" panose="020B0604020202020204" pitchFamily="34" charset="0"/>
+              <a:buChar char="•"/>
+            </a:pPr>
+            <a:endParaRPr lang="en-US" sz="2200" b="0" strike="noStrike" spc="-1" dirty="0">
+              <a:solidFill>
+                <a:srgbClr val="000000"/>
+              </a:solidFill>
+              <a:uFill>
+                <a:solidFill>
+                  <a:srgbClr val="FFFFFF"/>
+                </a:solidFill>
+              </a:uFill>
+              <a:latin typeface="Arial"/>
+            </a:endParaRPr>
+          </a:p>
+          <a:p>
+            <a:pPr marL="342900" indent="-342900">
+              <a:lnSpc>
+                <a:spcPct val="114000"/>
+              </a:lnSpc>
+              <a:buFont typeface="Arial" panose="020B0604020202020204" pitchFamily="34" charset="0"/>
+              <a:buChar char="•"/>
+            </a:pPr>
+            <a:endParaRPr lang="en-US" sz="1600" b="0" strike="noStrike" spc="-1" dirty="0">
+              <a:solidFill>
+                <a:srgbClr val="000000"/>
+              </a:solidFill>
+              <a:uFill>
+                <a:solidFill>
+                  <a:srgbClr val="FFFFFF"/>
+                </a:solidFill>
+              </a:uFill>
+              <a:latin typeface="Arial"/>
+            </a:endParaRPr>
           </a:p>
           <a:p>
             <a:pPr>
@@ -7253,11 +7623,47 @@
               <a:latin typeface="Arial"/>
             </a:endParaRPr>
           </a:p>
-        </p:txBody>
-      </p:sp>
-      <p:sp>
-        <p:nvSpPr>
-          <p:cNvPr id="90" name="TextShape 2"/>
+          <a:p>
+            <a:pPr>
+              <a:lnSpc>
+                <a:spcPct val="114000"/>
+              </a:lnSpc>
+            </a:pPr>
+            <a:endParaRPr lang="de-DE" sz="1600" b="0" strike="noStrike" spc="-1" dirty="0">
+              <a:solidFill>
+                <a:srgbClr val="000000"/>
+              </a:solidFill>
+              <a:uFill>
+                <a:solidFill>
+                  <a:srgbClr val="FFFFFF"/>
+                </a:solidFill>
+              </a:uFill>
+              <a:latin typeface="Arial"/>
+            </a:endParaRPr>
+          </a:p>
+          <a:p>
+            <a:pPr>
+              <a:lnSpc>
+                <a:spcPct val="114000"/>
+              </a:lnSpc>
+            </a:pPr>
+            <a:endParaRPr lang="de-DE" sz="1600" b="0" strike="noStrike" spc="-1" dirty="0">
+              <a:solidFill>
+                <a:srgbClr val="000000"/>
+              </a:solidFill>
+              <a:uFill>
+                <a:solidFill>
+                  <a:srgbClr val="FFFFFF"/>
+                </a:solidFill>
+              </a:uFill>
+              <a:latin typeface="Arial"/>
+            </a:endParaRPr>
+          </a:p>
+        </p:txBody>
+      </p:sp>
+      <p:sp>
+        <p:nvSpPr>
+          <p:cNvPr id="98" name="TextShape 2"/>
           <p:cNvSpPr txBox="1"/>
           <p:nvPr/>
         </p:nvSpPr>
@@ -7283,7 +7689,7 @@
                 <a:spcPct val="100000"/>
               </a:lnSpc>
             </a:pPr>
-            <a:fld id="{4F831EE4-46AE-4713-AD1F-E57479484FF3}" type="slidenum">
+            <a:fld id="{6C6E63D9-56E4-4498-8999-7626C6F08C51}" type="slidenum">
               <a:rPr lang="de-DE" sz="1200" b="0" strike="noStrike" spc="-1">
                 <a:solidFill>
                   <a:srgbClr val="000000"/>
@@ -7313,7 +7719,7 @@
       </p:sp>
       <p:sp>
         <p:nvSpPr>
-          <p:cNvPr id="91" name="TextShape 3"/>
+          <p:cNvPr id="99" name="TextShape 3"/>
           <p:cNvSpPr txBox="1"/>
           <p:nvPr/>
         </p:nvSpPr>
@@ -7340,20 +7746,90 @@
               </a:lnSpc>
             </a:pPr>
             <a:r>
-              <a:rPr lang="de-DE" sz="1200" b="0" strike="noStrike" spc="-1">
-                <a:solidFill>
-                  <a:srgbClr val="000000"/>
-                </a:solidFill>
-                <a:uFill>
-                  <a:solidFill>
-                    <a:srgbClr val="FFFFFF"/>
-                  </a:solidFill>
-                </a:uFill>
-                <a:latin typeface="Arial"/>
-              </a:rPr>
-              <a:t>Oztoprak, Oguz (TUM) | Droll, Darwin (TUM) | Python-based Paraview postprocessing</a:t>
-            </a:r>
-            <a:endParaRPr lang="de-DE" sz="1200" b="0" strike="noStrike" spc="-1">
+              <a:rPr lang="de-DE" sz="1200" b="0" strike="noStrike" spc="-1" dirty="0">
+                <a:solidFill>
+                  <a:srgbClr val="000000"/>
+                </a:solidFill>
+                <a:uFill>
+                  <a:solidFill>
+                    <a:srgbClr val="FFFFFF"/>
+                  </a:solidFill>
+                </a:uFill>
+                <a:latin typeface="Arial"/>
+              </a:rPr>
+              <a:t>Oztoprak, Oguz (TUM) | Droll, Darwin (TUM) | Python-</a:t>
+            </a:r>
+            <a:r>
+              <a:rPr lang="de-DE" sz="1200" b="0" strike="noStrike" spc="-1" dirty="0" err="1">
+                <a:solidFill>
+                  <a:srgbClr val="000000"/>
+                </a:solidFill>
+                <a:uFill>
+                  <a:solidFill>
+                    <a:srgbClr val="FFFFFF"/>
+                  </a:solidFill>
+                </a:uFill>
+                <a:latin typeface="Arial"/>
+              </a:rPr>
+              <a:t>based</a:t>
+            </a:r>
+            <a:r>
+              <a:rPr lang="de-DE" sz="1200" b="0" strike="noStrike" spc="-1" dirty="0">
+                <a:solidFill>
+                  <a:srgbClr val="000000"/>
+                </a:solidFill>
+                <a:uFill>
+                  <a:solidFill>
+                    <a:srgbClr val="FFFFFF"/>
+                  </a:solidFill>
+                </a:uFill>
+                <a:latin typeface="Arial"/>
+              </a:rPr>
+              <a:t> </a:t>
+            </a:r>
+            <a:r>
+              <a:rPr lang="de-DE" sz="1200" b="0" strike="noStrike" spc="-1" dirty="0" err="1">
+                <a:solidFill>
+                  <a:srgbClr val="000000"/>
+                </a:solidFill>
+                <a:uFill>
+                  <a:solidFill>
+                    <a:srgbClr val="FFFFFF"/>
+                  </a:solidFill>
+                </a:uFill>
+                <a:latin typeface="Arial"/>
+              </a:rPr>
+              <a:t>Paraview</a:t>
+            </a:r>
+            <a:r>
+              <a:rPr lang="de-DE" sz="1200" b="0" strike="noStrike" spc="-1" dirty="0">
+                <a:solidFill>
+                  <a:srgbClr val="000000"/>
+                </a:solidFill>
+                <a:uFill>
+                  <a:solidFill>
+                    <a:srgbClr val="FFFFFF"/>
+                  </a:solidFill>
+                </a:uFill>
+                <a:latin typeface="Arial"/>
+              </a:rPr>
+              <a:t> </a:t>
+            </a:r>
+            <a:r>
+              <a:rPr lang="de-DE" sz="1200" b="0" strike="noStrike" spc="-1" dirty="0" err="1">
+                <a:solidFill>
+                  <a:srgbClr val="000000"/>
+                </a:solidFill>
+                <a:uFill>
+                  <a:solidFill>
+                    <a:srgbClr val="FFFFFF"/>
+                  </a:solidFill>
+                </a:uFill>
+                <a:latin typeface="Arial"/>
+              </a:rPr>
+              <a:t>postprocessing</a:t>
+            </a:r>
+            <a:endParaRPr lang="de-DE" sz="1200" b="0" strike="noStrike" spc="-1" dirty="0">
               <a:solidFill>
                 <a:srgbClr val="000000"/>
               </a:solidFill>
@@ -7369,7 +7845,7 @@
       </p:sp>
       <p:sp>
         <p:nvSpPr>
-          <p:cNvPr id="92" name="TextShape 4"/>
+          <p:cNvPr id="100" name="TextShape 4"/>
           <p:cNvSpPr txBox="1"/>
           <p:nvPr/>
         </p:nvSpPr>
@@ -7407,7 +7883,7 @@
                 </a:uFill>
                 <a:latin typeface="Arial"/>
               </a:rPr>
-              <a:t>Task</a:t>
+              <a:t>Paraview</a:t>
             </a:r>
             <a:endParaRPr lang="en-US" sz="2200" b="0" strike="noStrike" spc="-1" dirty="0">
               <a:solidFill>
@@ -7423,12 +7899,78 @@
           </a:p>
         </p:txBody>
       </p:sp>
+      <p:pic>
+        <p:nvPicPr>
+          <p:cNvPr id="3" name="Grafik 2">
+            <a:extLst>
+              <a:ext uri="{FF2B5EF4-FFF2-40B4-BE49-F238E27FC236}">
+                <a16:creationId xmlns:a16="http://schemas.microsoft.com/office/drawing/2014/main" id="{01B43783-FD1B-4DC2-83EB-1B89E56BD126}"/>
+              </a:ext>
+            </a:extLst>
+          </p:cNvPr>
+          <p:cNvPicPr>
+            <a:picLocks noChangeAspect="1"/>
+          </p:cNvPicPr>
+          <p:nvPr/>
+        </p:nvPicPr>
+        <p:blipFill>
+          <a:blip r:embed="rId2">
+            <a:extLst>
+              <a:ext uri="{28A0092B-C50C-407E-A947-70E740481C1C}">
+                <a14:useLocalDpi xmlns:a14="http://schemas.microsoft.com/office/drawing/2010/main" val="0"/>
+              </a:ext>
+            </a:extLst>
+          </a:blip>
+          <a:stretch>
+            <a:fillRect/>
+          </a:stretch>
+        </p:blipFill>
+        <p:spPr>
+          <a:xfrm>
+            <a:off x="4570837" y="1762200"/>
+            <a:ext cx="4255643" cy="2541461"/>
+          </a:xfrm>
+          <a:prstGeom prst="rect">
+            <a:avLst/>
+          </a:prstGeom>
+        </p:spPr>
+      </p:pic>
+      <p:sp>
+        <p:nvSpPr>
+          <p:cNvPr id="8" name="Textfeld 7">
+            <a:extLst>
+              <a:ext uri="{FF2B5EF4-FFF2-40B4-BE49-F238E27FC236}">
+                <a16:creationId xmlns:a16="http://schemas.microsoft.com/office/drawing/2014/main" id="{82FE7971-4F54-43AF-8936-D5B70AA7EEE1}"/>
+              </a:ext>
+            </a:extLst>
+          </p:cNvPr>
+          <p:cNvSpPr txBox="1"/>
+          <p:nvPr/>
+        </p:nvSpPr>
+        <p:spPr>
+          <a:xfrm>
+            <a:off x="4570837" y="4430669"/>
+            <a:ext cx="3881947" cy="230832"/>
+          </a:xfrm>
+          <a:prstGeom prst="rect">
+            <a:avLst/>
+          </a:prstGeom>
+          <a:noFill/>
+        </p:spPr>
+        <p:txBody>
+          <a:bodyPr wrap="square" rtlCol="0">
+            <a:spAutoFit/>
+          </a:bodyPr>
+          <a:lstStyle/>
+          <a:p>
+            <a:r>
+              <a:rPr lang="en-GB" sz="900" dirty="0"/>
+              <a:t>Source: Screenshot from Paraview</a:t>
+            </a:r>
+          </a:p>
+        </p:txBody>
+      </p:sp>
     </p:spTree>
-    <p:extLst>
-      <p:ext uri="{BB962C8B-B14F-4D97-AF65-F5344CB8AC3E}">
-        <p14:creationId xmlns:p14="http://schemas.microsoft.com/office/powerpoint/2010/main" val="853532261"/>
-      </p:ext>
-    </p:extLst>
   </p:cSld>
   <p:clrMapOvr>
     <a:masterClrMapping/>
@@ -7482,415 +8024,7 @@
       </p:grpSpPr>
       <p:sp>
         <p:nvSpPr>
-          <p:cNvPr id="97" name="TextShape 1"/>
-          <p:cNvSpPr txBox="1"/>
-          <p:nvPr/>
-        </p:nvSpPr>
-        <p:spPr>
-          <a:xfrm>
-            <a:off x="318960" y="1762200"/>
-            <a:ext cx="8508600" cy="4699080"/>
-          </a:xfrm>
-          <a:prstGeom prst="rect">
-            <a:avLst/>
-          </a:prstGeom>
-          <a:noFill/>
-          <a:ln w="9360">
-            <a:noFill/>
-          </a:ln>
-        </p:spPr>
-        <p:txBody>
-          <a:bodyPr lIns="0" tIns="0" rIns="0" bIns="0"/>
-          <a:lstStyle/>
-          <a:p>
-            <a:pPr marL="342900" indent="-342900">
-              <a:lnSpc>
-                <a:spcPct val="114000"/>
-              </a:lnSpc>
-              <a:buFont typeface="Arial" panose="020B0604020202020204" pitchFamily="34" charset="0"/>
-              <a:buChar char="•"/>
-            </a:pPr>
-            <a:r>
-              <a:rPr lang="en-US" sz="2200" b="0" strike="noStrike" spc="-1" dirty="0">
-                <a:solidFill>
-                  <a:srgbClr val="000000"/>
-                </a:solidFill>
-                <a:uFill>
-                  <a:solidFill>
-                    <a:srgbClr val="FFFFFF"/>
-                  </a:solidFill>
-                </a:uFill>
-                <a:latin typeface="Arial"/>
-              </a:rPr>
-              <a:t>Kitware</a:t>
-            </a:r>
-          </a:p>
-          <a:p>
-            <a:pPr marL="800100" lvl="1" indent="-342900">
-              <a:lnSpc>
-                <a:spcPct val="114000"/>
-              </a:lnSpc>
-              <a:buFont typeface="Arial" panose="020B0604020202020204" pitchFamily="34" charset="0"/>
-              <a:buChar char="•"/>
-            </a:pPr>
-            <a:r>
-              <a:rPr lang="en-US" sz="2200" b="0" strike="noStrike" spc="-1" dirty="0">
-                <a:solidFill>
-                  <a:srgbClr val="000000"/>
-                </a:solidFill>
-                <a:uFill>
-                  <a:solidFill>
-                    <a:srgbClr val="FFFFFF"/>
-                  </a:solidFill>
-                </a:uFill>
-                <a:latin typeface="Arial"/>
-              </a:rPr>
-              <a:t>Open Source</a:t>
-            </a:r>
-          </a:p>
-          <a:p>
-            <a:pPr marL="800100" lvl="1" indent="-342900">
-              <a:lnSpc>
-                <a:spcPct val="114000"/>
-              </a:lnSpc>
-              <a:buFont typeface="Arial" panose="020B0604020202020204" pitchFamily="34" charset="0"/>
-              <a:buChar char="•"/>
-            </a:pPr>
-            <a:r>
-              <a:rPr lang="en-US" sz="2200" spc="-1" dirty="0">
-                <a:solidFill>
-                  <a:srgbClr val="000000"/>
-                </a:solidFill>
-                <a:uFill>
-                  <a:solidFill>
-                    <a:srgbClr val="FFFFFF"/>
-                  </a:solidFill>
-                </a:uFill>
-                <a:latin typeface="Arial"/>
-              </a:rPr>
-              <a:t>Visualization</a:t>
-            </a:r>
-            <a:endParaRPr lang="en-US" sz="2200" b="0" strike="noStrike" spc="-1" dirty="0">
-              <a:solidFill>
-                <a:srgbClr val="000000"/>
-              </a:solidFill>
-              <a:uFill>
-                <a:solidFill>
-                  <a:srgbClr val="FFFFFF"/>
-                </a:solidFill>
-              </a:uFill>
-              <a:latin typeface="Arial"/>
-            </a:endParaRPr>
-          </a:p>
-          <a:p>
-            <a:pPr marL="342900" indent="-342900">
-              <a:lnSpc>
-                <a:spcPct val="114000"/>
-              </a:lnSpc>
-              <a:buFont typeface="Arial" panose="020B0604020202020204" pitchFamily="34" charset="0"/>
-              <a:buChar char="•"/>
-            </a:pPr>
-            <a:r>
-              <a:rPr lang="en-US" sz="2200" spc="-1" dirty="0">
-                <a:solidFill>
-                  <a:srgbClr val="000000"/>
-                </a:solidFill>
-                <a:uFill>
-                  <a:solidFill>
-                    <a:srgbClr val="FFFFFF"/>
-                  </a:solidFill>
-                </a:uFill>
-                <a:latin typeface="Arial"/>
-              </a:rPr>
-              <a:t>Python Shell</a:t>
-            </a:r>
-          </a:p>
-          <a:p>
-            <a:pPr marL="800100" lvl="1" indent="-342900">
-              <a:lnSpc>
-                <a:spcPct val="114000"/>
-              </a:lnSpc>
-              <a:buFont typeface="Arial" panose="020B0604020202020204" pitchFamily="34" charset="0"/>
-              <a:buChar char="•"/>
-            </a:pPr>
-            <a:r>
-              <a:rPr lang="en-US" sz="2200" spc="-1" dirty="0">
-                <a:solidFill>
-                  <a:srgbClr val="000000"/>
-                </a:solidFill>
-                <a:uFill>
-                  <a:solidFill>
-                    <a:srgbClr val="FFFFFF"/>
-                  </a:solidFill>
-                </a:uFill>
-                <a:latin typeface="Arial"/>
-              </a:rPr>
-              <a:t>Paraview simple module</a:t>
-            </a:r>
-          </a:p>
-          <a:p>
-            <a:pPr marL="342900" indent="-342900">
-              <a:lnSpc>
-                <a:spcPct val="114000"/>
-              </a:lnSpc>
-              <a:buFont typeface="Arial" panose="020B0604020202020204" pitchFamily="34" charset="0"/>
-              <a:buChar char="•"/>
-            </a:pPr>
-            <a:r>
-              <a:rPr lang="en-US" sz="2200" spc="-1" dirty="0">
-                <a:solidFill>
-                  <a:srgbClr val="000000"/>
-                </a:solidFill>
-                <a:uFill>
-                  <a:solidFill>
-                    <a:srgbClr val="FFFFFF"/>
-                  </a:solidFill>
-                </a:uFill>
-              </a:rPr>
-              <a:t>VTK-Files </a:t>
-            </a:r>
-          </a:p>
-          <a:p>
-            <a:pPr marL="800100" lvl="1" indent="-342900">
-              <a:lnSpc>
-                <a:spcPct val="114000"/>
-              </a:lnSpc>
-              <a:buFont typeface="Arial" panose="020B0604020202020204" pitchFamily="34" charset="0"/>
-              <a:buChar char="•"/>
-            </a:pPr>
-            <a:r>
-              <a:rPr lang="en-US" sz="2200" spc="-1" dirty="0">
-                <a:solidFill>
-                  <a:srgbClr val="000000"/>
-                </a:solidFill>
-                <a:uFill>
-                  <a:solidFill>
-                    <a:srgbClr val="FFFFFF"/>
-                  </a:solidFill>
-                </a:uFill>
-              </a:rPr>
-              <a:t>(</a:t>
-            </a:r>
-            <a:r>
-              <a:rPr lang="en-US" sz="2200" b="1" spc="-1" dirty="0">
-                <a:solidFill>
-                  <a:srgbClr val="000000"/>
-                </a:solidFill>
-                <a:uFill>
-                  <a:solidFill>
-                    <a:srgbClr val="FFFFFF"/>
-                  </a:solidFill>
-                </a:uFill>
-              </a:rPr>
-              <a:t>V</a:t>
-            </a:r>
-            <a:r>
-              <a:rPr lang="en-US" sz="2200" spc="-1" dirty="0">
-                <a:solidFill>
-                  <a:srgbClr val="000000"/>
-                </a:solidFill>
-                <a:uFill>
-                  <a:solidFill>
-                    <a:srgbClr val="FFFFFF"/>
-                  </a:solidFill>
-                </a:uFill>
-              </a:rPr>
-              <a:t>isualization </a:t>
-            </a:r>
-            <a:r>
-              <a:rPr lang="en-US" sz="2200" b="1" spc="-1" dirty="0">
-                <a:solidFill>
-                  <a:srgbClr val="000000"/>
-                </a:solidFill>
-                <a:uFill>
-                  <a:solidFill>
-                    <a:srgbClr val="FFFFFF"/>
-                  </a:solidFill>
-                </a:uFill>
-              </a:rPr>
-              <a:t>T</a:t>
-            </a:r>
-            <a:r>
-              <a:rPr lang="en-US" sz="2200" spc="-1" dirty="0">
-                <a:solidFill>
-                  <a:srgbClr val="000000"/>
-                </a:solidFill>
-                <a:uFill>
-                  <a:solidFill>
-                    <a:srgbClr val="FFFFFF"/>
-                  </a:solidFill>
-                </a:uFill>
-              </a:rPr>
-              <a:t>ool</a:t>
-            </a:r>
-            <a:r>
-              <a:rPr lang="en-US" sz="2200" b="1" spc="-1" dirty="0">
-                <a:solidFill>
-                  <a:srgbClr val="000000"/>
-                </a:solidFill>
-                <a:uFill>
-                  <a:solidFill>
-                    <a:srgbClr val="FFFFFF"/>
-                  </a:solidFill>
-                </a:uFill>
-              </a:rPr>
-              <a:t>k</a:t>
-            </a:r>
-            <a:r>
-              <a:rPr lang="en-US" sz="2200" spc="-1" dirty="0">
-                <a:solidFill>
-                  <a:srgbClr val="000000"/>
-                </a:solidFill>
-                <a:uFill>
-                  <a:solidFill>
-                    <a:srgbClr val="FFFFFF"/>
-                  </a:solidFill>
-                </a:uFill>
-              </a:rPr>
-              <a:t>it)</a:t>
-            </a:r>
-          </a:p>
-          <a:p>
-            <a:pPr marL="800100" lvl="1" indent="-342900">
-              <a:lnSpc>
-                <a:spcPct val="114000"/>
-              </a:lnSpc>
-              <a:buFont typeface="Arial" panose="020B0604020202020204" pitchFamily="34" charset="0"/>
-              <a:buChar char="•"/>
-            </a:pPr>
-            <a:r>
-              <a:rPr lang="en-US" sz="2200" spc="-1" dirty="0">
-                <a:solidFill>
-                  <a:srgbClr val="000000"/>
-                </a:solidFill>
-                <a:uFill>
-                  <a:solidFill>
-                    <a:srgbClr val="FFFFFF"/>
-                  </a:solidFill>
-                </a:uFill>
-              </a:rPr>
-              <a:t>XML-structure</a:t>
-            </a:r>
-          </a:p>
-          <a:p>
-            <a:pPr marL="800100" lvl="1" indent="-342900">
-              <a:lnSpc>
-                <a:spcPct val="114000"/>
-              </a:lnSpc>
-              <a:buFont typeface="Arial" panose="020B0604020202020204" pitchFamily="34" charset="0"/>
-              <a:buChar char="•"/>
-            </a:pPr>
-            <a:endParaRPr lang="en-US" sz="2200" spc="-1" dirty="0">
-              <a:solidFill>
-                <a:srgbClr val="000000"/>
-              </a:solidFill>
-              <a:uFill>
-                <a:solidFill>
-                  <a:srgbClr val="FFFFFF"/>
-                </a:solidFill>
-              </a:uFill>
-              <a:latin typeface="Arial"/>
-            </a:endParaRPr>
-          </a:p>
-          <a:p>
-            <a:pPr marL="800100" lvl="1" indent="-342900">
-              <a:lnSpc>
-                <a:spcPct val="114000"/>
-              </a:lnSpc>
-              <a:buFont typeface="Arial" panose="020B0604020202020204" pitchFamily="34" charset="0"/>
-              <a:buChar char="•"/>
-            </a:pPr>
-            <a:endParaRPr lang="en-US" sz="2200" b="0" strike="noStrike" spc="-1" dirty="0">
-              <a:solidFill>
-                <a:srgbClr val="000000"/>
-              </a:solidFill>
-              <a:uFill>
-                <a:solidFill>
-                  <a:srgbClr val="FFFFFF"/>
-                </a:solidFill>
-              </a:uFill>
-              <a:latin typeface="Arial"/>
-            </a:endParaRPr>
-          </a:p>
-          <a:p>
-            <a:pPr marL="342900" indent="-342900">
-              <a:lnSpc>
-                <a:spcPct val="114000"/>
-              </a:lnSpc>
-              <a:buFont typeface="Arial" panose="020B0604020202020204" pitchFamily="34" charset="0"/>
-              <a:buChar char="•"/>
-            </a:pPr>
-            <a:endParaRPr lang="en-US" sz="1600" b="0" strike="noStrike" spc="-1" dirty="0">
-              <a:solidFill>
-                <a:srgbClr val="000000"/>
-              </a:solidFill>
-              <a:uFill>
-                <a:solidFill>
-                  <a:srgbClr val="FFFFFF"/>
-                </a:solidFill>
-              </a:uFill>
-              <a:latin typeface="Arial"/>
-            </a:endParaRPr>
-          </a:p>
-          <a:p>
-            <a:pPr>
-              <a:lnSpc>
-                <a:spcPct val="114000"/>
-              </a:lnSpc>
-            </a:pPr>
-            <a:endParaRPr lang="de-DE" sz="1600" b="0" strike="noStrike" spc="-1" dirty="0">
-              <a:solidFill>
-                <a:srgbClr val="000000"/>
-              </a:solidFill>
-              <a:uFill>
-                <a:solidFill>
-                  <a:srgbClr val="FFFFFF"/>
-                </a:solidFill>
-              </a:uFill>
-              <a:latin typeface="Arial"/>
-            </a:endParaRPr>
-          </a:p>
-          <a:p>
-            <a:pPr>
-              <a:lnSpc>
-                <a:spcPct val="114000"/>
-              </a:lnSpc>
-            </a:pPr>
-            <a:endParaRPr lang="de-DE" sz="1600" b="0" strike="noStrike" spc="-1" dirty="0">
-              <a:solidFill>
-                <a:srgbClr val="000000"/>
-              </a:solidFill>
-              <a:uFill>
-                <a:solidFill>
-                  <a:srgbClr val="FFFFFF"/>
-                </a:solidFill>
-              </a:uFill>
-              <a:latin typeface="Arial"/>
-            </a:endParaRPr>
-          </a:p>
-          <a:p>
-            <a:pPr>
-              <a:lnSpc>
-                <a:spcPct val="114000"/>
-              </a:lnSpc>
-            </a:pPr>
-            <a:endParaRPr lang="de-DE" sz="1600" b="0" strike="noStrike" spc="-1" dirty="0">
-              <a:solidFill>
-                <a:srgbClr val="000000"/>
-              </a:solidFill>
-              <a:uFill>
-                <a:solidFill>
-                  <a:srgbClr val="FFFFFF"/>
-                </a:solidFill>
-              </a:uFill>
-              <a:latin typeface="Arial"/>
-            </a:endParaRPr>
-          </a:p>
-        </p:txBody>
-      </p:sp>
-      <p:sp>
-        <p:nvSpPr>
-          <p:cNvPr id="98" name="TextShape 2"/>
+          <p:cNvPr id="90" name="TextShape 2"/>
           <p:cNvSpPr txBox="1"/>
           <p:nvPr/>
         </p:nvSpPr>
@@ -7916,7 +8050,7 @@
                 <a:spcPct val="100000"/>
               </a:lnSpc>
             </a:pPr>
-            <a:fld id="{6C6E63D9-56E4-4498-8999-7626C6F08C51}" type="slidenum">
+            <a:fld id="{4F831EE4-46AE-4713-AD1F-E57479484FF3}" type="slidenum">
               <a:rPr lang="de-DE" sz="1200" b="0" strike="noStrike" spc="-1">
                 <a:solidFill>
                   <a:srgbClr val="000000"/>
@@ -7946,7 +8080,7 @@
       </p:sp>
       <p:sp>
         <p:nvSpPr>
-          <p:cNvPr id="99" name="TextShape 3"/>
+          <p:cNvPr id="91" name="TextShape 3"/>
           <p:cNvSpPr txBox="1"/>
           <p:nvPr/>
         </p:nvSpPr>
@@ -7973,20 +8107,90 @@
               </a:lnSpc>
             </a:pPr>
             <a:r>
-              <a:rPr lang="de-DE" sz="1200" b="0" strike="noStrike" spc="-1">
-                <a:solidFill>
-                  <a:srgbClr val="000000"/>
-                </a:solidFill>
-                <a:uFill>
-                  <a:solidFill>
-                    <a:srgbClr val="FFFFFF"/>
-                  </a:solidFill>
-                </a:uFill>
-                <a:latin typeface="Arial"/>
-              </a:rPr>
-              <a:t>Oztoprak, Oguz (TUM) | Droll, Darwin (TUM) | Python-based Paraview postprocessing</a:t>
-            </a:r>
-            <a:endParaRPr lang="de-DE" sz="1200" b="0" strike="noStrike" spc="-1">
+              <a:rPr lang="de-DE" sz="1200" b="0" strike="noStrike" spc="-1" dirty="0">
+                <a:solidFill>
+                  <a:srgbClr val="000000"/>
+                </a:solidFill>
+                <a:uFill>
+                  <a:solidFill>
+                    <a:srgbClr val="FFFFFF"/>
+                  </a:solidFill>
+                </a:uFill>
+                <a:latin typeface="Arial"/>
+              </a:rPr>
+              <a:t>Oztoprak, Oguz (TUM) | Droll, Darwin (TUM) | Python-</a:t>
+            </a:r>
+            <a:r>
+              <a:rPr lang="de-DE" sz="1200" b="0" strike="noStrike" spc="-1" dirty="0" err="1">
+                <a:solidFill>
+                  <a:srgbClr val="000000"/>
+                </a:solidFill>
+                <a:uFill>
+                  <a:solidFill>
+                    <a:srgbClr val="FFFFFF"/>
+                  </a:solidFill>
+                </a:uFill>
+                <a:latin typeface="Arial"/>
+              </a:rPr>
+              <a:t>based</a:t>
+            </a:r>
+            <a:r>
+              <a:rPr lang="de-DE" sz="1200" b="0" strike="noStrike" spc="-1" dirty="0">
+                <a:solidFill>
+                  <a:srgbClr val="000000"/>
+                </a:solidFill>
+                <a:uFill>
+                  <a:solidFill>
+                    <a:srgbClr val="FFFFFF"/>
+                  </a:solidFill>
+                </a:uFill>
+                <a:latin typeface="Arial"/>
+              </a:rPr>
+              <a:t> </a:t>
+            </a:r>
+            <a:r>
+              <a:rPr lang="de-DE" sz="1200" b="0" strike="noStrike" spc="-1" dirty="0" err="1">
+                <a:solidFill>
+                  <a:srgbClr val="000000"/>
+                </a:solidFill>
+                <a:uFill>
+                  <a:solidFill>
+                    <a:srgbClr val="FFFFFF"/>
+                  </a:solidFill>
+                </a:uFill>
+                <a:latin typeface="Arial"/>
+              </a:rPr>
+              <a:t>Paraview</a:t>
+            </a:r>
+            <a:r>
+              <a:rPr lang="de-DE" sz="1200" b="0" strike="noStrike" spc="-1" dirty="0">
+                <a:solidFill>
+                  <a:srgbClr val="000000"/>
+                </a:solidFill>
+                <a:uFill>
+                  <a:solidFill>
+                    <a:srgbClr val="FFFFFF"/>
+                  </a:solidFill>
+                </a:uFill>
+                <a:latin typeface="Arial"/>
+              </a:rPr>
+              <a:t> </a:t>
+            </a:r>
+            <a:r>
+              <a:rPr lang="de-DE" sz="1200" b="0" strike="noStrike" spc="-1" dirty="0" err="1">
+                <a:solidFill>
+                  <a:srgbClr val="000000"/>
+                </a:solidFill>
+                <a:uFill>
+                  <a:solidFill>
+                    <a:srgbClr val="FFFFFF"/>
+                  </a:solidFill>
+                </a:uFill>
+                <a:latin typeface="Arial"/>
+              </a:rPr>
+              <a:t>postprocessing</a:t>
+            </a:r>
+            <a:endParaRPr lang="de-DE" sz="1200" b="0" strike="noStrike" spc="-1" dirty="0">
               <a:solidFill>
                 <a:srgbClr val="000000"/>
               </a:solidFill>
@@ -8002,7 +8206,7 @@
       </p:sp>
       <p:sp>
         <p:nvSpPr>
-          <p:cNvPr id="100" name="TextShape 4"/>
+          <p:cNvPr id="92" name="TextShape 4"/>
           <p:cNvSpPr txBox="1"/>
           <p:nvPr/>
         </p:nvSpPr>
@@ -8040,7 +8244,7 @@
                 </a:uFill>
                 <a:latin typeface="Arial"/>
               </a:rPr>
-              <a:t>Paraview</a:t>
+              <a:t>Task</a:t>
             </a:r>
             <a:endParaRPr lang="en-US" sz="2200" b="0" strike="noStrike" spc="-1" dirty="0">
               <a:solidFill>
@@ -8056,48 +8260,333 @@
           </a:p>
         </p:txBody>
       </p:sp>
-      <p:pic>
-        <p:nvPicPr>
-          <p:cNvPr id="3" name="Grafik 2">
+      <p:sp>
+        <p:nvSpPr>
+          <p:cNvPr id="2" name="Rechteck 1">
             <a:extLst>
               <a:ext uri="{FF2B5EF4-FFF2-40B4-BE49-F238E27FC236}">
-                <a16:creationId xmlns:a16="http://schemas.microsoft.com/office/drawing/2014/main" id="{01B43783-FD1B-4DC2-83EB-1B89E56BD126}"/>
+                <a16:creationId xmlns:a16="http://schemas.microsoft.com/office/drawing/2014/main" id="{522BB1ED-9F09-406C-92D8-6D0AB07C420E}"/>
               </a:ext>
             </a:extLst>
           </p:cNvPr>
-          <p:cNvPicPr>
-            <a:picLocks noChangeAspect="1"/>
-          </p:cNvPicPr>
+          <p:cNvSpPr/>
           <p:nvPr/>
-        </p:nvPicPr>
-        <p:blipFill>
-          <a:blip r:embed="rId2">
+        </p:nvSpPr>
+        <p:spPr>
+          <a:xfrm>
+            <a:off x="1377245" y="3400765"/>
+            <a:ext cx="1941689" cy="903111"/>
+          </a:xfrm>
+          <a:prstGeom prst="rect">
+            <a:avLst/>
+          </a:prstGeom>
+          <a:solidFill>
+            <a:schemeClr val="accent1">
+              <a:lumMod val="75000"/>
+            </a:schemeClr>
+          </a:solidFill>
+        </p:spPr>
+        <p:style>
+          <a:lnRef idx="2">
+            <a:schemeClr val="accent1">
+              <a:shade val="50000"/>
+            </a:schemeClr>
+          </a:lnRef>
+          <a:fillRef idx="1">
+            <a:schemeClr val="accent1"/>
+          </a:fillRef>
+          <a:effectRef idx="0">
+            <a:schemeClr val="accent1"/>
+          </a:effectRef>
+          <a:fontRef idx="minor">
+            <a:schemeClr val="lt1"/>
+          </a:fontRef>
+        </p:style>
+        <p:txBody>
+          <a:bodyPr rtlCol="0" anchor="ctr"/>
+          <a:lstStyle/>
+          <a:p>
+            <a:pPr algn="ctr"/>
+            <a:r>
+              <a:rPr lang="en-GB" dirty="0">
+                <a:solidFill>
+                  <a:schemeClr val="bg1"/>
+                </a:solidFill>
+              </a:rPr>
+              <a:t>Paraview</a:t>
+            </a:r>
+          </a:p>
+        </p:txBody>
+      </p:sp>
+      <p:sp>
+        <p:nvSpPr>
+          <p:cNvPr id="8" name="Rechteck 7">
             <a:extLst>
-              <a:ext uri="{28A0092B-C50C-407E-A947-70E740481C1C}">
-                <a14:useLocalDpi xmlns:a14="http://schemas.microsoft.com/office/drawing/2010/main" val="0"/>
+              <a:ext uri="{FF2B5EF4-FFF2-40B4-BE49-F238E27FC236}">
+                <a16:creationId xmlns:a16="http://schemas.microsoft.com/office/drawing/2014/main" id="{FD36AD89-6636-433B-9543-EC8EB9D24E3E}"/>
               </a:ext>
             </a:extLst>
-          </a:blip>
-          <a:stretch>
-            <a:fillRect/>
-          </a:stretch>
-        </p:blipFill>
-        <p:spPr>
-          <a:xfrm>
-            <a:off x="4570837" y="1762200"/>
-            <a:ext cx="4255643" cy="2541461"/>
-          </a:xfrm>
-          <a:prstGeom prst="rect">
-            <a:avLst/>
-          </a:prstGeom>
-        </p:spPr>
-      </p:pic>
-      <p:sp>
-        <p:nvSpPr>
-          <p:cNvPr id="8" name="Textfeld 7">
+          </p:cNvPr>
+          <p:cNvSpPr/>
+          <p:nvPr/>
+        </p:nvSpPr>
+        <p:spPr>
+          <a:xfrm>
+            <a:off x="4024489" y="3400765"/>
+            <a:ext cx="1941689" cy="903111"/>
+          </a:xfrm>
+          <a:prstGeom prst="rect">
+            <a:avLst/>
+          </a:prstGeom>
+          <a:solidFill>
+            <a:schemeClr val="accent2">
+              <a:lumMod val="75000"/>
+            </a:schemeClr>
+          </a:solidFill>
+        </p:spPr>
+        <p:style>
+          <a:lnRef idx="2">
+            <a:schemeClr val="accent1">
+              <a:shade val="50000"/>
+            </a:schemeClr>
+          </a:lnRef>
+          <a:fillRef idx="1">
+            <a:schemeClr val="accent1"/>
+          </a:fillRef>
+          <a:effectRef idx="0">
+            <a:schemeClr val="accent1"/>
+          </a:effectRef>
+          <a:fontRef idx="minor">
+            <a:schemeClr val="lt1"/>
+          </a:fontRef>
+        </p:style>
+        <p:txBody>
+          <a:bodyPr rtlCol="0" anchor="ctr"/>
+          <a:lstStyle/>
+          <a:p>
+            <a:pPr algn="ctr"/>
+            <a:r>
+              <a:rPr lang="en-GB" dirty="0">
+                <a:solidFill>
+                  <a:schemeClr val="bg1"/>
+                </a:solidFill>
+              </a:rPr>
+              <a:t>Python plugin</a:t>
+            </a:r>
+          </a:p>
+        </p:txBody>
+      </p:sp>
+      <p:sp>
+        <p:nvSpPr>
+          <p:cNvPr id="9" name="Rechteck 8">
             <a:extLst>
               <a:ext uri="{FF2B5EF4-FFF2-40B4-BE49-F238E27FC236}">
-                <a16:creationId xmlns:a16="http://schemas.microsoft.com/office/drawing/2014/main" id="{82FE7971-4F54-43AF-8936-D5B70AA7EEE1}"/>
+                <a16:creationId xmlns:a16="http://schemas.microsoft.com/office/drawing/2014/main" id="{5C6900FC-FE6A-44B2-8BAB-3BA4BCD06046}"/>
+              </a:ext>
+            </a:extLst>
+          </p:cNvPr>
+          <p:cNvSpPr/>
+          <p:nvPr/>
+        </p:nvSpPr>
+        <p:spPr>
+          <a:xfrm>
+            <a:off x="6671733" y="3400765"/>
+            <a:ext cx="1941689" cy="903111"/>
+          </a:xfrm>
+          <a:prstGeom prst="rect">
+            <a:avLst/>
+          </a:prstGeom>
+          <a:solidFill>
+            <a:schemeClr val="accent1">
+              <a:lumMod val="75000"/>
+            </a:schemeClr>
+          </a:solidFill>
+        </p:spPr>
+        <p:style>
+          <a:lnRef idx="2">
+            <a:schemeClr val="accent1">
+              <a:shade val="50000"/>
+            </a:schemeClr>
+          </a:lnRef>
+          <a:fillRef idx="1">
+            <a:schemeClr val="accent1"/>
+          </a:fillRef>
+          <a:effectRef idx="0">
+            <a:schemeClr val="accent1"/>
+          </a:effectRef>
+          <a:fontRef idx="minor">
+            <a:schemeClr val="lt1"/>
+          </a:fontRef>
+        </p:style>
+        <p:txBody>
+          <a:bodyPr rtlCol="0" anchor="ctr"/>
+          <a:lstStyle/>
+          <a:p>
+            <a:pPr algn="ctr"/>
+            <a:r>
+              <a:rPr lang="en-GB" dirty="0">
+                <a:solidFill>
+                  <a:schemeClr val="bg1"/>
+                </a:solidFill>
+              </a:rPr>
+              <a:t>AdhoC++</a:t>
+            </a:r>
+          </a:p>
+        </p:txBody>
+      </p:sp>
+      <p:sp>
+        <p:nvSpPr>
+          <p:cNvPr id="4" name="Ellipse 3">
+            <a:extLst>
+              <a:ext uri="{FF2B5EF4-FFF2-40B4-BE49-F238E27FC236}">
+                <a16:creationId xmlns:a16="http://schemas.microsoft.com/office/drawing/2014/main" id="{A2A58F7B-329A-4EC5-A54D-3B224080F14A}"/>
+              </a:ext>
+            </a:extLst>
+          </p:cNvPr>
+          <p:cNvSpPr/>
+          <p:nvPr/>
+        </p:nvSpPr>
+        <p:spPr>
+          <a:xfrm>
+            <a:off x="1512711" y="1799445"/>
+            <a:ext cx="1670756" cy="948267"/>
+          </a:xfrm>
+          <a:prstGeom prst="ellipse">
+            <a:avLst/>
+          </a:prstGeom>
+          <a:solidFill>
+            <a:schemeClr val="bg1">
+              <a:lumMod val="95000"/>
+            </a:schemeClr>
+          </a:solidFill>
+        </p:spPr>
+        <p:style>
+          <a:lnRef idx="2">
+            <a:schemeClr val="accent1">
+              <a:shade val="50000"/>
+            </a:schemeClr>
+          </a:lnRef>
+          <a:fillRef idx="1">
+            <a:schemeClr val="accent1"/>
+          </a:fillRef>
+          <a:effectRef idx="0">
+            <a:schemeClr val="accent1"/>
+          </a:effectRef>
+          <a:fontRef idx="minor">
+            <a:schemeClr val="lt1"/>
+          </a:fontRef>
+        </p:style>
+        <p:txBody>
+          <a:bodyPr rtlCol="0" anchor="ctr"/>
+          <a:lstStyle/>
+          <a:p>
+            <a:pPr algn="ctr"/>
+            <a:r>
+              <a:rPr lang="en-GB" sz="1600" dirty="0">
+                <a:solidFill>
+                  <a:schemeClr val="accent1">
+                    <a:lumMod val="75000"/>
+                  </a:schemeClr>
+                </a:solidFill>
+              </a:rPr>
+              <a:t>3D Object</a:t>
+            </a:r>
+            <a:br>
+              <a:rPr lang="en-GB" sz="1600" dirty="0">
+                <a:solidFill>
+                  <a:schemeClr val="accent1">
+                    <a:lumMod val="75000"/>
+                  </a:schemeClr>
+                </a:solidFill>
+              </a:rPr>
+            </a:br>
+            <a:r>
+              <a:rPr lang="en-GB" sz="1600" dirty="0">
+                <a:solidFill>
+                  <a:schemeClr val="accent1">
+                    <a:lumMod val="75000"/>
+                  </a:schemeClr>
+                </a:solidFill>
+              </a:rPr>
+              <a:t>(</a:t>
+            </a:r>
+            <a:r>
+              <a:rPr lang="en-GB" sz="1600" dirty="0" err="1">
+                <a:solidFill>
+                  <a:schemeClr val="accent1">
+                    <a:lumMod val="75000"/>
+                  </a:schemeClr>
+                </a:solidFill>
+              </a:rPr>
+              <a:t>vtk</a:t>
+            </a:r>
+            <a:r>
+              <a:rPr lang="en-GB" sz="1600" dirty="0">
+                <a:solidFill>
+                  <a:schemeClr val="accent1">
+                    <a:lumMod val="75000"/>
+                  </a:schemeClr>
+                </a:solidFill>
+              </a:rPr>
+              <a:t>-File)</a:t>
+            </a:r>
+          </a:p>
+        </p:txBody>
+      </p:sp>
+      <p:cxnSp>
+        <p:nvCxnSpPr>
+          <p:cNvPr id="6" name="Verbinder: gewinkelt 5">
+            <a:extLst>
+              <a:ext uri="{FF2B5EF4-FFF2-40B4-BE49-F238E27FC236}">
+                <a16:creationId xmlns:a16="http://schemas.microsoft.com/office/drawing/2014/main" id="{8191C85F-50B2-4E4F-9B89-D565539DD913}"/>
+              </a:ext>
+            </a:extLst>
+          </p:cNvPr>
+          <p:cNvCxnSpPr>
+            <a:cxnSpLocks/>
+            <a:stCxn id="2" idx="2"/>
+            <a:endCxn id="8" idx="2"/>
+          </p:cNvCxnSpPr>
+          <p:nvPr/>
+        </p:nvCxnSpPr>
+        <p:spPr>
+          <a:xfrm rot="16200000" flipH="1">
+            <a:off x="3671712" y="2980254"/>
+            <a:ext cx="12700" cy="2647244"/>
+          </a:xfrm>
+          <a:prstGeom prst="bentConnector3">
+            <a:avLst>
+              <a:gd name="adj1" fmla="val 7222228"/>
+            </a:avLst>
+          </a:prstGeom>
+          <a:ln w="28575">
+            <a:solidFill>
+              <a:schemeClr val="tx1"/>
+            </a:solidFill>
+            <a:tailEnd type="triangle"/>
+          </a:ln>
+        </p:spPr>
+        <p:style>
+          <a:lnRef idx="1">
+            <a:schemeClr val="accent1"/>
+          </a:lnRef>
+          <a:fillRef idx="0">
+            <a:schemeClr val="accent1"/>
+          </a:fillRef>
+          <a:effectRef idx="0">
+            <a:schemeClr val="accent1"/>
+          </a:effectRef>
+          <a:fontRef idx="minor">
+            <a:schemeClr val="tx1"/>
+          </a:fontRef>
+        </p:style>
+      </p:cxnSp>
+      <p:sp>
+        <p:nvSpPr>
+          <p:cNvPr id="11" name="Textfeld 10">
+            <a:extLst>
+              <a:ext uri="{FF2B5EF4-FFF2-40B4-BE49-F238E27FC236}">
+                <a16:creationId xmlns:a16="http://schemas.microsoft.com/office/drawing/2014/main" id="{6891B315-6FCC-427F-AF82-B43C337853CC}"/>
               </a:ext>
             </a:extLst>
           </p:cNvPr>
@@ -8106,8 +8595,8 @@
         </p:nvSpPr>
         <p:spPr>
           <a:xfrm>
-            <a:off x="4570837" y="4430669"/>
-            <a:ext cx="3881947" cy="230832"/>
+            <a:off x="2701573" y="4892860"/>
+            <a:ext cx="1952978" cy="307777"/>
           </a:xfrm>
           <a:prstGeom prst="rect">
             <a:avLst/>
@@ -8121,18 +8610,720 @@
           <a:lstStyle/>
           <a:p>
             <a:r>
-              <a:rPr lang="en-GB" sz="900" dirty="0"/>
-              <a:t>Source: Screenshot from </a:t>
-            </a:r>
-            <a:r>
-              <a:rPr lang="en-GB" sz="900" dirty="0" err="1"/>
-              <a:t>Paraview</a:t>
-            </a:r>
-            <a:endParaRPr lang="en-GB" sz="900" dirty="0"/>
+              <a:rPr lang="en-GB" sz="1400" dirty="0"/>
+              <a:t>User selection of cells</a:t>
+            </a:r>
+          </a:p>
+        </p:txBody>
+      </p:sp>
+      <p:cxnSp>
+        <p:nvCxnSpPr>
+          <p:cNvPr id="13" name="Verbinder: gewinkelt 12">
+            <a:extLst>
+              <a:ext uri="{FF2B5EF4-FFF2-40B4-BE49-F238E27FC236}">
+                <a16:creationId xmlns:a16="http://schemas.microsoft.com/office/drawing/2014/main" id="{1BA08519-03FA-42BC-8B04-4166F1728A65}"/>
+              </a:ext>
+            </a:extLst>
+          </p:cNvPr>
+          <p:cNvCxnSpPr>
+            <a:cxnSpLocks/>
+            <a:stCxn id="4" idx="4"/>
+            <a:endCxn id="2" idx="0"/>
+          </p:cNvCxnSpPr>
+          <p:nvPr/>
+        </p:nvCxnSpPr>
+        <p:spPr>
+          <a:xfrm rot="16200000" flipH="1">
+            <a:off x="2021563" y="3074237"/>
+            <a:ext cx="653053" cy="1"/>
+          </a:xfrm>
+          <a:prstGeom prst="bentConnector3">
+            <a:avLst/>
+          </a:prstGeom>
+          <a:ln w="28575">
+            <a:solidFill>
+              <a:schemeClr val="tx1"/>
+            </a:solidFill>
+            <a:tailEnd type="triangle"/>
+          </a:ln>
+        </p:spPr>
+        <p:style>
+          <a:lnRef idx="1">
+            <a:schemeClr val="accent1"/>
+          </a:lnRef>
+          <a:fillRef idx="0">
+            <a:schemeClr val="accent1"/>
+          </a:fillRef>
+          <a:effectRef idx="0">
+            <a:schemeClr val="accent1"/>
+          </a:effectRef>
+          <a:fontRef idx="minor">
+            <a:schemeClr val="tx1"/>
+          </a:fontRef>
+        </p:style>
+      </p:cxnSp>
+      <p:sp>
+        <p:nvSpPr>
+          <p:cNvPr id="20" name="Ellipse 19">
+            <a:extLst>
+              <a:ext uri="{FF2B5EF4-FFF2-40B4-BE49-F238E27FC236}">
+                <a16:creationId xmlns:a16="http://schemas.microsoft.com/office/drawing/2014/main" id="{0D0A2865-ABC3-4FF4-BCD8-9ED2ACB00BB8}"/>
+              </a:ext>
+            </a:extLst>
+          </p:cNvPr>
+          <p:cNvSpPr/>
+          <p:nvPr/>
+        </p:nvSpPr>
+        <p:spPr>
+          <a:xfrm>
+            <a:off x="4159955" y="1793505"/>
+            <a:ext cx="1670756" cy="948267"/>
+          </a:xfrm>
+          <a:prstGeom prst="ellipse">
+            <a:avLst/>
+          </a:prstGeom>
+          <a:solidFill>
+            <a:schemeClr val="bg1">
+              <a:lumMod val="95000"/>
+            </a:schemeClr>
+          </a:solidFill>
+        </p:spPr>
+        <p:style>
+          <a:lnRef idx="2">
+            <a:schemeClr val="accent1">
+              <a:shade val="50000"/>
+            </a:schemeClr>
+          </a:lnRef>
+          <a:fillRef idx="1">
+            <a:schemeClr val="accent1"/>
+          </a:fillRef>
+          <a:effectRef idx="0">
+            <a:schemeClr val="accent1"/>
+          </a:effectRef>
+          <a:fontRef idx="minor">
+            <a:schemeClr val="lt1"/>
+          </a:fontRef>
+        </p:style>
+        <p:txBody>
+          <a:bodyPr rtlCol="0" anchor="ctr"/>
+          <a:lstStyle/>
+          <a:p>
+            <a:pPr algn="ctr"/>
+            <a:r>
+              <a:rPr lang="en-GB" sz="1600" dirty="0">
+                <a:solidFill>
+                  <a:schemeClr val="accent1">
+                    <a:lumMod val="75000"/>
+                  </a:schemeClr>
+                </a:solidFill>
+              </a:rPr>
+              <a:t>Selection</a:t>
+            </a:r>
+          </a:p>
+        </p:txBody>
+      </p:sp>
+      <p:cxnSp>
+        <p:nvCxnSpPr>
+          <p:cNvPr id="17" name="Verbinder: gewinkelt 16">
+            <a:extLst>
+              <a:ext uri="{FF2B5EF4-FFF2-40B4-BE49-F238E27FC236}">
+                <a16:creationId xmlns:a16="http://schemas.microsoft.com/office/drawing/2014/main" id="{33CEA154-1967-4DA6-B989-28AB433E4369}"/>
+              </a:ext>
+            </a:extLst>
+          </p:cNvPr>
+          <p:cNvCxnSpPr>
+            <a:cxnSpLocks/>
+            <a:stCxn id="8" idx="0"/>
+            <a:endCxn id="20" idx="4"/>
+          </p:cNvCxnSpPr>
+          <p:nvPr/>
+        </p:nvCxnSpPr>
+        <p:spPr>
+          <a:xfrm rot="16200000" flipV="1">
+            <a:off x="4665838" y="3071268"/>
+            <a:ext cx="658993" cy="1"/>
+          </a:xfrm>
+          <a:prstGeom prst="bentConnector3">
+            <a:avLst/>
+          </a:prstGeom>
+          <a:ln w="28575">
+            <a:solidFill>
+              <a:schemeClr val="tx1"/>
+            </a:solidFill>
+            <a:tailEnd type="triangle"/>
+          </a:ln>
+        </p:spPr>
+        <p:style>
+          <a:lnRef idx="1">
+            <a:schemeClr val="accent1"/>
+          </a:lnRef>
+          <a:fillRef idx="0">
+            <a:schemeClr val="accent1"/>
+          </a:fillRef>
+          <a:effectRef idx="0">
+            <a:schemeClr val="accent1"/>
+          </a:effectRef>
+          <a:fontRef idx="minor">
+            <a:schemeClr val="tx1"/>
+          </a:fontRef>
+        </p:style>
+      </p:cxnSp>
+      <p:cxnSp>
+        <p:nvCxnSpPr>
+          <p:cNvPr id="21" name="Verbinder: gewinkelt 20">
+            <a:extLst>
+              <a:ext uri="{FF2B5EF4-FFF2-40B4-BE49-F238E27FC236}">
+                <a16:creationId xmlns:a16="http://schemas.microsoft.com/office/drawing/2014/main" id="{78D65A8C-76DB-4D99-B2DD-382DEFB0CFBC}"/>
+              </a:ext>
+            </a:extLst>
+          </p:cNvPr>
+          <p:cNvCxnSpPr>
+            <a:cxnSpLocks/>
+            <a:stCxn id="20" idx="6"/>
+            <a:endCxn id="9" idx="0"/>
+          </p:cNvCxnSpPr>
+          <p:nvPr/>
+        </p:nvCxnSpPr>
+        <p:spPr>
+          <a:xfrm>
+            <a:off x="5830711" y="2267639"/>
+            <a:ext cx="1811867" cy="1133126"/>
+          </a:xfrm>
+          <a:prstGeom prst="bentConnector2">
+            <a:avLst/>
+          </a:prstGeom>
+          <a:ln w="28575">
+            <a:solidFill>
+              <a:schemeClr val="tx1"/>
+            </a:solidFill>
+            <a:tailEnd type="triangle"/>
+          </a:ln>
+        </p:spPr>
+        <p:style>
+          <a:lnRef idx="1">
+            <a:schemeClr val="accent1"/>
+          </a:lnRef>
+          <a:fillRef idx="0">
+            <a:schemeClr val="accent1"/>
+          </a:fillRef>
+          <a:effectRef idx="0">
+            <a:schemeClr val="accent1"/>
+          </a:effectRef>
+          <a:fontRef idx="minor">
+            <a:schemeClr val="tx1"/>
+          </a:fontRef>
+        </p:style>
+      </p:cxnSp>
+      <p:cxnSp>
+        <p:nvCxnSpPr>
+          <p:cNvPr id="24" name="Verbinder: gewinkelt 23">
+            <a:extLst>
+              <a:ext uri="{FF2B5EF4-FFF2-40B4-BE49-F238E27FC236}">
+                <a16:creationId xmlns:a16="http://schemas.microsoft.com/office/drawing/2014/main" id="{AE273641-90DB-4879-865F-1E645B28492D}"/>
+              </a:ext>
+            </a:extLst>
+          </p:cNvPr>
+          <p:cNvCxnSpPr>
+            <a:cxnSpLocks/>
+            <a:stCxn id="9" idx="2"/>
+            <a:endCxn id="40" idx="6"/>
+          </p:cNvCxnSpPr>
+          <p:nvPr/>
+        </p:nvCxnSpPr>
+        <p:spPr>
+          <a:xfrm rot="5400000">
+            <a:off x="5742608" y="3969906"/>
+            <a:ext cx="1566000" cy="2233940"/>
+          </a:xfrm>
+          <a:prstGeom prst="bentConnector2">
+            <a:avLst/>
+          </a:prstGeom>
+          <a:ln w="28575">
+            <a:solidFill>
+              <a:schemeClr val="tx1"/>
+            </a:solidFill>
+            <a:tailEnd type="triangle"/>
+          </a:ln>
+        </p:spPr>
+        <p:style>
+          <a:lnRef idx="1">
+            <a:schemeClr val="accent1"/>
+          </a:lnRef>
+          <a:fillRef idx="0">
+            <a:schemeClr val="accent1"/>
+          </a:fillRef>
+          <a:effectRef idx="0">
+            <a:schemeClr val="accent1"/>
+          </a:effectRef>
+          <a:fontRef idx="minor">
+            <a:schemeClr val="tx1"/>
+          </a:fontRef>
+        </p:style>
+      </p:cxnSp>
+      <p:sp>
+        <p:nvSpPr>
+          <p:cNvPr id="27" name="Textfeld 26">
+            <a:extLst>
+              <a:ext uri="{FF2B5EF4-FFF2-40B4-BE49-F238E27FC236}">
+                <a16:creationId xmlns:a16="http://schemas.microsoft.com/office/drawing/2014/main" id="{A899B9FF-5C84-4B32-B37F-7F9240E81392}"/>
+              </a:ext>
+            </a:extLst>
+          </p:cNvPr>
+          <p:cNvSpPr txBox="1"/>
+          <p:nvPr/>
+        </p:nvSpPr>
+        <p:spPr>
+          <a:xfrm>
+            <a:off x="2357969" y="3041913"/>
+            <a:ext cx="298426" cy="369332"/>
+          </a:xfrm>
+          <a:prstGeom prst="rect">
+            <a:avLst/>
+          </a:prstGeom>
+          <a:noFill/>
+        </p:spPr>
+        <p:txBody>
+          <a:bodyPr wrap="square" rtlCol="0">
+            <a:spAutoFit/>
+          </a:bodyPr>
+          <a:lstStyle/>
+          <a:p>
+            <a:r>
+              <a:rPr lang="en-GB" dirty="0"/>
+              <a:t>1</a:t>
+            </a:r>
+          </a:p>
+        </p:txBody>
+      </p:sp>
+      <p:sp>
+        <p:nvSpPr>
+          <p:cNvPr id="33" name="Textfeld 32">
+            <a:extLst>
+              <a:ext uri="{FF2B5EF4-FFF2-40B4-BE49-F238E27FC236}">
+                <a16:creationId xmlns:a16="http://schemas.microsoft.com/office/drawing/2014/main" id="{FBFADEE6-D0E2-4D82-94B4-AE14353B59FC}"/>
+              </a:ext>
+            </a:extLst>
+          </p:cNvPr>
+          <p:cNvSpPr txBox="1"/>
+          <p:nvPr/>
+        </p:nvSpPr>
+        <p:spPr>
+          <a:xfrm>
+            <a:off x="5012679" y="2739446"/>
+            <a:ext cx="298426" cy="369332"/>
+          </a:xfrm>
+          <a:prstGeom prst="rect">
+            <a:avLst/>
+          </a:prstGeom>
+          <a:noFill/>
+        </p:spPr>
+        <p:txBody>
+          <a:bodyPr wrap="square" rtlCol="0">
+            <a:spAutoFit/>
+          </a:bodyPr>
+          <a:lstStyle/>
+          <a:p>
+            <a:r>
+              <a:rPr lang="en-GB" dirty="0"/>
+              <a:t>3</a:t>
+            </a:r>
+          </a:p>
+        </p:txBody>
+      </p:sp>
+      <p:sp>
+        <p:nvSpPr>
+          <p:cNvPr id="34" name="Textfeld 33">
+            <a:extLst>
+              <a:ext uri="{FF2B5EF4-FFF2-40B4-BE49-F238E27FC236}">
+                <a16:creationId xmlns:a16="http://schemas.microsoft.com/office/drawing/2014/main" id="{A74F01BF-8620-4CAA-B3C3-43021EC16323}"/>
+              </a:ext>
+            </a:extLst>
+          </p:cNvPr>
+          <p:cNvSpPr txBox="1"/>
+          <p:nvPr/>
+        </p:nvSpPr>
+        <p:spPr>
+          <a:xfrm>
+            <a:off x="5022359" y="4371425"/>
+            <a:ext cx="298426" cy="369332"/>
+          </a:xfrm>
+          <a:prstGeom prst="rect">
+            <a:avLst/>
+          </a:prstGeom>
+          <a:noFill/>
+        </p:spPr>
+        <p:txBody>
+          <a:bodyPr wrap="square" rtlCol="0">
+            <a:spAutoFit/>
+          </a:bodyPr>
+          <a:lstStyle/>
+          <a:p>
+            <a:r>
+              <a:rPr lang="en-GB" dirty="0"/>
+              <a:t>2</a:t>
+            </a:r>
+          </a:p>
+        </p:txBody>
+      </p:sp>
+      <p:sp>
+        <p:nvSpPr>
+          <p:cNvPr id="35" name="Textfeld 34">
+            <a:extLst>
+              <a:ext uri="{FF2B5EF4-FFF2-40B4-BE49-F238E27FC236}">
+                <a16:creationId xmlns:a16="http://schemas.microsoft.com/office/drawing/2014/main" id="{9C68A2EA-12F8-4355-8C07-EC0CA0F0413C}"/>
+              </a:ext>
+            </a:extLst>
+          </p:cNvPr>
+          <p:cNvSpPr txBox="1"/>
+          <p:nvPr/>
+        </p:nvSpPr>
+        <p:spPr>
+          <a:xfrm>
+            <a:off x="7750377" y="3029934"/>
+            <a:ext cx="298426" cy="369332"/>
+          </a:xfrm>
+          <a:prstGeom prst="rect">
+            <a:avLst/>
+          </a:prstGeom>
+          <a:noFill/>
+        </p:spPr>
+        <p:txBody>
+          <a:bodyPr wrap="square" rtlCol="0">
+            <a:spAutoFit/>
+          </a:bodyPr>
+          <a:lstStyle/>
+          <a:p>
+            <a:r>
+              <a:rPr lang="en-GB" dirty="0"/>
+              <a:t>4</a:t>
+            </a:r>
+          </a:p>
+        </p:txBody>
+      </p:sp>
+      <p:sp>
+        <p:nvSpPr>
+          <p:cNvPr id="36" name="Textfeld 35">
+            <a:extLst>
+              <a:ext uri="{FF2B5EF4-FFF2-40B4-BE49-F238E27FC236}">
+                <a16:creationId xmlns:a16="http://schemas.microsoft.com/office/drawing/2014/main" id="{8377C8D4-3519-47D2-B9FA-9780CF3A4787}"/>
+              </a:ext>
+            </a:extLst>
+          </p:cNvPr>
+          <p:cNvSpPr txBox="1"/>
+          <p:nvPr/>
+        </p:nvSpPr>
+        <p:spPr>
+          <a:xfrm>
+            <a:off x="782833" y="3852320"/>
+            <a:ext cx="298426" cy="369332"/>
+          </a:xfrm>
+          <a:prstGeom prst="rect">
+            <a:avLst/>
+          </a:prstGeom>
+          <a:noFill/>
+        </p:spPr>
+        <p:txBody>
+          <a:bodyPr wrap="square" rtlCol="0">
+            <a:spAutoFit/>
+          </a:bodyPr>
+          <a:lstStyle/>
+          <a:p>
+            <a:r>
+              <a:rPr lang="en-GB" dirty="0"/>
+              <a:t>6</a:t>
+            </a:r>
+          </a:p>
+        </p:txBody>
+      </p:sp>
+      <p:sp>
+        <p:nvSpPr>
+          <p:cNvPr id="37" name="Textfeld 36">
+            <a:extLst>
+              <a:ext uri="{FF2B5EF4-FFF2-40B4-BE49-F238E27FC236}">
+                <a16:creationId xmlns:a16="http://schemas.microsoft.com/office/drawing/2014/main" id="{B2C7B7B2-A3BE-4BBC-9C0C-9DEEF3E469C1}"/>
+              </a:ext>
+            </a:extLst>
+          </p:cNvPr>
+          <p:cNvSpPr txBox="1"/>
+          <p:nvPr/>
+        </p:nvSpPr>
+        <p:spPr>
+          <a:xfrm>
+            <a:off x="4989689" y="3000179"/>
+            <a:ext cx="1952978" cy="307777"/>
+          </a:xfrm>
+          <a:prstGeom prst="rect">
+            <a:avLst/>
+          </a:prstGeom>
+          <a:noFill/>
+        </p:spPr>
+        <p:txBody>
+          <a:bodyPr wrap="square" rtlCol="0">
+            <a:spAutoFit/>
+          </a:bodyPr>
+          <a:lstStyle/>
+          <a:p>
+            <a:r>
+              <a:rPr lang="en-GB" sz="1400" dirty="0"/>
+              <a:t>Creating 3D Object</a:t>
+            </a:r>
+          </a:p>
+        </p:txBody>
+      </p:sp>
+      <p:sp>
+        <p:nvSpPr>
+          <p:cNvPr id="38" name="Textfeld 37">
+            <a:extLst>
+              <a:ext uri="{FF2B5EF4-FFF2-40B4-BE49-F238E27FC236}">
+                <a16:creationId xmlns:a16="http://schemas.microsoft.com/office/drawing/2014/main" id="{81AE6F04-13D6-4410-9A6C-8AA98834BF9D}"/>
+              </a:ext>
+            </a:extLst>
+          </p:cNvPr>
+          <p:cNvSpPr txBox="1"/>
+          <p:nvPr/>
+        </p:nvSpPr>
+        <p:spPr>
+          <a:xfrm>
+            <a:off x="5966178" y="1851526"/>
+            <a:ext cx="2539103" cy="307777"/>
+          </a:xfrm>
+          <a:prstGeom prst="rect">
+            <a:avLst/>
+          </a:prstGeom>
+          <a:noFill/>
+        </p:spPr>
+        <p:txBody>
+          <a:bodyPr wrap="square" rtlCol="0">
+            <a:spAutoFit/>
+          </a:bodyPr>
+          <a:lstStyle/>
+          <a:p>
+            <a:r>
+              <a:rPr lang="en-GB" sz="1400" dirty="0"/>
+              <a:t>Distribution to postprocessing</a:t>
+            </a:r>
+          </a:p>
+        </p:txBody>
+      </p:sp>
+      <p:sp>
+        <p:nvSpPr>
+          <p:cNvPr id="39" name="Textfeld 38">
+            <a:extLst>
+              <a:ext uri="{FF2B5EF4-FFF2-40B4-BE49-F238E27FC236}">
+                <a16:creationId xmlns:a16="http://schemas.microsoft.com/office/drawing/2014/main" id="{4FD3B85C-76A1-47AE-8142-2E0A52442B7F}"/>
+              </a:ext>
+            </a:extLst>
+          </p:cNvPr>
+          <p:cNvSpPr txBox="1"/>
+          <p:nvPr/>
+        </p:nvSpPr>
+        <p:spPr>
+          <a:xfrm>
+            <a:off x="1073476" y="5953054"/>
+            <a:ext cx="2182799" cy="307777"/>
+          </a:xfrm>
+          <a:prstGeom prst="rect">
+            <a:avLst/>
+          </a:prstGeom>
+          <a:noFill/>
+        </p:spPr>
+        <p:txBody>
+          <a:bodyPr wrap="square" rtlCol="0">
+            <a:spAutoFit/>
+          </a:bodyPr>
+          <a:lstStyle/>
+          <a:p>
+            <a:r>
+              <a:rPr lang="en-GB" sz="1400" dirty="0"/>
+              <a:t>display</a:t>
+            </a:r>
+          </a:p>
+        </p:txBody>
+      </p:sp>
+      <p:sp>
+        <p:nvSpPr>
+          <p:cNvPr id="40" name="Ellipse 39">
+            <a:extLst>
+              <a:ext uri="{FF2B5EF4-FFF2-40B4-BE49-F238E27FC236}">
+                <a16:creationId xmlns:a16="http://schemas.microsoft.com/office/drawing/2014/main" id="{7B3A3B5B-F7CA-4AB3-BE6E-639E79D9168B}"/>
+              </a:ext>
+            </a:extLst>
+          </p:cNvPr>
+          <p:cNvSpPr/>
+          <p:nvPr/>
+        </p:nvSpPr>
+        <p:spPr>
+          <a:xfrm>
+            <a:off x="3737882" y="5395742"/>
+            <a:ext cx="1670756" cy="948267"/>
+          </a:xfrm>
+          <a:prstGeom prst="ellipse">
+            <a:avLst/>
+          </a:prstGeom>
+          <a:solidFill>
+            <a:schemeClr val="bg1">
+              <a:lumMod val="95000"/>
+            </a:schemeClr>
+          </a:solidFill>
+        </p:spPr>
+        <p:style>
+          <a:lnRef idx="2">
+            <a:schemeClr val="accent1">
+              <a:shade val="50000"/>
+            </a:schemeClr>
+          </a:lnRef>
+          <a:fillRef idx="1">
+            <a:schemeClr val="accent1"/>
+          </a:fillRef>
+          <a:effectRef idx="0">
+            <a:schemeClr val="accent1"/>
+          </a:effectRef>
+          <a:fontRef idx="minor">
+            <a:schemeClr val="lt1"/>
+          </a:fontRef>
+        </p:style>
+        <p:txBody>
+          <a:bodyPr rtlCol="0" anchor="ctr"/>
+          <a:lstStyle/>
+          <a:p>
+            <a:pPr algn="ctr"/>
+            <a:r>
+              <a:rPr lang="en-GB" sz="1600" dirty="0">
+                <a:solidFill>
+                  <a:schemeClr val="accent1">
+                    <a:lumMod val="75000"/>
+                  </a:schemeClr>
+                </a:solidFill>
+              </a:rPr>
+              <a:t>Result</a:t>
+            </a:r>
+          </a:p>
+        </p:txBody>
+      </p:sp>
+      <p:sp>
+        <p:nvSpPr>
+          <p:cNvPr id="41" name="Textfeld 40">
+            <a:extLst>
+              <a:ext uri="{FF2B5EF4-FFF2-40B4-BE49-F238E27FC236}">
+                <a16:creationId xmlns:a16="http://schemas.microsoft.com/office/drawing/2014/main" id="{507F49E2-685D-4489-8862-9118AB66D2DE}"/>
+              </a:ext>
+            </a:extLst>
+          </p:cNvPr>
+          <p:cNvSpPr txBox="1"/>
+          <p:nvPr/>
+        </p:nvSpPr>
+        <p:spPr>
+          <a:xfrm>
+            <a:off x="5529160" y="5933759"/>
+            <a:ext cx="298426" cy="369332"/>
+          </a:xfrm>
+          <a:prstGeom prst="rect">
+            <a:avLst/>
+          </a:prstGeom>
+          <a:noFill/>
+        </p:spPr>
+        <p:txBody>
+          <a:bodyPr wrap="square" rtlCol="0">
+            <a:spAutoFit/>
+          </a:bodyPr>
+          <a:lstStyle/>
+          <a:p>
+            <a:r>
+              <a:rPr lang="en-GB" dirty="0"/>
+              <a:t>5</a:t>
+            </a:r>
+          </a:p>
+        </p:txBody>
+      </p:sp>
+      <p:cxnSp>
+        <p:nvCxnSpPr>
+          <p:cNvPr id="30" name="Verbinder: gewinkelt 29">
+            <a:extLst>
+              <a:ext uri="{FF2B5EF4-FFF2-40B4-BE49-F238E27FC236}">
+                <a16:creationId xmlns:a16="http://schemas.microsoft.com/office/drawing/2014/main" id="{B40DD2DB-BDEA-4C8E-9789-84934DD699F5}"/>
+              </a:ext>
+            </a:extLst>
+          </p:cNvPr>
+          <p:cNvCxnSpPr>
+            <a:cxnSpLocks/>
+            <a:stCxn id="40" idx="2"/>
+            <a:endCxn id="2" idx="1"/>
+          </p:cNvCxnSpPr>
+          <p:nvPr/>
+        </p:nvCxnSpPr>
+        <p:spPr>
+          <a:xfrm rot="10800000">
+            <a:off x="1377246" y="3852322"/>
+            <a:ext cx="2360637" cy="2017555"/>
+          </a:xfrm>
+          <a:prstGeom prst="bentConnector3">
+            <a:avLst>
+              <a:gd name="adj1" fmla="val 109684"/>
+            </a:avLst>
+          </a:prstGeom>
+          <a:ln w="28575">
+            <a:solidFill>
+              <a:schemeClr val="tx1"/>
+            </a:solidFill>
+            <a:tailEnd type="triangle"/>
+          </a:ln>
+        </p:spPr>
+        <p:style>
+          <a:lnRef idx="1">
+            <a:schemeClr val="accent1"/>
+          </a:lnRef>
+          <a:fillRef idx="0">
+            <a:schemeClr val="accent1"/>
+          </a:fillRef>
+          <a:effectRef idx="0">
+            <a:schemeClr val="accent1"/>
+          </a:effectRef>
+          <a:fontRef idx="minor">
+            <a:schemeClr val="tx1"/>
+          </a:fontRef>
+        </p:style>
+      </p:cxnSp>
+      <p:sp>
+        <p:nvSpPr>
+          <p:cNvPr id="49" name="Textfeld 48">
+            <a:extLst>
+              <a:ext uri="{FF2B5EF4-FFF2-40B4-BE49-F238E27FC236}">
+                <a16:creationId xmlns:a16="http://schemas.microsoft.com/office/drawing/2014/main" id="{B98537E0-9918-4DD9-B5E0-66C0368B2F9D}"/>
+              </a:ext>
+            </a:extLst>
+          </p:cNvPr>
+          <p:cNvSpPr txBox="1"/>
+          <p:nvPr/>
+        </p:nvSpPr>
+        <p:spPr>
+          <a:xfrm>
+            <a:off x="6671733" y="5953054"/>
+            <a:ext cx="2182799" cy="307777"/>
+          </a:xfrm>
+          <a:prstGeom prst="rect">
+            <a:avLst/>
+          </a:prstGeom>
+          <a:noFill/>
+        </p:spPr>
+        <p:txBody>
+          <a:bodyPr wrap="square" rtlCol="0">
+            <a:spAutoFit/>
+          </a:bodyPr>
+          <a:lstStyle/>
+          <a:p>
+            <a:r>
+              <a:rPr lang="en-GB" sz="1400" dirty="0"/>
+              <a:t>processing</a:t>
+            </a:r>
           </a:p>
         </p:txBody>
       </p:sp>
     </p:spTree>
+    <p:extLst>
+      <p:ext uri="{BB962C8B-B14F-4D97-AF65-F5344CB8AC3E}">
+        <p14:creationId xmlns:p14="http://schemas.microsoft.com/office/powerpoint/2010/main" val="2556788027"/>
+      </p:ext>
+    </p:extLst>
   </p:cSld>
   <p:clrMapOvr>
     <a:masterClrMapping/>
@@ -8424,20 +9615,90 @@
               </a:lnSpc>
             </a:pPr>
             <a:r>
-              <a:rPr lang="de-DE" sz="1200" b="0" strike="noStrike" spc="-1">
-                <a:solidFill>
-                  <a:srgbClr val="000000"/>
-                </a:solidFill>
-                <a:uFill>
-                  <a:solidFill>
-                    <a:srgbClr val="FFFFFF"/>
-                  </a:solidFill>
-                </a:uFill>
-                <a:latin typeface="Arial"/>
-              </a:rPr>
-              <a:t>Oztoprak, Oguz (TUM) | Droll, Darwin (TUM) | Python-based Paraview postprocessing</a:t>
-            </a:r>
-            <a:endParaRPr lang="de-DE" sz="1200" b="0" strike="noStrike" spc="-1">
+              <a:rPr lang="de-DE" sz="1200" b="0" strike="noStrike" spc="-1" dirty="0">
+                <a:solidFill>
+                  <a:srgbClr val="000000"/>
+                </a:solidFill>
+                <a:uFill>
+                  <a:solidFill>
+                    <a:srgbClr val="FFFFFF"/>
+                  </a:solidFill>
+                </a:uFill>
+                <a:latin typeface="Arial"/>
+              </a:rPr>
+              <a:t>Oztoprak, Oguz (TUM) | Droll, Darwin (TUM) | Python-</a:t>
+            </a:r>
+            <a:r>
+              <a:rPr lang="de-DE" sz="1200" b="0" strike="noStrike" spc="-1" dirty="0" err="1">
+                <a:solidFill>
+                  <a:srgbClr val="000000"/>
+                </a:solidFill>
+                <a:uFill>
+                  <a:solidFill>
+                    <a:srgbClr val="FFFFFF"/>
+                  </a:solidFill>
+                </a:uFill>
+                <a:latin typeface="Arial"/>
+              </a:rPr>
+              <a:t>based</a:t>
+            </a:r>
+            <a:r>
+              <a:rPr lang="de-DE" sz="1200" b="0" strike="noStrike" spc="-1" dirty="0">
+                <a:solidFill>
+                  <a:srgbClr val="000000"/>
+                </a:solidFill>
+                <a:uFill>
+                  <a:solidFill>
+                    <a:srgbClr val="FFFFFF"/>
+                  </a:solidFill>
+                </a:uFill>
+                <a:latin typeface="Arial"/>
+              </a:rPr>
+              <a:t> </a:t>
+            </a:r>
+            <a:r>
+              <a:rPr lang="de-DE" sz="1200" b="0" strike="noStrike" spc="-1" dirty="0" err="1">
+                <a:solidFill>
+                  <a:srgbClr val="000000"/>
+                </a:solidFill>
+                <a:uFill>
+                  <a:solidFill>
+                    <a:srgbClr val="FFFFFF"/>
+                  </a:solidFill>
+                </a:uFill>
+                <a:latin typeface="Arial"/>
+              </a:rPr>
+              <a:t>Paraview</a:t>
+            </a:r>
+            <a:r>
+              <a:rPr lang="de-DE" sz="1200" b="0" strike="noStrike" spc="-1" dirty="0">
+                <a:solidFill>
+                  <a:srgbClr val="000000"/>
+                </a:solidFill>
+                <a:uFill>
+                  <a:solidFill>
+                    <a:srgbClr val="FFFFFF"/>
+                  </a:solidFill>
+                </a:uFill>
+                <a:latin typeface="Arial"/>
+              </a:rPr>
+              <a:t> </a:t>
+            </a:r>
+            <a:r>
+              <a:rPr lang="de-DE" sz="1200" b="0" strike="noStrike" spc="-1" dirty="0" err="1">
+                <a:solidFill>
+                  <a:srgbClr val="000000"/>
+                </a:solidFill>
+                <a:uFill>
+                  <a:solidFill>
+                    <a:srgbClr val="FFFFFF"/>
+                  </a:solidFill>
+                </a:uFill>
+                <a:latin typeface="Arial"/>
+              </a:rPr>
+              <a:t>postprocessing</a:t>
+            </a:r>
+            <a:endParaRPr lang="de-DE" sz="1200" b="0" strike="noStrike" spc="-1" dirty="0">
               <a:solidFill>
                 <a:srgbClr val="000000"/>
               </a:solidFill>
@@ -8840,20 +10101,90 @@
               </a:lnSpc>
             </a:pPr>
             <a:r>
-              <a:rPr lang="de-DE" sz="1200" b="0" strike="noStrike" spc="-1">
-                <a:solidFill>
-                  <a:srgbClr val="000000"/>
-                </a:solidFill>
-                <a:uFill>
-                  <a:solidFill>
-                    <a:srgbClr val="FFFFFF"/>
-                  </a:solidFill>
-                </a:uFill>
-                <a:latin typeface="Arial"/>
-              </a:rPr>
-              <a:t>Oztoprak, Oguz (TUM) | Droll, Darwin (TUM) | Python-based Paraview postprocessing</a:t>
-            </a:r>
-            <a:endParaRPr lang="de-DE" sz="1200" b="0" strike="noStrike" spc="-1">
+              <a:rPr lang="de-DE" sz="1200" b="0" strike="noStrike" spc="-1" dirty="0">
+                <a:solidFill>
+                  <a:srgbClr val="000000"/>
+                </a:solidFill>
+                <a:uFill>
+                  <a:solidFill>
+                    <a:srgbClr val="FFFFFF"/>
+                  </a:solidFill>
+                </a:uFill>
+                <a:latin typeface="Arial"/>
+              </a:rPr>
+              <a:t>Oztoprak, Oguz (TUM) | Droll, Darwin (TUM) | Python-</a:t>
+            </a:r>
+            <a:r>
+              <a:rPr lang="de-DE" sz="1200" b="0" strike="noStrike" spc="-1" dirty="0" err="1">
+                <a:solidFill>
+                  <a:srgbClr val="000000"/>
+                </a:solidFill>
+                <a:uFill>
+                  <a:solidFill>
+                    <a:srgbClr val="FFFFFF"/>
+                  </a:solidFill>
+                </a:uFill>
+                <a:latin typeface="Arial"/>
+              </a:rPr>
+              <a:t>based</a:t>
+            </a:r>
+            <a:r>
+              <a:rPr lang="de-DE" sz="1200" b="0" strike="noStrike" spc="-1" dirty="0">
+                <a:solidFill>
+                  <a:srgbClr val="000000"/>
+                </a:solidFill>
+                <a:uFill>
+                  <a:solidFill>
+                    <a:srgbClr val="FFFFFF"/>
+                  </a:solidFill>
+                </a:uFill>
+                <a:latin typeface="Arial"/>
+              </a:rPr>
+              <a:t> </a:t>
+            </a:r>
+            <a:r>
+              <a:rPr lang="de-DE" sz="1200" b="0" strike="noStrike" spc="-1" dirty="0" err="1">
+                <a:solidFill>
+                  <a:srgbClr val="000000"/>
+                </a:solidFill>
+                <a:uFill>
+                  <a:solidFill>
+                    <a:srgbClr val="FFFFFF"/>
+                  </a:solidFill>
+                </a:uFill>
+                <a:latin typeface="Arial"/>
+              </a:rPr>
+              <a:t>Paraview</a:t>
+            </a:r>
+            <a:r>
+              <a:rPr lang="de-DE" sz="1200" b="0" strike="noStrike" spc="-1" dirty="0">
+                <a:solidFill>
+                  <a:srgbClr val="000000"/>
+                </a:solidFill>
+                <a:uFill>
+                  <a:solidFill>
+                    <a:srgbClr val="FFFFFF"/>
+                  </a:solidFill>
+                </a:uFill>
+                <a:latin typeface="Arial"/>
+              </a:rPr>
+              <a:t> </a:t>
+            </a:r>
+            <a:r>
+              <a:rPr lang="de-DE" sz="1200" b="0" strike="noStrike" spc="-1" dirty="0" err="1">
+                <a:solidFill>
+                  <a:srgbClr val="000000"/>
+                </a:solidFill>
+                <a:uFill>
+                  <a:solidFill>
+                    <a:srgbClr val="FFFFFF"/>
+                  </a:solidFill>
+                </a:uFill>
+                <a:latin typeface="Arial"/>
+              </a:rPr>
+              <a:t>postprocessing</a:t>
+            </a:r>
+            <a:endParaRPr lang="de-DE" sz="1200" b="0" strike="noStrike" spc="-1" dirty="0">
               <a:solidFill>
                 <a:srgbClr val="000000"/>
               </a:solidFill>
@@ -9275,20 +10606,90 @@
               </a:lnSpc>
             </a:pPr>
             <a:r>
-              <a:rPr lang="de-DE" sz="1200" b="0" strike="noStrike" spc="-1">
-                <a:solidFill>
-                  <a:srgbClr val="000000"/>
-                </a:solidFill>
-                <a:uFill>
-                  <a:solidFill>
-                    <a:srgbClr val="FFFFFF"/>
-                  </a:solidFill>
-                </a:uFill>
-                <a:latin typeface="Arial"/>
-              </a:rPr>
-              <a:t>Oztoprak, Oguz (TUM) | Droll, Darwin (TUM) | Python-based Paraview postprocessing</a:t>
-            </a:r>
-            <a:endParaRPr lang="de-DE" sz="1200" b="0" strike="noStrike" spc="-1">
+              <a:rPr lang="de-DE" sz="1200" b="0" strike="noStrike" spc="-1" dirty="0">
+                <a:solidFill>
+                  <a:srgbClr val="000000"/>
+                </a:solidFill>
+                <a:uFill>
+                  <a:solidFill>
+                    <a:srgbClr val="FFFFFF"/>
+                  </a:solidFill>
+                </a:uFill>
+                <a:latin typeface="Arial"/>
+              </a:rPr>
+              <a:t>Oztoprak, Oguz (TUM) | Droll, Darwin (TUM) | Python-</a:t>
+            </a:r>
+            <a:r>
+              <a:rPr lang="de-DE" sz="1200" b="0" strike="noStrike" spc="-1" dirty="0" err="1">
+                <a:solidFill>
+                  <a:srgbClr val="000000"/>
+                </a:solidFill>
+                <a:uFill>
+                  <a:solidFill>
+                    <a:srgbClr val="FFFFFF"/>
+                  </a:solidFill>
+                </a:uFill>
+                <a:latin typeface="Arial"/>
+              </a:rPr>
+              <a:t>based</a:t>
+            </a:r>
+            <a:r>
+              <a:rPr lang="de-DE" sz="1200" b="0" strike="noStrike" spc="-1" dirty="0">
+                <a:solidFill>
+                  <a:srgbClr val="000000"/>
+                </a:solidFill>
+                <a:uFill>
+                  <a:solidFill>
+                    <a:srgbClr val="FFFFFF"/>
+                  </a:solidFill>
+                </a:uFill>
+                <a:latin typeface="Arial"/>
+              </a:rPr>
+              <a:t> </a:t>
+            </a:r>
+            <a:r>
+              <a:rPr lang="de-DE" sz="1200" b="0" strike="noStrike" spc="-1" dirty="0" err="1">
+                <a:solidFill>
+                  <a:srgbClr val="000000"/>
+                </a:solidFill>
+                <a:uFill>
+                  <a:solidFill>
+                    <a:srgbClr val="FFFFFF"/>
+                  </a:solidFill>
+                </a:uFill>
+                <a:latin typeface="Arial"/>
+              </a:rPr>
+              <a:t>Paraview</a:t>
+            </a:r>
+            <a:r>
+              <a:rPr lang="de-DE" sz="1200" b="0" strike="noStrike" spc="-1" dirty="0">
+                <a:solidFill>
+                  <a:srgbClr val="000000"/>
+                </a:solidFill>
+                <a:uFill>
+                  <a:solidFill>
+                    <a:srgbClr val="FFFFFF"/>
+                  </a:solidFill>
+                </a:uFill>
+                <a:latin typeface="Arial"/>
+              </a:rPr>
+              <a:t> </a:t>
+            </a:r>
+            <a:r>
+              <a:rPr lang="de-DE" sz="1200" b="0" strike="noStrike" spc="-1" dirty="0" err="1">
+                <a:solidFill>
+                  <a:srgbClr val="000000"/>
+                </a:solidFill>
+                <a:uFill>
+                  <a:solidFill>
+                    <a:srgbClr val="FFFFFF"/>
+                  </a:solidFill>
+                </a:uFill>
+                <a:latin typeface="Arial"/>
+              </a:rPr>
+              <a:t>postprocessing</a:t>
+            </a:r>
+            <a:endParaRPr lang="de-DE" sz="1200" b="0" strike="noStrike" spc="-1" dirty="0">
               <a:solidFill>
                 <a:srgbClr val="000000"/>
               </a:solidFill>
@@ -9560,20 +10961,90 @@
               </a:lnSpc>
             </a:pPr>
             <a:r>
-              <a:rPr lang="de-DE" sz="1200" b="0" strike="noStrike" spc="-1">
-                <a:solidFill>
-                  <a:srgbClr val="000000"/>
-                </a:solidFill>
-                <a:uFill>
-                  <a:solidFill>
-                    <a:srgbClr val="FFFFFF"/>
-                  </a:solidFill>
-                </a:uFill>
-                <a:latin typeface="Arial"/>
-              </a:rPr>
-              <a:t>Oztoprak, Oguz (TUM) | Droll, Darwin (TUM) | Python-based Paraview postprocessing</a:t>
-            </a:r>
-            <a:endParaRPr lang="de-DE" sz="1200" b="0" strike="noStrike" spc="-1">
+              <a:rPr lang="de-DE" sz="1200" b="0" strike="noStrike" spc="-1" dirty="0">
+                <a:solidFill>
+                  <a:srgbClr val="000000"/>
+                </a:solidFill>
+                <a:uFill>
+                  <a:solidFill>
+                    <a:srgbClr val="FFFFFF"/>
+                  </a:solidFill>
+                </a:uFill>
+                <a:latin typeface="Arial"/>
+              </a:rPr>
+              <a:t>Oztoprak, Oguz (TUM) | Droll, Darwin (TUM) | Python-</a:t>
+            </a:r>
+            <a:r>
+              <a:rPr lang="de-DE" sz="1200" b="0" strike="noStrike" spc="-1" dirty="0" err="1">
+                <a:solidFill>
+                  <a:srgbClr val="000000"/>
+                </a:solidFill>
+                <a:uFill>
+                  <a:solidFill>
+                    <a:srgbClr val="FFFFFF"/>
+                  </a:solidFill>
+                </a:uFill>
+                <a:latin typeface="Arial"/>
+              </a:rPr>
+              <a:t>based</a:t>
+            </a:r>
+            <a:r>
+              <a:rPr lang="de-DE" sz="1200" b="0" strike="noStrike" spc="-1" dirty="0">
+                <a:solidFill>
+                  <a:srgbClr val="000000"/>
+                </a:solidFill>
+                <a:uFill>
+                  <a:solidFill>
+                    <a:srgbClr val="FFFFFF"/>
+                  </a:solidFill>
+                </a:uFill>
+                <a:latin typeface="Arial"/>
+              </a:rPr>
+              <a:t> </a:t>
+            </a:r>
+            <a:r>
+              <a:rPr lang="de-DE" sz="1200" b="0" strike="noStrike" spc="-1" dirty="0" err="1">
+                <a:solidFill>
+                  <a:srgbClr val="000000"/>
+                </a:solidFill>
+                <a:uFill>
+                  <a:solidFill>
+                    <a:srgbClr val="FFFFFF"/>
+                  </a:solidFill>
+                </a:uFill>
+                <a:latin typeface="Arial"/>
+              </a:rPr>
+              <a:t>Paraview</a:t>
+            </a:r>
+            <a:r>
+              <a:rPr lang="de-DE" sz="1200" b="0" strike="noStrike" spc="-1" dirty="0">
+                <a:solidFill>
+                  <a:srgbClr val="000000"/>
+                </a:solidFill>
+                <a:uFill>
+                  <a:solidFill>
+                    <a:srgbClr val="FFFFFF"/>
+                  </a:solidFill>
+                </a:uFill>
+                <a:latin typeface="Arial"/>
+              </a:rPr>
+              <a:t> </a:t>
+            </a:r>
+            <a:r>
+              <a:rPr lang="de-DE" sz="1200" b="0" strike="noStrike" spc="-1" dirty="0" err="1">
+                <a:solidFill>
+                  <a:srgbClr val="000000"/>
+                </a:solidFill>
+                <a:uFill>
+                  <a:solidFill>
+                    <a:srgbClr val="FFFFFF"/>
+                  </a:solidFill>
+                </a:uFill>
+                <a:latin typeface="Arial"/>
+              </a:rPr>
+              <a:t>postprocessing</a:t>
+            </a:r>
+            <a:endParaRPr lang="de-DE" sz="1200" b="0" strike="noStrike" spc="-1" dirty="0">
               <a:solidFill>
                 <a:srgbClr val="000000"/>
               </a:solidFill>

</xml_diff>

<commit_message>
modified presentation and small things added on the script
</commit_message>
<xml_diff>
--- a/Paraview-postprocessor.pptx
+++ b/Paraview-postprocessor.pptx
@@ -6,7 +6,7 @@
     <p:sldMasterId id="2147483661" r:id="rId2"/>
   </p:sldMasterIdLst>
   <p:notesMasterIdLst>
-    <p:notesMasterId r:id="rId19"/>
+    <p:notesMasterId r:id="rId20"/>
   </p:notesMasterIdLst>
   <p:sldIdLst>
     <p:sldId id="256" r:id="rId3"/>
@@ -19,12 +19,13 @@
     <p:sldId id="269" r:id="rId10"/>
     <p:sldId id="272" r:id="rId11"/>
     <p:sldId id="273" r:id="rId12"/>
-    <p:sldId id="275" r:id="rId13"/>
-    <p:sldId id="277" r:id="rId14"/>
-    <p:sldId id="261" r:id="rId15"/>
-    <p:sldId id="276" r:id="rId16"/>
-    <p:sldId id="263" r:id="rId17"/>
-    <p:sldId id="264" r:id="rId18"/>
+    <p:sldId id="278" r:id="rId13"/>
+    <p:sldId id="275" r:id="rId14"/>
+    <p:sldId id="277" r:id="rId15"/>
+    <p:sldId id="261" r:id="rId16"/>
+    <p:sldId id="276" r:id="rId17"/>
+    <p:sldId id="263" r:id="rId18"/>
+    <p:sldId id="264" r:id="rId19"/>
   </p:sldIdLst>
   <p:sldSz cx="9144000" cy="6858000" type="screen4x3"/>
   <p:notesSz cx="9925050" cy="6665913"/>
@@ -6293,7 +6294,7 @@
         </p:nvSpPr>
         <p:spPr>
           <a:xfrm>
-            <a:off x="318960" y="1774080"/>
+            <a:off x="324360" y="1774080"/>
             <a:ext cx="8508600" cy="4699080"/>
           </a:xfrm>
           <a:prstGeom prst="rect">
@@ -6620,10 +6621,10 @@
       </p:sp>
       <p:pic>
         <p:nvPicPr>
-          <p:cNvPr id="5" name="Picture 4">
+          <p:cNvPr id="3" name="Picture 2">
             <a:extLst>
               <a:ext uri="{FF2B5EF4-FFF2-40B4-BE49-F238E27FC236}">
-                <a16:creationId xmlns:a16="http://schemas.microsoft.com/office/drawing/2014/main" id="{34571C0B-433C-48D6-A110-0262FF52A8C8}"/>
+                <a16:creationId xmlns:a16="http://schemas.microsoft.com/office/drawing/2014/main" id="{237352DB-C12A-4E04-9828-970DFBBF71E6}"/>
               </a:ext>
             </a:extLst>
           </p:cNvPr>
@@ -6646,8 +6647,8 @@
         </p:blipFill>
         <p:spPr>
           <a:xfrm>
-            <a:off x="2645595" y="2167847"/>
-            <a:ext cx="4407053" cy="4305313"/>
+            <a:off x="2651908" y="2167847"/>
+            <a:ext cx="4396659" cy="4305313"/>
           </a:xfrm>
           <a:prstGeom prst="rect">
             <a:avLst/>
@@ -6657,7 +6658,7 @@
     </p:spTree>
     <p:extLst>
       <p:ext uri="{BB962C8B-B14F-4D97-AF65-F5344CB8AC3E}">
-        <p14:creationId xmlns:p14="http://schemas.microsoft.com/office/powerpoint/2010/main" val="3733729701"/>
+        <p14:creationId xmlns:p14="http://schemas.microsoft.com/office/powerpoint/2010/main" val="3841136379"/>
       </p:ext>
     </p:extLst>
   </p:cSld>
@@ -7080,46 +7081,10 @@
           </a:prstGeom>
         </p:spPr>
       </p:pic>
-      <p:pic>
-        <p:nvPicPr>
-          <p:cNvPr id="3" name="Picture 2">
-            <a:extLst>
-              <a:ext uri="{FF2B5EF4-FFF2-40B4-BE49-F238E27FC236}">
-                <a16:creationId xmlns:a16="http://schemas.microsoft.com/office/drawing/2014/main" id="{825D0797-F206-4041-A4C7-37B404C2004D}"/>
-              </a:ext>
-            </a:extLst>
-          </p:cNvPr>
-          <p:cNvPicPr>
-            <a:picLocks noChangeAspect="1"/>
-          </p:cNvPicPr>
-          <p:nvPr/>
-        </p:nvPicPr>
-        <p:blipFill>
-          <a:blip r:embed="rId3">
-            <a:extLst>
-              <a:ext uri="{28A0092B-C50C-407E-A947-70E740481C1C}">
-                <a14:useLocalDpi xmlns:a14="http://schemas.microsoft.com/office/drawing/2010/main" val="0"/>
-              </a:ext>
-            </a:extLst>
-          </a:blip>
-          <a:stretch>
-            <a:fillRect/>
-          </a:stretch>
-        </p:blipFill>
-        <p:spPr>
-          <a:xfrm>
-            <a:off x="2645595" y="2167846"/>
-            <a:ext cx="4384701" cy="4305313"/>
-          </a:xfrm>
-          <a:prstGeom prst="rect">
-            <a:avLst/>
-          </a:prstGeom>
-        </p:spPr>
-      </p:pic>
     </p:spTree>
     <p:extLst>
       <p:ext uri="{BB962C8B-B14F-4D97-AF65-F5344CB8AC3E}">
-        <p14:creationId xmlns:p14="http://schemas.microsoft.com/office/powerpoint/2010/main" val="1797382101"/>
+        <p14:creationId xmlns:p14="http://schemas.microsoft.com/office/powerpoint/2010/main" val="3733729701"/>
       </p:ext>
     </p:extLst>
   </p:cSld>
@@ -7175,13 +7140,13 @@
       </p:grpSpPr>
       <p:sp>
         <p:nvSpPr>
-          <p:cNvPr id="105" name="TextShape 1"/>
+          <p:cNvPr id="101" name="TextShape 1"/>
           <p:cNvSpPr txBox="1"/>
           <p:nvPr/>
         </p:nvSpPr>
         <p:spPr>
           <a:xfrm>
-            <a:off x="318960" y="1762200"/>
+            <a:off x="318960" y="1774080"/>
             <a:ext cx="8508600" cy="4699080"/>
           </a:xfrm>
           <a:prstGeom prst="rect">
@@ -7204,193 +7169,55 @@
               <a:buChar char="•"/>
             </a:pPr>
             <a:r>
-              <a:rPr lang="en-US" sz="2200" b="0" strike="noStrike" spc="-1" dirty="0">
-                <a:solidFill>
-                  <a:srgbClr val="000000"/>
-                </a:solidFill>
-                <a:uFill>
-                  <a:solidFill>
-                    <a:srgbClr val="FFFFFF"/>
-                  </a:solidFill>
-                </a:uFill>
-                <a:latin typeface="Arial"/>
-              </a:rPr>
-              <a:t>What we have done till now</a:t>
-            </a:r>
-          </a:p>
-          <a:p>
-            <a:pPr marL="800100" lvl="1" indent="-342900">
+              <a:rPr lang="en-US" sz="2200" spc="-1" dirty="0">
+                <a:solidFill>
+                  <a:srgbClr val="000000"/>
+                </a:solidFill>
+                <a:uFill>
+                  <a:solidFill>
+                    <a:srgbClr val="FFFFFF"/>
+                  </a:solidFill>
+                </a:uFill>
+              </a:rPr>
+              <a:t>Select and Extract Cells around the Hole</a:t>
+            </a:r>
+            <a:endParaRPr lang="en-US" sz="2200" b="0" strike="noStrike" spc="-1" dirty="0">
+              <a:solidFill>
+                <a:srgbClr val="000000"/>
+              </a:solidFill>
+              <a:uFill>
+                <a:solidFill>
+                  <a:srgbClr val="FFFFFF"/>
+                </a:solidFill>
+              </a:uFill>
+              <a:latin typeface="Arial"/>
+            </a:endParaRPr>
+          </a:p>
+          <a:p>
+            <a:pPr marL="342900" indent="-342900">
               <a:lnSpc>
                 <a:spcPct val="114000"/>
               </a:lnSpc>
               <a:buFont typeface="Arial" panose="020B0604020202020204" pitchFamily="34" charset="0"/>
               <a:buChar char="•"/>
             </a:pPr>
-            <a:r>
-              <a:rPr lang="en-US" sz="2200" spc="-1" dirty="0">
-                <a:solidFill>
-                  <a:srgbClr val="000000"/>
-                </a:solidFill>
-                <a:uFill>
-                  <a:solidFill>
-                    <a:srgbClr val="FFFFFF"/>
-                  </a:solidFill>
-                </a:uFill>
-                <a:latin typeface="Arial"/>
-              </a:rPr>
-              <a:t>Getting to know the tools</a:t>
-            </a:r>
-          </a:p>
-          <a:p>
-            <a:pPr marL="1257300" lvl="2" indent="-342900">
+            <a:endParaRPr lang="en-US" sz="2200" spc="-1" dirty="0">
+              <a:solidFill>
+                <a:srgbClr val="000000"/>
+              </a:solidFill>
+              <a:uFill>
+                <a:solidFill>
+                  <a:srgbClr val="FFFFFF"/>
+                </a:solidFill>
+              </a:uFill>
+              <a:latin typeface="Arial"/>
+            </a:endParaRPr>
+          </a:p>
+          <a:p>
+            <a:pPr>
               <a:lnSpc>
                 <a:spcPct val="114000"/>
               </a:lnSpc>
-              <a:buFont typeface="Arial" panose="020B0604020202020204" pitchFamily="34" charset="0"/>
-              <a:buChar char="•"/>
-            </a:pPr>
-            <a:r>
-              <a:rPr lang="en-US" sz="2200" b="0" strike="noStrike" spc="-1" dirty="0">
-                <a:solidFill>
-                  <a:srgbClr val="000000"/>
-                </a:solidFill>
-                <a:uFill>
-                  <a:solidFill>
-                    <a:srgbClr val="FFFFFF"/>
-                  </a:solidFill>
-                </a:uFill>
-                <a:latin typeface="Arial"/>
-              </a:rPr>
-              <a:t>Ubuntu</a:t>
-            </a:r>
-          </a:p>
-          <a:p>
-            <a:pPr marL="1257300" lvl="2" indent="-342900">
-              <a:lnSpc>
-                <a:spcPct val="114000"/>
-              </a:lnSpc>
-              <a:buFont typeface="Arial" panose="020B0604020202020204" pitchFamily="34" charset="0"/>
-              <a:buChar char="•"/>
-            </a:pPr>
-            <a:r>
-              <a:rPr lang="en-US" sz="2200" spc="-1" dirty="0">
-                <a:solidFill>
-                  <a:srgbClr val="000000"/>
-                </a:solidFill>
-                <a:uFill>
-                  <a:solidFill>
-                    <a:srgbClr val="FFFFFF"/>
-                  </a:solidFill>
-                </a:uFill>
-                <a:latin typeface="Arial"/>
-              </a:rPr>
-              <a:t>Paraview</a:t>
-            </a:r>
-          </a:p>
-          <a:p>
-            <a:pPr marL="1257300" lvl="2" indent="-342900">
-              <a:lnSpc>
-                <a:spcPct val="114000"/>
-              </a:lnSpc>
-              <a:buFont typeface="Arial" panose="020B0604020202020204" pitchFamily="34" charset="0"/>
-              <a:buChar char="•"/>
-            </a:pPr>
-            <a:r>
-              <a:rPr lang="en-US" sz="2200" b="0" strike="noStrike" spc="-1" dirty="0">
-                <a:solidFill>
-                  <a:srgbClr val="000000"/>
-                </a:solidFill>
-                <a:uFill>
-                  <a:solidFill>
-                    <a:srgbClr val="FFFFFF"/>
-                  </a:solidFill>
-                </a:uFill>
-                <a:latin typeface="Arial"/>
-              </a:rPr>
-              <a:t>Python</a:t>
-            </a:r>
-          </a:p>
-          <a:p>
-            <a:pPr marL="1257300" lvl="2" indent="-342900">
-              <a:lnSpc>
-                <a:spcPct val="114000"/>
-              </a:lnSpc>
-              <a:buFont typeface="Arial" panose="020B0604020202020204" pitchFamily="34" charset="0"/>
-              <a:buChar char="•"/>
-            </a:pPr>
-            <a:r>
-              <a:rPr lang="en-US" sz="2200" spc="-1" dirty="0">
-                <a:solidFill>
-                  <a:srgbClr val="000000"/>
-                </a:solidFill>
-                <a:uFill>
-                  <a:solidFill>
-                    <a:srgbClr val="FFFFFF"/>
-                  </a:solidFill>
-                </a:uFill>
-                <a:latin typeface="Arial"/>
-              </a:rPr>
-              <a:t>GIT</a:t>
-            </a:r>
-          </a:p>
-          <a:p>
-            <a:pPr marL="800100" lvl="1" indent="-342900">
-              <a:lnSpc>
-                <a:spcPct val="114000"/>
-              </a:lnSpc>
-              <a:buFont typeface="Arial" panose="020B0604020202020204" pitchFamily="34" charset="0"/>
-              <a:buChar char="•"/>
-            </a:pPr>
-            <a:r>
-              <a:rPr lang="en-US" sz="2200" spc="-1" dirty="0">
-                <a:solidFill>
-                  <a:srgbClr val="000000"/>
-                </a:solidFill>
-                <a:uFill>
-                  <a:solidFill>
-                    <a:srgbClr val="FFFFFF"/>
-                  </a:solidFill>
-                </a:uFill>
-                <a:latin typeface="Arial"/>
-              </a:rPr>
-              <a:t>Introduction to .</a:t>
-            </a:r>
-            <a:r>
-              <a:rPr lang="en-US" sz="2200" spc="-1" dirty="0" err="1">
-                <a:solidFill>
-                  <a:srgbClr val="000000"/>
-                </a:solidFill>
-                <a:uFill>
-                  <a:solidFill>
-                    <a:srgbClr val="FFFFFF"/>
-                  </a:solidFill>
-                </a:uFill>
-                <a:latin typeface="Arial"/>
-              </a:rPr>
-              <a:t>vtu</a:t>
-            </a:r>
-            <a:r>
-              <a:rPr lang="en-US" sz="2200" spc="-1" dirty="0">
-                <a:solidFill>
-                  <a:srgbClr val="000000"/>
-                </a:solidFill>
-                <a:uFill>
-                  <a:solidFill>
-                    <a:srgbClr val="FFFFFF"/>
-                  </a:solidFill>
-                </a:uFill>
-                <a:latin typeface="Arial"/>
-              </a:rPr>
-              <a:t> format</a:t>
-            </a:r>
-          </a:p>
-          <a:p>
-            <a:pPr marL="800100" lvl="1" indent="-342900">
-              <a:lnSpc>
-                <a:spcPct val="114000"/>
-              </a:lnSpc>
-              <a:buFont typeface="Arial" panose="020B0604020202020204" pitchFamily="34" charset="0"/>
-              <a:buChar char="•"/>
             </a:pPr>
             <a:endParaRPr lang="en-US" sz="2200" spc="-1" dirty="0">
               <a:solidFill>
@@ -7404,192 +7231,11 @@
               <a:latin typeface="Arial"/>
             </a:endParaRPr>
           </a:p>
-          <a:p>
-            <a:pPr marL="800100" lvl="1" indent="-342900">
-              <a:lnSpc>
-                <a:spcPct val="114000"/>
-              </a:lnSpc>
-              <a:buFont typeface="Arial" panose="020B0604020202020204" pitchFamily="34" charset="0"/>
-              <a:buChar char="•"/>
-            </a:pPr>
-            <a:endParaRPr lang="en-US" sz="2200" spc="-1" dirty="0">
-              <a:solidFill>
-                <a:srgbClr val="000000"/>
-              </a:solidFill>
-              <a:uFill>
-                <a:solidFill>
-                  <a:srgbClr val="FFFFFF"/>
-                </a:solidFill>
-              </a:uFill>
-              <a:latin typeface="Arial"/>
-            </a:endParaRPr>
-          </a:p>
-          <a:p>
-            <a:pPr marL="800100" lvl="1" indent="-342900">
-              <a:lnSpc>
-                <a:spcPct val="114000"/>
-              </a:lnSpc>
-              <a:buFont typeface="Arial" panose="020B0604020202020204" pitchFamily="34" charset="0"/>
-              <a:buChar char="•"/>
-            </a:pPr>
-            <a:endParaRPr lang="en-US" sz="2200" spc="-1" dirty="0">
-              <a:solidFill>
-                <a:srgbClr val="000000"/>
-              </a:solidFill>
-              <a:uFill>
-                <a:solidFill>
-                  <a:srgbClr val="FFFFFF"/>
-                </a:solidFill>
-              </a:uFill>
-              <a:latin typeface="Arial"/>
-            </a:endParaRPr>
-          </a:p>
-          <a:p>
-            <a:pPr marL="800100" lvl="1" indent="-342900">
-              <a:lnSpc>
-                <a:spcPct val="114000"/>
-              </a:lnSpc>
-              <a:buFont typeface="Arial" panose="020B0604020202020204" pitchFamily="34" charset="0"/>
-              <a:buChar char="•"/>
-            </a:pPr>
-            <a:r>
-              <a:rPr lang="en-US" sz="2200" spc="-1" dirty="0">
-                <a:solidFill>
-                  <a:srgbClr val="000000"/>
-                </a:solidFill>
-                <a:uFill>
-                  <a:solidFill>
-                    <a:srgbClr val="FFFFFF"/>
-                  </a:solidFill>
-                </a:uFill>
-                <a:latin typeface="Arial"/>
-              </a:rPr>
-              <a:t>Scripting in </a:t>
-            </a:r>
-            <a:r>
-              <a:rPr lang="en-US" sz="2200" spc="-1" dirty="0" err="1">
-                <a:solidFill>
-                  <a:srgbClr val="000000"/>
-                </a:solidFill>
-                <a:uFill>
-                  <a:solidFill>
-                    <a:srgbClr val="FFFFFF"/>
-                  </a:solidFill>
-                </a:uFill>
-                <a:latin typeface="Arial"/>
-              </a:rPr>
-              <a:t>Pvpython</a:t>
-            </a:r>
-            <a:endParaRPr lang="en-US" sz="2200" spc="-1" dirty="0">
-              <a:solidFill>
-                <a:srgbClr val="000000"/>
-              </a:solidFill>
-              <a:uFill>
-                <a:solidFill>
-                  <a:srgbClr val="FFFFFF"/>
-                </a:solidFill>
-              </a:uFill>
-              <a:latin typeface="Arial"/>
-            </a:endParaRPr>
-          </a:p>
-          <a:p>
-            <a:pPr marL="800100" lvl="1" indent="-342900">
-              <a:lnSpc>
-                <a:spcPct val="114000"/>
-              </a:lnSpc>
-              <a:buFont typeface="Arial" panose="020B0604020202020204" pitchFamily="34" charset="0"/>
-              <a:buChar char="•"/>
-            </a:pPr>
-            <a:endParaRPr lang="en-US" sz="2200" spc="-1" dirty="0">
-              <a:solidFill>
-                <a:srgbClr val="000000"/>
-              </a:solidFill>
-              <a:uFill>
-                <a:solidFill>
-                  <a:srgbClr val="FFFFFF"/>
-                </a:solidFill>
-              </a:uFill>
-              <a:latin typeface="Arial"/>
-            </a:endParaRPr>
-          </a:p>
-          <a:p>
-            <a:pPr marL="800100" lvl="1" indent="-342900">
-              <a:lnSpc>
-                <a:spcPct val="114000"/>
-              </a:lnSpc>
-              <a:buFont typeface="Arial" panose="020B0604020202020204" pitchFamily="34" charset="0"/>
-              <a:buChar char="•"/>
-            </a:pPr>
-            <a:endParaRPr lang="en-US" sz="2200" spc="-1" dirty="0">
-              <a:solidFill>
-                <a:srgbClr val="000000"/>
-              </a:solidFill>
-              <a:uFill>
-                <a:solidFill>
-                  <a:srgbClr val="FFFFFF"/>
-                </a:solidFill>
-              </a:uFill>
-              <a:latin typeface="Arial"/>
-            </a:endParaRPr>
-          </a:p>
-          <a:p>
-            <a:pPr lvl="2">
-              <a:lnSpc>
-                <a:spcPct val="114000"/>
-              </a:lnSpc>
-            </a:pPr>
-            <a:endParaRPr lang="en-US" sz="2200" spc="-1" dirty="0">
-              <a:solidFill>
-                <a:srgbClr val="000000"/>
-              </a:solidFill>
-              <a:uFill>
-                <a:solidFill>
-                  <a:srgbClr val="FFFFFF"/>
-                </a:solidFill>
-              </a:uFill>
-              <a:latin typeface="Arial"/>
-            </a:endParaRPr>
-          </a:p>
-          <a:p>
-            <a:pPr lvl="2">
-              <a:lnSpc>
-                <a:spcPct val="114000"/>
-              </a:lnSpc>
-            </a:pPr>
-            <a:endParaRPr lang="en-US" sz="2200" spc="-1" dirty="0">
-              <a:solidFill>
-                <a:srgbClr val="000000"/>
-              </a:solidFill>
-              <a:uFill>
-                <a:solidFill>
-                  <a:srgbClr val="FFFFFF"/>
-                </a:solidFill>
-              </a:uFill>
-            </a:endParaRPr>
-          </a:p>
-          <a:p>
-            <a:pPr lvl="2">
-              <a:lnSpc>
-                <a:spcPct val="114000"/>
-              </a:lnSpc>
-            </a:pPr>
-            <a:endParaRPr lang="en-US" sz="2200" spc="-1" dirty="0">
-              <a:solidFill>
-                <a:srgbClr val="000000"/>
-              </a:solidFill>
-              <a:uFill>
-                <a:solidFill>
-                  <a:srgbClr val="FFFFFF"/>
-                </a:solidFill>
-              </a:uFill>
-              <a:latin typeface="Arial"/>
-            </a:endParaRPr>
-          </a:p>
-        </p:txBody>
-      </p:sp>
-      <p:sp>
-        <p:nvSpPr>
-          <p:cNvPr id="106" name="TextShape 2"/>
+        </p:txBody>
+      </p:sp>
+      <p:sp>
+        <p:nvSpPr>
+          <p:cNvPr id="102" name="TextShape 2"/>
           <p:cNvSpPr txBox="1"/>
           <p:nvPr/>
         </p:nvSpPr>
@@ -7615,7 +7261,7 @@
                 <a:spcPct val="100000"/>
               </a:lnSpc>
             </a:pPr>
-            <a:fld id="{4B44C603-F75B-4368-8B11-8EC5E8B93C11}" type="slidenum">
+            <a:fld id="{F10E84C2-3D4A-4B54-B745-F6C41176937F}" type="slidenum">
               <a:rPr lang="de-DE" sz="1200" b="0" strike="noStrike" spc="-1">
                 <a:solidFill>
                   <a:srgbClr val="000000"/>
@@ -7645,7 +7291,7 @@
       </p:sp>
       <p:sp>
         <p:nvSpPr>
-          <p:cNvPr id="107" name="TextShape 3"/>
+          <p:cNvPr id="103" name="TextShape 3"/>
           <p:cNvSpPr txBox="1"/>
           <p:nvPr/>
         </p:nvSpPr>
@@ -7771,13 +7417,13 @@
       </p:sp>
       <p:sp>
         <p:nvSpPr>
-          <p:cNvPr id="108" name="TextShape 4"/>
+          <p:cNvPr id="104" name="TextShape 4"/>
           <p:cNvSpPr txBox="1"/>
           <p:nvPr/>
         </p:nvSpPr>
         <p:spPr>
           <a:xfrm>
-            <a:off x="318960" y="994320"/>
+            <a:off x="318960" y="984046"/>
             <a:ext cx="8508600" cy="410040"/>
           </a:xfrm>
           <a:prstGeom prst="rect">
@@ -7809,7 +7455,7 @@
                 </a:uFill>
                 <a:latin typeface="Arial"/>
               </a:rPr>
-              <a:t>Timeline</a:t>
+              <a:t>Features</a:t>
             </a:r>
             <a:endParaRPr lang="en-US" sz="2200" b="0" strike="noStrike" spc="-1" dirty="0">
               <a:solidFill>
@@ -7825,7 +7471,84 @@
           </a:p>
         </p:txBody>
       </p:sp>
+      <p:pic>
+        <p:nvPicPr>
+          <p:cNvPr id="5" name="Picture 4">
+            <a:extLst>
+              <a:ext uri="{FF2B5EF4-FFF2-40B4-BE49-F238E27FC236}">
+                <a16:creationId xmlns:a16="http://schemas.microsoft.com/office/drawing/2014/main" id="{34571C0B-433C-48D6-A110-0262FF52A8C8}"/>
+              </a:ext>
+            </a:extLst>
+          </p:cNvPr>
+          <p:cNvPicPr>
+            <a:picLocks noChangeAspect="1"/>
+          </p:cNvPicPr>
+          <p:nvPr/>
+        </p:nvPicPr>
+        <p:blipFill>
+          <a:blip r:embed="rId2">
+            <a:extLst>
+              <a:ext uri="{28A0092B-C50C-407E-A947-70E740481C1C}">
+                <a14:useLocalDpi xmlns:a14="http://schemas.microsoft.com/office/drawing/2010/main" val="0"/>
+              </a:ext>
+            </a:extLst>
+          </a:blip>
+          <a:stretch>
+            <a:fillRect/>
+          </a:stretch>
+        </p:blipFill>
+        <p:spPr>
+          <a:xfrm>
+            <a:off x="2645595" y="2167847"/>
+            <a:ext cx="4407053" cy="4305313"/>
+          </a:xfrm>
+          <a:prstGeom prst="rect">
+            <a:avLst/>
+          </a:prstGeom>
+        </p:spPr>
+      </p:pic>
+      <p:pic>
+        <p:nvPicPr>
+          <p:cNvPr id="3" name="Picture 2">
+            <a:extLst>
+              <a:ext uri="{FF2B5EF4-FFF2-40B4-BE49-F238E27FC236}">
+                <a16:creationId xmlns:a16="http://schemas.microsoft.com/office/drawing/2014/main" id="{825D0797-F206-4041-A4C7-37B404C2004D}"/>
+              </a:ext>
+            </a:extLst>
+          </p:cNvPr>
+          <p:cNvPicPr>
+            <a:picLocks noChangeAspect="1"/>
+          </p:cNvPicPr>
+          <p:nvPr/>
+        </p:nvPicPr>
+        <p:blipFill>
+          <a:blip r:embed="rId3">
+            <a:extLst>
+              <a:ext uri="{28A0092B-C50C-407E-A947-70E740481C1C}">
+                <a14:useLocalDpi xmlns:a14="http://schemas.microsoft.com/office/drawing/2010/main" val="0"/>
+              </a:ext>
+            </a:extLst>
+          </a:blip>
+          <a:stretch>
+            <a:fillRect/>
+          </a:stretch>
+        </p:blipFill>
+        <p:spPr>
+          <a:xfrm>
+            <a:off x="2645595" y="2167846"/>
+            <a:ext cx="4384701" cy="4305313"/>
+          </a:xfrm>
+          <a:prstGeom prst="rect">
+            <a:avLst/>
+          </a:prstGeom>
+        </p:spPr>
+      </p:pic>
     </p:spTree>
+    <p:extLst>
+      <p:ext uri="{BB962C8B-B14F-4D97-AF65-F5344CB8AC3E}">
+        <p14:creationId xmlns:p14="http://schemas.microsoft.com/office/powerpoint/2010/main" val="1797382101"/>
+      </p:ext>
+    </p:extLst>
   </p:cSld>
   <p:clrMapOvr>
     <a:masterClrMapping/>
@@ -7908,18 +7631,18 @@
               <a:buChar char="•"/>
             </a:pPr>
             <a:r>
-              <a:rPr lang="en-US" sz="2200" spc="-1" dirty="0">
-                <a:solidFill>
-                  <a:srgbClr val="000000"/>
-                </a:solidFill>
-                <a:uFill>
-                  <a:solidFill>
-                    <a:srgbClr val="FFFFFF"/>
-                  </a:solidFill>
-                </a:uFill>
-                <a:latin typeface="Arial"/>
-              </a:rPr>
-              <a:t>Next Steps:</a:t>
+              <a:rPr lang="en-US" sz="2200" b="0" strike="noStrike" spc="-1" dirty="0">
+                <a:solidFill>
+                  <a:srgbClr val="000000"/>
+                </a:solidFill>
+                <a:uFill>
+                  <a:solidFill>
+                    <a:srgbClr val="FFFFFF"/>
+                  </a:solidFill>
+                </a:uFill>
+                <a:latin typeface="Arial"/>
+              </a:rPr>
+              <a:t>What we have done till now</a:t>
             </a:r>
           </a:p>
           <a:p>
@@ -7942,71 +7665,80 @@
                 </a:uFill>
                 <a:latin typeface="Arial"/>
               </a:rPr>
-              <a:t>Standardizing existing scripts</a:t>
-            </a:r>
-          </a:p>
-          <a:p>
-            <a:pPr marL="800100" lvl="1" indent="-342900">
+              <a:t>Getting to know the tools</a:t>
+            </a:r>
+          </a:p>
+          <a:p>
+            <a:pPr marL="1257300" lvl="2" indent="-342900">
               <a:lnSpc>
                 <a:spcPct val="114000"/>
               </a:lnSpc>
               <a:buFont typeface="Arial" panose="020B0604020202020204" pitchFamily="34" charset="0"/>
               <a:buChar char="•"/>
             </a:pPr>
-            <a:endParaRPr lang="en-US" sz="2200" spc="-1" dirty="0">
-              <a:solidFill>
-                <a:srgbClr val="000000"/>
-              </a:solidFill>
-              <a:uFill>
-                <a:solidFill>
-                  <a:srgbClr val="FFFFFF"/>
-                </a:solidFill>
-              </a:uFill>
-              <a:latin typeface="Arial"/>
-            </a:endParaRPr>
-          </a:p>
-          <a:p>
-            <a:pPr marL="800100" lvl="1" indent="-342900">
+            <a:r>
+              <a:rPr lang="en-US" sz="2200" b="0" strike="noStrike" spc="-1" dirty="0">
+                <a:solidFill>
+                  <a:srgbClr val="000000"/>
+                </a:solidFill>
+                <a:uFill>
+                  <a:solidFill>
+                    <a:srgbClr val="FFFFFF"/>
+                  </a:solidFill>
+                </a:uFill>
+                <a:latin typeface="Arial"/>
+              </a:rPr>
+              <a:t>Ubuntu</a:t>
+            </a:r>
+          </a:p>
+          <a:p>
+            <a:pPr marL="1257300" lvl="2" indent="-342900">
               <a:lnSpc>
                 <a:spcPct val="114000"/>
               </a:lnSpc>
               <a:buFont typeface="Arial" panose="020B0604020202020204" pitchFamily="34" charset="0"/>
               <a:buChar char="•"/>
             </a:pPr>
-            <a:endParaRPr lang="en-US" sz="2200" spc="-1" dirty="0">
-              <a:solidFill>
-                <a:srgbClr val="000000"/>
-              </a:solidFill>
-              <a:uFill>
-                <a:solidFill>
-                  <a:srgbClr val="FFFFFF"/>
-                </a:solidFill>
-              </a:uFill>
-              <a:latin typeface="Arial"/>
-            </a:endParaRPr>
-          </a:p>
-          <a:p>
-            <a:pPr marL="800100" lvl="1" indent="-342900">
+            <a:r>
+              <a:rPr lang="en-US" sz="2200" spc="-1" dirty="0">
+                <a:solidFill>
+                  <a:srgbClr val="000000"/>
+                </a:solidFill>
+                <a:uFill>
+                  <a:solidFill>
+                    <a:srgbClr val="FFFFFF"/>
+                  </a:solidFill>
+                </a:uFill>
+                <a:latin typeface="Arial"/>
+              </a:rPr>
+              <a:t>Paraview</a:t>
+            </a:r>
+          </a:p>
+          <a:p>
+            <a:pPr marL="1257300" lvl="2" indent="-342900">
               <a:lnSpc>
                 <a:spcPct val="114000"/>
               </a:lnSpc>
               <a:buFont typeface="Arial" panose="020B0604020202020204" pitchFamily="34" charset="0"/>
               <a:buChar char="•"/>
             </a:pPr>
-            <a:endParaRPr lang="en-US" sz="2200" spc="-1" dirty="0">
-              <a:solidFill>
-                <a:srgbClr val="000000"/>
-              </a:solidFill>
-              <a:uFill>
-                <a:solidFill>
-                  <a:srgbClr val="FFFFFF"/>
-                </a:solidFill>
-              </a:uFill>
-              <a:latin typeface="Arial"/>
-            </a:endParaRPr>
-          </a:p>
-          <a:p>
-            <a:pPr marL="800100" lvl="1" indent="-342900">
+            <a:r>
+              <a:rPr lang="en-US" sz="2200" b="0" strike="noStrike" spc="-1" dirty="0">
+                <a:solidFill>
+                  <a:srgbClr val="000000"/>
+                </a:solidFill>
+                <a:uFill>
+                  <a:solidFill>
+                    <a:srgbClr val="FFFFFF"/>
+                  </a:solidFill>
+                </a:uFill>
+                <a:latin typeface="Arial"/>
+              </a:rPr>
+              <a:t>Python</a:t>
+            </a:r>
+          </a:p>
+          <a:p>
+            <a:pPr marL="1257300" lvl="2" indent="-342900">
               <a:lnSpc>
                 <a:spcPct val="114000"/>
               </a:lnSpc>
@@ -8025,11 +7757,11 @@
                 </a:uFill>
                 <a:latin typeface="Arial"/>
               </a:rPr>
-              <a:t>Further Experiments with Extraction methods</a:t>
-            </a:r>
-          </a:p>
-          <a:p>
-            <a:pPr marL="1257300" lvl="2" indent="-342900">
+              <a:t>GIT</a:t>
+            </a:r>
+          </a:p>
+          <a:p>
+            <a:pPr marL="800100" lvl="1" indent="-342900">
               <a:lnSpc>
                 <a:spcPct val="114000"/>
               </a:lnSpc>
@@ -8048,7 +7780,35 @@
                 </a:uFill>
                 <a:latin typeface="Arial"/>
               </a:rPr>
-              <a:t>Is there a better way? </a:t>
+              <a:t>Introduction to .</a:t>
+            </a:r>
+            <a:r>
+              <a:rPr lang="en-US" sz="2200" spc="-1" dirty="0" err="1">
+                <a:solidFill>
+                  <a:srgbClr val="000000"/>
+                </a:solidFill>
+                <a:uFill>
+                  <a:solidFill>
+                    <a:srgbClr val="FFFFFF"/>
+                  </a:solidFill>
+                </a:uFill>
+                <a:latin typeface="Arial"/>
+              </a:rPr>
+              <a:t>vtu</a:t>
+            </a:r>
+            <a:r>
+              <a:rPr lang="en-US" sz="2200" spc="-1" dirty="0">
+                <a:solidFill>
+                  <a:srgbClr val="000000"/>
+                </a:solidFill>
+                <a:uFill>
+                  <a:solidFill>
+                    <a:srgbClr val="FFFFFF"/>
+                  </a:solidFill>
+                </a:uFill>
+                <a:latin typeface="Arial"/>
+              </a:rPr>
+              <a:t> format</a:t>
             </a:r>
           </a:p>
           <a:p>
@@ -8092,24 +7852,6 @@
             </a:endParaRPr>
           </a:p>
           <a:p>
-            <a:pPr lvl="1">
-              <a:lnSpc>
-                <a:spcPct val="114000"/>
-              </a:lnSpc>
-            </a:pPr>
-            <a:endParaRPr lang="en-US" sz="2200" spc="-1" dirty="0">
-              <a:solidFill>
-                <a:srgbClr val="000000"/>
-              </a:solidFill>
-              <a:uFill>
-                <a:solidFill>
-                  <a:srgbClr val="FFFFFF"/>
-                </a:solidFill>
-              </a:uFill>
-              <a:latin typeface="Arial"/>
-            </a:endParaRPr>
-          </a:p>
-          <a:p>
             <a:pPr marL="800100" lvl="1" indent="-342900">
               <a:lnSpc>
                 <a:spcPct val="114000"/>
@@ -8117,29 +7859,54 @@
               <a:buFont typeface="Arial" panose="020B0604020202020204" pitchFamily="34" charset="0"/>
               <a:buChar char="•"/>
             </a:pPr>
-            <a:r>
-              <a:rPr lang="en-US" sz="2200" spc="-1" dirty="0">
-                <a:solidFill>
-                  <a:srgbClr val="000000"/>
-                </a:solidFill>
-                <a:uFill>
-                  <a:solidFill>
-                    <a:srgbClr val="FFFFFF"/>
-                  </a:solidFill>
-                </a:uFill>
-                <a:latin typeface="Arial"/>
-              </a:rPr>
-              <a:t>Adding New Functionalities</a:t>
-            </a:r>
-          </a:p>
-          <a:p>
-            <a:pPr marL="1257300" lvl="2" indent="-342900">
+            <a:endParaRPr lang="en-US" sz="2200" spc="-1" dirty="0">
+              <a:solidFill>
+                <a:srgbClr val="000000"/>
+              </a:solidFill>
+              <a:uFill>
+                <a:solidFill>
+                  <a:srgbClr val="FFFFFF"/>
+                </a:solidFill>
+              </a:uFill>
+              <a:latin typeface="Arial"/>
+            </a:endParaRPr>
+          </a:p>
+          <a:p>
+            <a:pPr marL="800100" lvl="1" indent="-342900">
               <a:lnSpc>
                 <a:spcPct val="114000"/>
               </a:lnSpc>
               <a:buFont typeface="Arial" panose="020B0604020202020204" pitchFamily="34" charset="0"/>
               <a:buChar char="•"/>
             </a:pPr>
+            <a:r>
+              <a:rPr lang="en-US" sz="2200" spc="-1" dirty="0">
+                <a:solidFill>
+                  <a:srgbClr val="000000"/>
+                </a:solidFill>
+                <a:uFill>
+                  <a:solidFill>
+                    <a:srgbClr val="FFFFFF"/>
+                  </a:solidFill>
+                </a:uFill>
+                <a:latin typeface="Arial"/>
+              </a:rPr>
+              <a:t>Scripting in </a:t>
+            </a:r>
+            <a:r>
+              <a:rPr lang="en-US" sz="2200" spc="-1" dirty="0" err="1">
+                <a:solidFill>
+                  <a:srgbClr val="000000"/>
+                </a:solidFill>
+                <a:uFill>
+                  <a:solidFill>
+                    <a:srgbClr val="FFFFFF"/>
+                  </a:solidFill>
+                </a:uFill>
+                <a:latin typeface="Arial"/>
+              </a:rPr>
+              <a:t>PVPython</a:t>
+            </a:r>
             <a:endParaRPr lang="en-US" sz="2200" spc="-1" dirty="0">
               <a:solidFill>
                 <a:srgbClr val="000000"/>
@@ -8153,64 +7920,12 @@
             </a:endParaRPr>
           </a:p>
           <a:p>
-            <a:pPr lvl="1">
+            <a:pPr marL="800100" lvl="1" indent="-342900">
               <a:lnSpc>
                 <a:spcPct val="114000"/>
               </a:lnSpc>
-            </a:pPr>
-            <a:endParaRPr lang="en-US" sz="2200" spc="-1" dirty="0">
-              <a:solidFill>
-                <a:srgbClr val="000000"/>
-              </a:solidFill>
-              <a:uFill>
-                <a:solidFill>
-                  <a:srgbClr val="FFFFFF"/>
-                </a:solidFill>
-              </a:uFill>
-              <a:latin typeface="Arial"/>
-            </a:endParaRPr>
-          </a:p>
-          <a:p>
-            <a:pPr lvl="1">
-              <a:lnSpc>
-                <a:spcPct val="114000"/>
-              </a:lnSpc>
-            </a:pPr>
-            <a:endParaRPr lang="en-US" sz="2200" spc="-1" dirty="0">
-              <a:solidFill>
-                <a:srgbClr val="000000"/>
-              </a:solidFill>
-              <a:uFill>
-                <a:solidFill>
-                  <a:srgbClr val="FFFFFF"/>
-                </a:solidFill>
-              </a:uFill>
-              <a:latin typeface="Arial"/>
-            </a:endParaRPr>
-          </a:p>
-          <a:p>
-            <a:pPr lvl="1">
-              <a:lnSpc>
-                <a:spcPct val="114000"/>
-              </a:lnSpc>
-            </a:pPr>
-            <a:endParaRPr lang="en-US" sz="2200" spc="-1" dirty="0">
-              <a:solidFill>
-                <a:srgbClr val="000000"/>
-              </a:solidFill>
-              <a:uFill>
-                <a:solidFill>
-                  <a:srgbClr val="FFFFFF"/>
-                </a:solidFill>
-              </a:uFill>
-              <a:latin typeface="Arial"/>
-            </a:endParaRPr>
-          </a:p>
-          <a:p>
-            <a:pPr lvl="1">
-              <a:lnSpc>
-                <a:spcPct val="114000"/>
-              </a:lnSpc>
+              <a:buFont typeface="Arial" panose="020B0604020202020204" pitchFamily="34" charset="0"/>
+              <a:buChar char="•"/>
             </a:pPr>
             <a:endParaRPr lang="en-US" sz="2200" spc="-1" dirty="0">
               <a:solidFill>
@@ -8538,11 +8253,6 @@
         </p:txBody>
       </p:sp>
     </p:spTree>
-    <p:extLst>
-      <p:ext uri="{BB962C8B-B14F-4D97-AF65-F5344CB8AC3E}">
-        <p14:creationId xmlns:p14="http://schemas.microsoft.com/office/powerpoint/2010/main" val="3006752749"/>
-      </p:ext>
-    </p:extLst>
   </p:cSld>
   <p:clrMapOvr>
     <a:masterClrMapping/>
@@ -8596,7 +8306,7 @@
       </p:grpSpPr>
       <p:sp>
         <p:nvSpPr>
-          <p:cNvPr id="113" name="TextShape 1"/>
+          <p:cNvPr id="105" name="TextShape 1"/>
           <p:cNvSpPr txBox="1"/>
           <p:nvPr/>
         </p:nvSpPr>
@@ -8617,46 +8327,408 @@
           <a:bodyPr lIns="0" tIns="0" rIns="0" bIns="0"/>
           <a:lstStyle/>
           <a:p>
-            <a:pPr>
+            <a:pPr marL="342900" indent="-342900">
               <a:lnSpc>
                 <a:spcPct val="114000"/>
               </a:lnSpc>
-            </a:pPr>
-            <a:endParaRPr lang="de-DE" sz="1600" b="0" strike="noStrike" spc="-1">
-              <a:solidFill>
-                <a:srgbClr val="000000"/>
-              </a:solidFill>
-              <a:uFill>
-                <a:solidFill>
-                  <a:srgbClr val="FFFFFF"/>
-                </a:solidFill>
-              </a:uFill>
-              <a:latin typeface="Arial"/>
-            </a:endParaRPr>
-          </a:p>
-          <a:p>
-            <a:pPr>
+              <a:buFont typeface="Arial" panose="020B0604020202020204" pitchFamily="34" charset="0"/>
+              <a:buChar char="•"/>
+            </a:pPr>
+            <a:r>
+              <a:rPr lang="en-US" sz="2200" spc="-1" dirty="0">
+                <a:solidFill>
+                  <a:srgbClr val="000000"/>
+                </a:solidFill>
+                <a:uFill>
+                  <a:solidFill>
+                    <a:srgbClr val="FFFFFF"/>
+                  </a:solidFill>
+                </a:uFill>
+                <a:latin typeface="Arial"/>
+              </a:rPr>
+              <a:t>Next Steps:</a:t>
+            </a:r>
+          </a:p>
+          <a:p>
+            <a:pPr marL="800100" lvl="1" indent="-342900">
               <a:lnSpc>
                 <a:spcPct val="114000"/>
               </a:lnSpc>
-            </a:pPr>
-            <a:endParaRPr lang="de-DE" sz="1600" b="0" strike="noStrike" spc="-1">
-              <a:solidFill>
-                <a:srgbClr val="000000"/>
-              </a:solidFill>
-              <a:uFill>
-                <a:solidFill>
-                  <a:srgbClr val="FFFFFF"/>
-                </a:solidFill>
-              </a:uFill>
-              <a:latin typeface="Arial"/>
-            </a:endParaRPr>
-          </a:p>
-        </p:txBody>
-      </p:sp>
-      <p:sp>
-        <p:nvSpPr>
-          <p:cNvPr id="114" name="TextShape 2"/>
+              <a:buFont typeface="Arial" panose="020B0604020202020204" pitchFamily="34" charset="0"/>
+              <a:buChar char="•"/>
+            </a:pPr>
+            <a:r>
+              <a:rPr lang="en-US" sz="2200" spc="-1" dirty="0">
+                <a:solidFill>
+                  <a:srgbClr val="000000"/>
+                </a:solidFill>
+                <a:uFill>
+                  <a:solidFill>
+                    <a:srgbClr val="FFFFFF"/>
+                  </a:solidFill>
+                </a:uFill>
+                <a:latin typeface="Arial"/>
+              </a:rPr>
+              <a:t>Standardizing existing scripts</a:t>
+            </a:r>
+          </a:p>
+          <a:p>
+            <a:pPr marL="800100" lvl="1" indent="-342900">
+              <a:lnSpc>
+                <a:spcPct val="114000"/>
+              </a:lnSpc>
+              <a:buFont typeface="Arial" panose="020B0604020202020204" pitchFamily="34" charset="0"/>
+              <a:buChar char="•"/>
+            </a:pPr>
+            <a:endParaRPr lang="en-US" sz="2200" spc="-1" dirty="0">
+              <a:solidFill>
+                <a:srgbClr val="000000"/>
+              </a:solidFill>
+              <a:uFill>
+                <a:solidFill>
+                  <a:srgbClr val="FFFFFF"/>
+                </a:solidFill>
+              </a:uFill>
+              <a:latin typeface="Arial"/>
+            </a:endParaRPr>
+          </a:p>
+          <a:p>
+            <a:pPr marL="800100" lvl="1" indent="-342900">
+              <a:lnSpc>
+                <a:spcPct val="114000"/>
+              </a:lnSpc>
+              <a:buFont typeface="Arial" panose="020B0604020202020204" pitchFamily="34" charset="0"/>
+              <a:buChar char="•"/>
+            </a:pPr>
+            <a:endParaRPr lang="en-US" sz="2200" spc="-1" dirty="0">
+              <a:solidFill>
+                <a:srgbClr val="000000"/>
+              </a:solidFill>
+              <a:uFill>
+                <a:solidFill>
+                  <a:srgbClr val="FFFFFF"/>
+                </a:solidFill>
+              </a:uFill>
+              <a:latin typeface="Arial"/>
+            </a:endParaRPr>
+          </a:p>
+          <a:p>
+            <a:pPr marL="800100" lvl="1" indent="-342900">
+              <a:lnSpc>
+                <a:spcPct val="114000"/>
+              </a:lnSpc>
+              <a:buFont typeface="Arial" panose="020B0604020202020204" pitchFamily="34" charset="0"/>
+              <a:buChar char="•"/>
+            </a:pPr>
+            <a:endParaRPr lang="en-US" sz="2200" spc="-1" dirty="0">
+              <a:solidFill>
+                <a:srgbClr val="000000"/>
+              </a:solidFill>
+              <a:uFill>
+                <a:solidFill>
+                  <a:srgbClr val="FFFFFF"/>
+                </a:solidFill>
+              </a:uFill>
+              <a:latin typeface="Arial"/>
+            </a:endParaRPr>
+          </a:p>
+          <a:p>
+            <a:pPr marL="800100" lvl="1" indent="-342900">
+              <a:lnSpc>
+                <a:spcPct val="114000"/>
+              </a:lnSpc>
+              <a:buFont typeface="Arial" panose="020B0604020202020204" pitchFamily="34" charset="0"/>
+              <a:buChar char="•"/>
+            </a:pPr>
+            <a:r>
+              <a:rPr lang="en-US" sz="2200" spc="-1" dirty="0">
+                <a:solidFill>
+                  <a:srgbClr val="000000"/>
+                </a:solidFill>
+                <a:uFill>
+                  <a:solidFill>
+                    <a:srgbClr val="FFFFFF"/>
+                  </a:solidFill>
+                </a:uFill>
+                <a:latin typeface="Arial"/>
+              </a:rPr>
+              <a:t>Further Experiments with Extraction methods</a:t>
+            </a:r>
+          </a:p>
+          <a:p>
+            <a:pPr marL="1257300" lvl="2" indent="-342900">
+              <a:lnSpc>
+                <a:spcPct val="114000"/>
+              </a:lnSpc>
+              <a:buFont typeface="Arial" panose="020B0604020202020204" pitchFamily="34" charset="0"/>
+              <a:buChar char="•"/>
+            </a:pPr>
+            <a:r>
+              <a:rPr lang="en-US" sz="2200" spc="-1" dirty="0">
+                <a:solidFill>
+                  <a:srgbClr val="000000"/>
+                </a:solidFill>
+                <a:uFill>
+                  <a:solidFill>
+                    <a:srgbClr val="FFFFFF"/>
+                  </a:solidFill>
+                </a:uFill>
+                <a:latin typeface="Arial"/>
+              </a:rPr>
+              <a:t>Is there a better way? </a:t>
+            </a:r>
+          </a:p>
+          <a:p>
+            <a:pPr marL="800100" lvl="1" indent="-342900">
+              <a:lnSpc>
+                <a:spcPct val="114000"/>
+              </a:lnSpc>
+              <a:buFont typeface="Arial" panose="020B0604020202020204" pitchFamily="34" charset="0"/>
+              <a:buChar char="•"/>
+            </a:pPr>
+            <a:endParaRPr lang="en-US" sz="2200" spc="-1" dirty="0">
+              <a:solidFill>
+                <a:srgbClr val="000000"/>
+              </a:solidFill>
+              <a:uFill>
+                <a:solidFill>
+                  <a:srgbClr val="FFFFFF"/>
+                </a:solidFill>
+              </a:uFill>
+              <a:latin typeface="Arial"/>
+            </a:endParaRPr>
+          </a:p>
+          <a:p>
+            <a:pPr marL="800100" lvl="1" indent="-342900">
+              <a:lnSpc>
+                <a:spcPct val="114000"/>
+              </a:lnSpc>
+              <a:buFont typeface="Arial" panose="020B0604020202020204" pitchFamily="34" charset="0"/>
+              <a:buChar char="•"/>
+            </a:pPr>
+            <a:endParaRPr lang="en-US" sz="2200" spc="-1" dirty="0">
+              <a:solidFill>
+                <a:srgbClr val="000000"/>
+              </a:solidFill>
+              <a:uFill>
+                <a:solidFill>
+                  <a:srgbClr val="FFFFFF"/>
+                </a:solidFill>
+              </a:uFill>
+              <a:latin typeface="Arial"/>
+            </a:endParaRPr>
+          </a:p>
+          <a:p>
+            <a:pPr lvl="1">
+              <a:lnSpc>
+                <a:spcPct val="114000"/>
+              </a:lnSpc>
+            </a:pPr>
+            <a:endParaRPr lang="en-US" sz="2200" spc="-1" dirty="0">
+              <a:solidFill>
+                <a:srgbClr val="000000"/>
+              </a:solidFill>
+              <a:uFill>
+                <a:solidFill>
+                  <a:srgbClr val="FFFFFF"/>
+                </a:solidFill>
+              </a:uFill>
+              <a:latin typeface="Arial"/>
+            </a:endParaRPr>
+          </a:p>
+          <a:p>
+            <a:pPr marL="800100" lvl="1" indent="-342900">
+              <a:lnSpc>
+                <a:spcPct val="114000"/>
+              </a:lnSpc>
+              <a:buFont typeface="Arial" panose="020B0604020202020204" pitchFamily="34" charset="0"/>
+              <a:buChar char="•"/>
+            </a:pPr>
+            <a:r>
+              <a:rPr lang="en-US" sz="2200" spc="-1" dirty="0">
+                <a:solidFill>
+                  <a:srgbClr val="000000"/>
+                </a:solidFill>
+                <a:uFill>
+                  <a:solidFill>
+                    <a:srgbClr val="FFFFFF"/>
+                  </a:solidFill>
+                </a:uFill>
+                <a:latin typeface="Arial"/>
+              </a:rPr>
+              <a:t>Adding New Functionalities</a:t>
+            </a:r>
+          </a:p>
+          <a:p>
+            <a:pPr marL="1257300" lvl="2" indent="-342900">
+              <a:lnSpc>
+                <a:spcPct val="114000"/>
+              </a:lnSpc>
+              <a:buFont typeface="Arial" panose="020B0604020202020204" pitchFamily="34" charset="0"/>
+              <a:buChar char="•"/>
+            </a:pPr>
+            <a:endParaRPr lang="en-US" sz="2200" spc="-1" dirty="0">
+              <a:solidFill>
+                <a:srgbClr val="000000"/>
+              </a:solidFill>
+              <a:uFill>
+                <a:solidFill>
+                  <a:srgbClr val="FFFFFF"/>
+                </a:solidFill>
+              </a:uFill>
+              <a:latin typeface="Arial"/>
+            </a:endParaRPr>
+          </a:p>
+          <a:p>
+            <a:pPr lvl="1">
+              <a:lnSpc>
+                <a:spcPct val="114000"/>
+              </a:lnSpc>
+            </a:pPr>
+            <a:endParaRPr lang="en-US" sz="2200" spc="-1" dirty="0">
+              <a:solidFill>
+                <a:srgbClr val="000000"/>
+              </a:solidFill>
+              <a:uFill>
+                <a:solidFill>
+                  <a:srgbClr val="FFFFFF"/>
+                </a:solidFill>
+              </a:uFill>
+              <a:latin typeface="Arial"/>
+            </a:endParaRPr>
+          </a:p>
+          <a:p>
+            <a:pPr lvl="1">
+              <a:lnSpc>
+                <a:spcPct val="114000"/>
+              </a:lnSpc>
+            </a:pPr>
+            <a:endParaRPr lang="en-US" sz="2200" spc="-1" dirty="0">
+              <a:solidFill>
+                <a:srgbClr val="000000"/>
+              </a:solidFill>
+              <a:uFill>
+                <a:solidFill>
+                  <a:srgbClr val="FFFFFF"/>
+                </a:solidFill>
+              </a:uFill>
+              <a:latin typeface="Arial"/>
+            </a:endParaRPr>
+          </a:p>
+          <a:p>
+            <a:pPr lvl="1">
+              <a:lnSpc>
+                <a:spcPct val="114000"/>
+              </a:lnSpc>
+            </a:pPr>
+            <a:endParaRPr lang="en-US" sz="2200" spc="-1" dirty="0">
+              <a:solidFill>
+                <a:srgbClr val="000000"/>
+              </a:solidFill>
+              <a:uFill>
+                <a:solidFill>
+                  <a:srgbClr val="FFFFFF"/>
+                </a:solidFill>
+              </a:uFill>
+              <a:latin typeface="Arial"/>
+            </a:endParaRPr>
+          </a:p>
+          <a:p>
+            <a:pPr lvl="1">
+              <a:lnSpc>
+                <a:spcPct val="114000"/>
+              </a:lnSpc>
+            </a:pPr>
+            <a:endParaRPr lang="en-US" sz="2200" spc="-1" dirty="0">
+              <a:solidFill>
+                <a:srgbClr val="000000"/>
+              </a:solidFill>
+              <a:uFill>
+                <a:solidFill>
+                  <a:srgbClr val="FFFFFF"/>
+                </a:solidFill>
+              </a:uFill>
+              <a:latin typeface="Arial"/>
+            </a:endParaRPr>
+          </a:p>
+          <a:p>
+            <a:pPr marL="800100" lvl="1" indent="-342900">
+              <a:lnSpc>
+                <a:spcPct val="114000"/>
+              </a:lnSpc>
+              <a:buFont typeface="Arial" panose="020B0604020202020204" pitchFamily="34" charset="0"/>
+              <a:buChar char="•"/>
+            </a:pPr>
+            <a:endParaRPr lang="en-US" sz="2200" spc="-1" dirty="0">
+              <a:solidFill>
+                <a:srgbClr val="000000"/>
+              </a:solidFill>
+              <a:uFill>
+                <a:solidFill>
+                  <a:srgbClr val="FFFFFF"/>
+                </a:solidFill>
+              </a:uFill>
+              <a:latin typeface="Arial"/>
+            </a:endParaRPr>
+          </a:p>
+          <a:p>
+            <a:pPr lvl="2">
+              <a:lnSpc>
+                <a:spcPct val="114000"/>
+              </a:lnSpc>
+            </a:pPr>
+            <a:endParaRPr lang="en-US" sz="2200" spc="-1" dirty="0">
+              <a:solidFill>
+                <a:srgbClr val="000000"/>
+              </a:solidFill>
+              <a:uFill>
+                <a:solidFill>
+                  <a:srgbClr val="FFFFFF"/>
+                </a:solidFill>
+              </a:uFill>
+              <a:latin typeface="Arial"/>
+            </a:endParaRPr>
+          </a:p>
+          <a:p>
+            <a:pPr lvl="2">
+              <a:lnSpc>
+                <a:spcPct val="114000"/>
+              </a:lnSpc>
+            </a:pPr>
+            <a:endParaRPr lang="en-US" sz="2200" spc="-1" dirty="0">
+              <a:solidFill>
+                <a:srgbClr val="000000"/>
+              </a:solidFill>
+              <a:uFill>
+                <a:solidFill>
+                  <a:srgbClr val="FFFFFF"/>
+                </a:solidFill>
+              </a:uFill>
+            </a:endParaRPr>
+          </a:p>
+          <a:p>
+            <a:pPr lvl="2">
+              <a:lnSpc>
+                <a:spcPct val="114000"/>
+              </a:lnSpc>
+            </a:pPr>
+            <a:endParaRPr lang="en-US" sz="2200" spc="-1" dirty="0">
+              <a:solidFill>
+                <a:srgbClr val="000000"/>
+              </a:solidFill>
+              <a:uFill>
+                <a:solidFill>
+                  <a:srgbClr val="FFFFFF"/>
+                </a:solidFill>
+              </a:uFill>
+              <a:latin typeface="Arial"/>
+            </a:endParaRPr>
+          </a:p>
+        </p:txBody>
+      </p:sp>
+      <p:sp>
+        <p:nvSpPr>
+          <p:cNvPr id="106" name="TextShape 2"/>
           <p:cNvSpPr txBox="1"/>
           <p:nvPr/>
         </p:nvSpPr>
@@ -8682,7 +8754,7 @@
                 <a:spcPct val="100000"/>
               </a:lnSpc>
             </a:pPr>
-            <a:fld id="{617C80FE-B084-4C17-BE99-684032B7421D}" type="slidenum">
+            <a:fld id="{4B44C603-F75B-4368-8B11-8EC5E8B93C11}" type="slidenum">
               <a:rPr lang="de-DE" sz="1200" b="0" strike="noStrike" spc="-1">
                 <a:solidFill>
                   <a:srgbClr val="000000"/>
@@ -8712,7 +8784,7 @@
       </p:sp>
       <p:sp>
         <p:nvSpPr>
-          <p:cNvPr id="115" name="TextShape 3"/>
+          <p:cNvPr id="107" name="TextShape 3"/>
           <p:cNvSpPr txBox="1"/>
           <p:nvPr/>
         </p:nvSpPr>
@@ -8838,7 +8910,7 @@
       </p:sp>
       <p:sp>
         <p:nvSpPr>
-          <p:cNvPr id="116" name="TextShape 4"/>
+          <p:cNvPr id="108" name="TextShape 4"/>
           <p:cNvSpPr txBox="1"/>
           <p:nvPr/>
         </p:nvSpPr>
@@ -8876,7 +8948,7 @@
                 </a:uFill>
                 <a:latin typeface="Arial"/>
               </a:rPr>
-              <a:t>Thank you for your attention.</a:t>
+              <a:t>Timeline</a:t>
             </a:r>
             <a:endParaRPr lang="en-US" sz="2200" b="0" strike="noStrike" spc="-1" dirty="0">
               <a:solidFill>
@@ -8893,6 +8965,11 @@
         </p:txBody>
       </p:sp>
     </p:spTree>
+    <p:extLst>
+      <p:ext uri="{BB962C8B-B14F-4D97-AF65-F5344CB8AC3E}">
+        <p14:creationId xmlns:p14="http://schemas.microsoft.com/office/powerpoint/2010/main" val="3006752749"/>
+      </p:ext>
+    </p:extLst>
   </p:cSld>
   <p:clrMapOvr>
     <a:masterClrMapping/>
@@ -8946,7 +9023,7 @@
       </p:grpSpPr>
       <p:sp>
         <p:nvSpPr>
-          <p:cNvPr id="117" name="TextShape 1"/>
+          <p:cNvPr id="113" name="TextShape 1"/>
           <p:cNvSpPr txBox="1"/>
           <p:nvPr/>
         </p:nvSpPr>
@@ -8972,7 +9049,7 @@
                 <a:spcPct val="114000"/>
               </a:lnSpc>
             </a:pPr>
-            <a:endParaRPr lang="de-DE" sz="1600" b="0" strike="noStrike" spc="-1" dirty="0">
+            <a:endParaRPr lang="de-DE" sz="1600" b="0" strike="noStrike" spc="-1">
               <a:solidFill>
                 <a:srgbClr val="000000"/>
               </a:solidFill>
@@ -8990,23 +9067,23 @@
                 <a:spcPct val="114000"/>
               </a:lnSpc>
             </a:pPr>
-            <a:endParaRPr lang="de-DE" sz="1600" b="0" strike="noStrike" spc="-1" dirty="0">
-              <a:solidFill>
-                <a:srgbClr val="000000"/>
-              </a:solidFill>
-              <a:uFill>
-                <a:solidFill>
-                  <a:srgbClr val="FFFFFF"/>
-                </a:solidFill>
-              </a:uFill>
-              <a:latin typeface="Arial"/>
-            </a:endParaRPr>
-          </a:p>
-        </p:txBody>
-      </p:sp>
-      <p:sp>
-        <p:nvSpPr>
-          <p:cNvPr id="118" name="TextShape 2"/>
+            <a:endParaRPr lang="de-DE" sz="1600" b="0" strike="noStrike" spc="-1">
+              <a:solidFill>
+                <a:srgbClr val="000000"/>
+              </a:solidFill>
+              <a:uFill>
+                <a:solidFill>
+                  <a:srgbClr val="FFFFFF"/>
+                </a:solidFill>
+              </a:uFill>
+              <a:latin typeface="Arial"/>
+            </a:endParaRPr>
+          </a:p>
+        </p:txBody>
+      </p:sp>
+      <p:sp>
+        <p:nvSpPr>
+          <p:cNvPr id="114" name="TextShape 2"/>
           <p:cNvSpPr txBox="1"/>
           <p:nvPr/>
         </p:nvSpPr>
@@ -9032,6 +9109,356 @@
                 <a:spcPct val="100000"/>
               </a:lnSpc>
             </a:pPr>
+            <a:fld id="{617C80FE-B084-4C17-BE99-684032B7421D}" type="slidenum">
+              <a:rPr lang="de-DE" sz="1200" b="0" strike="noStrike" spc="-1">
+                <a:solidFill>
+                  <a:srgbClr val="000000"/>
+                </a:solidFill>
+                <a:uFill>
+                  <a:solidFill>
+                    <a:srgbClr val="FFFFFF"/>
+                  </a:solidFill>
+                </a:uFill>
+                <a:latin typeface="Arial"/>
+              </a:rPr>
+              <a:t>16</a:t>
+            </a:fld>
+            <a:endParaRPr lang="de-DE" sz="1200" b="0" strike="noStrike" spc="-1">
+              <a:solidFill>
+                <a:srgbClr val="000000"/>
+              </a:solidFill>
+              <a:uFill>
+                <a:solidFill>
+                  <a:srgbClr val="FFFFFF"/>
+                </a:solidFill>
+              </a:uFill>
+              <a:latin typeface="Times New Roman"/>
+            </a:endParaRPr>
+          </a:p>
+        </p:txBody>
+      </p:sp>
+      <p:sp>
+        <p:nvSpPr>
+          <p:cNvPr id="115" name="TextShape 3"/>
+          <p:cNvSpPr txBox="1"/>
+          <p:nvPr/>
+        </p:nvSpPr>
+        <p:spPr>
+          <a:xfrm>
+            <a:off x="311040" y="6473160"/>
+            <a:ext cx="6463800" cy="364680"/>
+          </a:xfrm>
+          <a:prstGeom prst="rect">
+            <a:avLst/>
+          </a:prstGeom>
+          <a:noFill/>
+          <a:ln>
+            <a:noFill/>
+          </a:ln>
+        </p:spPr>
+        <p:txBody>
+          <a:bodyPr lIns="0" rIns="0" anchor="ctr"/>
+          <a:lstStyle/>
+          <a:p>
+            <a:pPr>
+              <a:lnSpc>
+                <a:spcPct val="100000"/>
+              </a:lnSpc>
+            </a:pPr>
+            <a:r>
+              <a:rPr lang="de-DE" sz="1200" b="0" strike="noStrike" spc="-1" dirty="0">
+                <a:solidFill>
+                  <a:srgbClr val="000000"/>
+                </a:solidFill>
+                <a:uFill>
+                  <a:solidFill>
+                    <a:srgbClr val="FFFFFF"/>
+                  </a:solidFill>
+                </a:uFill>
+                <a:latin typeface="Arial"/>
+              </a:rPr>
+              <a:t>Oztoprak, Oguz (TUM) | Droll, Darwin (TUM) | Python-</a:t>
+            </a:r>
+            <a:r>
+              <a:rPr lang="de-DE" sz="1200" b="0" strike="noStrike" spc="-1" dirty="0" err="1">
+                <a:solidFill>
+                  <a:srgbClr val="000000"/>
+                </a:solidFill>
+                <a:uFill>
+                  <a:solidFill>
+                    <a:srgbClr val="FFFFFF"/>
+                  </a:solidFill>
+                </a:uFill>
+                <a:latin typeface="Arial"/>
+              </a:rPr>
+              <a:t>based</a:t>
+            </a:r>
+            <a:r>
+              <a:rPr lang="de-DE" sz="1200" b="0" strike="noStrike" spc="-1" dirty="0">
+                <a:solidFill>
+                  <a:srgbClr val="000000"/>
+                </a:solidFill>
+                <a:uFill>
+                  <a:solidFill>
+                    <a:srgbClr val="FFFFFF"/>
+                  </a:solidFill>
+                </a:uFill>
+                <a:latin typeface="Arial"/>
+              </a:rPr>
+              <a:t> </a:t>
+            </a:r>
+            <a:r>
+              <a:rPr lang="de-DE" sz="1200" b="0" strike="noStrike" spc="-1" dirty="0" err="1">
+                <a:solidFill>
+                  <a:srgbClr val="000000"/>
+                </a:solidFill>
+                <a:uFill>
+                  <a:solidFill>
+                    <a:srgbClr val="FFFFFF"/>
+                  </a:solidFill>
+                </a:uFill>
+                <a:latin typeface="Arial"/>
+              </a:rPr>
+              <a:t>Paraview</a:t>
+            </a:r>
+            <a:r>
+              <a:rPr lang="de-DE" sz="1200" b="0" strike="noStrike" spc="-1" dirty="0">
+                <a:solidFill>
+                  <a:srgbClr val="000000"/>
+                </a:solidFill>
+                <a:uFill>
+                  <a:solidFill>
+                    <a:srgbClr val="FFFFFF"/>
+                  </a:solidFill>
+                </a:uFill>
+                <a:latin typeface="Arial"/>
+              </a:rPr>
+              <a:t> </a:t>
+            </a:r>
+            <a:r>
+              <a:rPr lang="de-DE" sz="1200" b="0" strike="noStrike" spc="-1" dirty="0" err="1">
+                <a:solidFill>
+                  <a:srgbClr val="000000"/>
+                </a:solidFill>
+                <a:uFill>
+                  <a:solidFill>
+                    <a:srgbClr val="FFFFFF"/>
+                  </a:solidFill>
+                </a:uFill>
+                <a:latin typeface="Arial"/>
+              </a:rPr>
+              <a:t>postprocessing</a:t>
+            </a:r>
+            <a:endParaRPr lang="de-DE" sz="1200" b="0" strike="noStrike" spc="-1" dirty="0">
+              <a:solidFill>
+                <a:srgbClr val="000000"/>
+              </a:solidFill>
+              <a:uFill>
+                <a:solidFill>
+                  <a:srgbClr val="FFFFFF"/>
+                </a:solidFill>
+              </a:uFill>
+              <a:latin typeface="Times New Roman"/>
+            </a:endParaRPr>
+          </a:p>
+        </p:txBody>
+      </p:sp>
+      <p:sp>
+        <p:nvSpPr>
+          <p:cNvPr id="116" name="TextShape 4"/>
+          <p:cNvSpPr txBox="1"/>
+          <p:nvPr/>
+        </p:nvSpPr>
+        <p:spPr>
+          <a:xfrm>
+            <a:off x="318960" y="994320"/>
+            <a:ext cx="8508600" cy="410040"/>
+          </a:xfrm>
+          <a:prstGeom prst="rect">
+            <a:avLst/>
+          </a:prstGeom>
+          <a:noFill/>
+          <a:ln w="9360">
+            <a:noFill/>
+          </a:ln>
+        </p:spPr>
+        <p:txBody>
+          <a:bodyPr lIns="0" tIns="0" rIns="0" bIns="0"/>
+          <a:lstStyle/>
+          <a:p>
+            <a:pPr>
+              <a:lnSpc>
+                <a:spcPts val="1129"/>
+              </a:lnSpc>
+            </a:pPr>
+            <a:r>
+              <a:rPr lang="en-US" sz="3000" b="0" strike="noStrike" spc="-1" dirty="0">
+                <a:solidFill>
+                  <a:srgbClr val="000000"/>
+                </a:solidFill>
+                <a:uFill>
+                  <a:solidFill>
+                    <a:srgbClr val="FFFFFF"/>
+                  </a:solidFill>
+                </a:uFill>
+                <a:latin typeface="Arial"/>
+              </a:rPr>
+              <a:t>Thank you for your attention.</a:t>
+            </a:r>
+            <a:endParaRPr lang="en-US" sz="2200" b="0" strike="noStrike" spc="-1" dirty="0">
+              <a:solidFill>
+                <a:srgbClr val="000000"/>
+              </a:solidFill>
+              <a:uFill>
+                <a:solidFill>
+                  <a:srgbClr val="FFFFFF"/>
+                </a:solidFill>
+              </a:uFill>
+              <a:latin typeface="Arial"/>
+            </a:endParaRPr>
+          </a:p>
+        </p:txBody>
+      </p:sp>
+    </p:spTree>
+  </p:cSld>
+  <p:clrMapOvr>
+    <a:masterClrMapping/>
+  </p:clrMapOvr>
+  <p:timing>
+    <p:tnLst>
+      <p:par>
+        <p:cTn id="1" dur="indefinite" restart="never" nodeType="tmRoot">
+          <p:childTnLst>
+            <p:seq>
+              <p:cTn id="2" nodeType="mainSeq"/>
+              <p:prevCondLst>
+                <p:cond evt="onPrev" delay="0">
+                  <p:tgtEl>
+                    <p:sldTgt/>
+                  </p:tgtEl>
+                </p:cond>
+              </p:prevCondLst>
+              <p:nextCondLst>
+                <p:cond evt="onNext" delay="0">
+                  <p:tgtEl>
+                    <p:sldTgt/>
+                  </p:tgtEl>
+                </p:cond>
+              </p:nextCondLst>
+            </p:seq>
+          </p:childTnLst>
+        </p:cTn>
+      </p:par>
+    </p:tnLst>
+  </p:timing>
+</p:sld>
+</file>
+
+<file path=ppt/slides/slide17.xml><?xml version="1.0" encoding="utf-8"?>
+<p:sld xmlns:a="http://schemas.openxmlformats.org/drawingml/2006/main" xmlns:r="http://schemas.openxmlformats.org/officeDocument/2006/relationships" xmlns:p="http://schemas.openxmlformats.org/presentationml/2006/main">
+  <p:cSld>
+    <p:spTree>
+      <p:nvGrpSpPr>
+        <p:cNvPr id="1" name=""/>
+        <p:cNvGrpSpPr/>
+        <p:nvPr/>
+      </p:nvGrpSpPr>
+      <p:grpSpPr>
+        <a:xfrm>
+          <a:off x="0" y="0"/>
+          <a:ext cx="0" cy="0"/>
+          <a:chOff x="0" y="0"/>
+          <a:chExt cx="0" cy="0"/>
+        </a:xfrm>
+      </p:grpSpPr>
+      <p:sp>
+        <p:nvSpPr>
+          <p:cNvPr id="117" name="TextShape 1"/>
+          <p:cNvSpPr txBox="1"/>
+          <p:nvPr/>
+        </p:nvSpPr>
+        <p:spPr>
+          <a:xfrm>
+            <a:off x="318960" y="1762200"/>
+            <a:ext cx="8508600" cy="4699080"/>
+          </a:xfrm>
+          <a:prstGeom prst="rect">
+            <a:avLst/>
+          </a:prstGeom>
+          <a:noFill/>
+          <a:ln w="9360">
+            <a:noFill/>
+          </a:ln>
+        </p:spPr>
+        <p:txBody>
+          <a:bodyPr lIns="0" tIns="0" rIns="0" bIns="0"/>
+          <a:lstStyle/>
+          <a:p>
+            <a:pPr>
+              <a:lnSpc>
+                <a:spcPct val="114000"/>
+              </a:lnSpc>
+            </a:pPr>
+            <a:endParaRPr lang="de-DE" sz="1600" b="0" strike="noStrike" spc="-1" dirty="0">
+              <a:solidFill>
+                <a:srgbClr val="000000"/>
+              </a:solidFill>
+              <a:uFill>
+                <a:solidFill>
+                  <a:srgbClr val="FFFFFF"/>
+                </a:solidFill>
+              </a:uFill>
+              <a:latin typeface="Arial"/>
+            </a:endParaRPr>
+          </a:p>
+          <a:p>
+            <a:pPr>
+              <a:lnSpc>
+                <a:spcPct val="114000"/>
+              </a:lnSpc>
+            </a:pPr>
+            <a:endParaRPr lang="de-DE" sz="1600" b="0" strike="noStrike" spc="-1" dirty="0">
+              <a:solidFill>
+                <a:srgbClr val="000000"/>
+              </a:solidFill>
+              <a:uFill>
+                <a:solidFill>
+                  <a:srgbClr val="FFFFFF"/>
+                </a:solidFill>
+              </a:uFill>
+              <a:latin typeface="Arial"/>
+            </a:endParaRPr>
+          </a:p>
+        </p:txBody>
+      </p:sp>
+      <p:sp>
+        <p:nvSpPr>
+          <p:cNvPr id="118" name="TextShape 2"/>
+          <p:cNvSpPr txBox="1"/>
+          <p:nvPr/>
+        </p:nvSpPr>
+        <p:spPr>
+          <a:xfrm>
+            <a:off x="6774840" y="6473160"/>
+            <a:ext cx="2051640" cy="364680"/>
+          </a:xfrm>
+          <a:prstGeom prst="rect">
+            <a:avLst/>
+          </a:prstGeom>
+          <a:noFill/>
+          <a:ln>
+            <a:noFill/>
+          </a:ln>
+        </p:spPr>
+        <p:txBody>
+          <a:bodyPr lIns="0" rIns="0" anchor="ctr"/>
+          <a:lstStyle/>
+          <a:p>
+            <a:pPr algn="r">
+              <a:lnSpc>
+                <a:spcPct val="100000"/>
+              </a:lnSpc>
+            </a:pPr>
             <a:fld id="{5DEAF5EF-0EA5-455B-856F-0590C327C8DE}" type="slidenum">
               <a:rPr lang="de-DE" sz="1200" b="0" strike="noStrike" spc="-1">
                 <a:solidFill>
@@ -9044,7 +9471,7 @@
                 </a:uFill>
                 <a:latin typeface="Arial"/>
               </a:rPr>
-              <a:t>16</a:t>
+              <a:t>17</a:t>
             </a:fld>
             <a:endParaRPr lang="de-DE" sz="1200" b="0" strike="noStrike" spc="-1">
               <a:solidFill>

</xml_diff>